<commit_message>
Adding model performance plot and partial presentation
</commit_message>
<xml_diff>
--- a/Seattle_Home_Price_Predictive_Model.pptx
+++ b/Seattle_Home_Price_Predictive_Model.pptx
@@ -7858,7 +7858,7 @@
           <a:p>
             <a:r>
               <a:rPr lang="en-US" dirty="0"/>
-              <a:t>Prepared for Microsoft</a:t>
+              <a:t>Prepared for Seattle Realco</a:t>
             </a:r>
           </a:p>
           <a:p>
@@ -8017,7 +8017,7 @@
                 <a:latin typeface="Segoe UI" panose="020B0502040204020203" pitchFamily="34" charset="0"/>
                 <a:cs typeface="Segoe UI" panose="020B0502040204020203" pitchFamily="34" charset="0"/>
               </a:rPr>
-              <a:t>Proposal #1: Go After Animation Genre First</a:t>
+              <a:t>Model Progression</a:t>
             </a:r>
           </a:p>
           <a:p>
@@ -8030,7 +8030,7 @@
                 <a:latin typeface="Segoe UI" panose="020B0502040204020203" pitchFamily="34" charset="0"/>
                 <a:cs typeface="Segoe UI" panose="020B0502040204020203" pitchFamily="34" charset="0"/>
               </a:rPr>
-              <a:t>Proposal #2: Authorize Budget of $131M or $93M</a:t>
+              <a:t>Model Fit Plot</a:t>
             </a:r>
           </a:p>
           <a:p>
@@ -8043,7 +8043,7 @@
                 <a:latin typeface="Segoe UI" panose="020B0502040204020203" pitchFamily="34" charset="0"/>
                 <a:cs typeface="Segoe UI" panose="020B0502040204020203" pitchFamily="34" charset="0"/>
               </a:rPr>
-              <a:t>Proposal #3: Strike Deal With Top 20 Actor</a:t>
+              <a:t>Model Examples</a:t>
             </a:r>
           </a:p>
           <a:p>
@@ -8140,7 +8140,7 @@
           <a:p>
             <a:r>
               <a:rPr lang="en-US" dirty="0"/>
-              <a:t>Presentation outline</a:t>
+              <a:t>Today’s Model Review</a:t>
             </a:r>
           </a:p>
         </p:txBody>
@@ -8394,7 +8394,7 @@
           <a:p>
             <a:r>
               <a:rPr lang="en-US" dirty="0"/>
-              <a:t>Which types of movies to target?</a:t>
+              <a:t>expected price of a home?</a:t>
             </a:r>
           </a:p>
         </p:txBody>
@@ -8436,53 +8436,6 @@
           </a:p>
         </p:txBody>
       </p:sp>
-      <p:pic>
-        <p:nvPicPr>
-          <p:cNvPr id="1030" name="Picture 6">
-            <a:extLst>
-              <a:ext uri="{FF2B5EF4-FFF2-40B4-BE49-F238E27FC236}">
-                <a16:creationId xmlns:a16="http://schemas.microsoft.com/office/drawing/2014/main" id="{7D96EF71-9482-164F-9901-3F93B18019C0}"/>
-              </a:ext>
-            </a:extLst>
-          </p:cNvPr>
-          <p:cNvPicPr>
-            <a:picLocks noChangeAspect="1" noChangeArrowheads="1"/>
-          </p:cNvPicPr>
-          <p:nvPr/>
-        </p:nvPicPr>
-        <p:blipFill>
-          <a:blip r:embed="rId2">
-            <a:extLst>
-              <a:ext uri="{28A0092B-C50C-407E-A947-70E740481C1C}">
-                <a14:useLocalDpi xmlns:a14="http://schemas.microsoft.com/office/drawing/2010/main" val="0"/>
-              </a:ext>
-            </a:extLst>
-          </a:blip>
-          <a:srcRect/>
-          <a:stretch>
-            <a:fillRect/>
-          </a:stretch>
-        </p:blipFill>
-        <p:spPr bwMode="auto">
-          <a:xfrm>
-            <a:off x="1312561" y="1043266"/>
-            <a:ext cx="9499450" cy="5295200"/>
-          </a:xfrm>
-          <a:prstGeom prst="rect">
-            <a:avLst/>
-          </a:prstGeom>
-          <a:noFill/>
-          <a:extLst>
-            <a:ext uri="{909E8E84-426E-40DD-AFC4-6F175D3DCCD1}">
-              <a14:hiddenFill xmlns:a14="http://schemas.microsoft.com/office/drawing/2010/main">
-                <a:solidFill>
-                  <a:srgbClr val="FFFFFF"/>
-                </a:solidFill>
-              </a14:hiddenFill>
-            </a:ext>
-          </a:extLst>
-        </p:spPr>
-      </p:pic>
       <p:sp>
         <p:nvSpPr>
           <p:cNvPr id="4" name="Rectangle 3">
@@ -8534,17 +8487,7 @@
                 <a:latin typeface="Segoe UI" panose="020B0502040204020203" pitchFamily="34" charset="0"/>
                 <a:cs typeface="Segoe UI" panose="020B0502040204020203" pitchFamily="34" charset="0"/>
               </a:rPr>
-              <a:t>Business Objective: Microsoft has decided to create a new movie studio but </a:t>
-            </a:r>
-            <a:r>
-              <a:rPr lang="en-US" sz="2000" b="1" dirty="0">
-                <a:solidFill>
-                  <a:srgbClr val="FFFF00"/>
-                </a:solidFill>
-                <a:latin typeface="Segoe UI" panose="020B0502040204020203" pitchFamily="34" charset="0"/>
-                <a:cs typeface="Segoe UI" panose="020B0502040204020203" pitchFamily="34" charset="0"/>
-              </a:rPr>
-              <a:t>wants actionable, analytical guidance on what types of films perform best.</a:t>
+              <a:t>Business Objective: Seattle Realco wants to empower agents with a tool to ballpark expected home prices when working with buyer/seller clients</a:t>
             </a:r>
             <a:endParaRPr lang="en-US" sz="2000" b="1" dirty="0">
               <a:solidFill>
@@ -8559,326 +8502,10 @@
       </p:sp>
       <p:pic>
         <p:nvPicPr>
-          <p:cNvPr id="1032" name="Picture 8" descr="Image result for amazon studio logo">
+          <p:cNvPr id="3" name="Picture 2" descr="A picture containing chart&#10;&#10;Description automatically generated">
             <a:extLst>
               <a:ext uri="{FF2B5EF4-FFF2-40B4-BE49-F238E27FC236}">
-                <a16:creationId xmlns:a16="http://schemas.microsoft.com/office/drawing/2014/main" id="{D1F1AB69-B13A-6F4C-B048-9B662D3A87C5}"/>
-              </a:ext>
-            </a:extLst>
-          </p:cNvPr>
-          <p:cNvPicPr>
-            <a:picLocks noChangeAspect="1" noChangeArrowheads="1"/>
-          </p:cNvPicPr>
-          <p:nvPr/>
-        </p:nvPicPr>
-        <p:blipFill rotWithShape="1">
-          <a:blip r:embed="rId3">
-            <a:extLst>
-              <a:ext uri="{28A0092B-C50C-407E-A947-70E740481C1C}">
-                <a14:useLocalDpi xmlns:a14="http://schemas.microsoft.com/office/drawing/2010/main" val="0"/>
-              </a:ext>
-            </a:extLst>
-          </a:blip>
-          <a:srcRect l="13696" t="33220" r="13668" b="32469"/>
-          <a:stretch/>
-        </p:blipFill>
-        <p:spPr bwMode="auto">
-          <a:xfrm>
-            <a:off x="1379989" y="5983697"/>
-            <a:ext cx="1631322" cy="347869"/>
-          </a:xfrm>
-          <a:prstGeom prst="rect">
-            <a:avLst/>
-          </a:prstGeom>
-          <a:noFill/>
-          <a:extLst>
-            <a:ext uri="{909E8E84-426E-40DD-AFC4-6F175D3DCCD1}">
-              <a14:hiddenFill xmlns:a14="http://schemas.microsoft.com/office/drawing/2010/main">
-                <a:solidFill>
-                  <a:srgbClr val="FFFFFF"/>
-                </a:solidFill>
-              </a14:hiddenFill>
-            </a:ext>
-          </a:extLst>
-        </p:spPr>
-      </p:pic>
-      <p:pic>
-        <p:nvPicPr>
-          <p:cNvPr id="1034" name="Picture 10" descr="Image result for apple movies studio logo">
-            <a:extLst>
-              <a:ext uri="{FF2B5EF4-FFF2-40B4-BE49-F238E27FC236}">
-                <a16:creationId xmlns:a16="http://schemas.microsoft.com/office/drawing/2014/main" id="{28C94B56-9BAC-FA41-9499-C974032F6DBC}"/>
-              </a:ext>
-            </a:extLst>
-          </p:cNvPr>
-          <p:cNvPicPr>
-            <a:picLocks noChangeAspect="1" noChangeArrowheads="1"/>
-          </p:cNvPicPr>
-          <p:nvPr/>
-        </p:nvPicPr>
-        <p:blipFill rotWithShape="1">
-          <a:blip r:embed="rId4">
-            <a:extLst>
-              <a:ext uri="{28A0092B-C50C-407E-A947-70E740481C1C}">
-                <a14:useLocalDpi xmlns:a14="http://schemas.microsoft.com/office/drawing/2010/main" val="0"/>
-              </a:ext>
-            </a:extLst>
-          </a:blip>
-          <a:srcRect l="23397" t="19837" r="23696" b="19420"/>
-          <a:stretch/>
-        </p:blipFill>
-        <p:spPr bwMode="auto">
-          <a:xfrm>
-            <a:off x="10679907" y="1963967"/>
-            <a:ext cx="1113183" cy="639038"/>
-          </a:xfrm>
-          <a:prstGeom prst="rect">
-            <a:avLst/>
-          </a:prstGeom>
-          <a:noFill/>
-          <a:extLst>
-            <a:ext uri="{909E8E84-426E-40DD-AFC4-6F175D3DCCD1}">
-              <a14:hiddenFill xmlns:a14="http://schemas.microsoft.com/office/drawing/2010/main">
-                <a:solidFill>
-                  <a:srgbClr val="FFFFFF"/>
-                </a:solidFill>
-              </a14:hiddenFill>
-            </a:ext>
-          </a:extLst>
-        </p:spPr>
-      </p:pic>
-      <p:pic>
-        <p:nvPicPr>
-          <p:cNvPr id="1040" name="Picture 16" descr="The Walt Disney Studios Vector Logo">
-            <a:extLst>
-              <a:ext uri="{FF2B5EF4-FFF2-40B4-BE49-F238E27FC236}">
-                <a16:creationId xmlns:a16="http://schemas.microsoft.com/office/drawing/2014/main" id="{E484831E-8998-BD4A-913B-705DC53FEEC9}"/>
-              </a:ext>
-            </a:extLst>
-          </p:cNvPr>
-          <p:cNvPicPr>
-            <a:picLocks noChangeAspect="1" noChangeArrowheads="1"/>
-          </p:cNvPicPr>
-          <p:nvPr/>
-        </p:nvPicPr>
-        <p:blipFill rotWithShape="1">
-          <a:blip r:embed="rId5">
-            <a:extLst>
-              <a:ext uri="{28A0092B-C50C-407E-A947-70E740481C1C}">
-                <a14:useLocalDpi xmlns:a14="http://schemas.microsoft.com/office/drawing/2010/main" val="0"/>
-              </a:ext>
-            </a:extLst>
-          </a:blip>
-          <a:srcRect t="41335" b="42174"/>
-          <a:stretch/>
-        </p:blipFill>
-        <p:spPr bwMode="auto">
-          <a:xfrm>
-            <a:off x="1312560" y="5583843"/>
-            <a:ext cx="2202070" cy="363137"/>
-          </a:xfrm>
-          <a:prstGeom prst="rect">
-            <a:avLst/>
-          </a:prstGeom>
-          <a:noFill/>
-          <a:extLst>
-            <a:ext uri="{909E8E84-426E-40DD-AFC4-6F175D3DCCD1}">
-              <a14:hiddenFill xmlns:a14="http://schemas.microsoft.com/office/drawing/2010/main">
-                <a:solidFill>
-                  <a:srgbClr val="FFFFFF"/>
-                </a:solidFill>
-              </a14:hiddenFill>
-            </a:ext>
-          </a:extLst>
-        </p:spPr>
-      </p:pic>
-      <p:pic>
-        <p:nvPicPr>
-          <p:cNvPr id="1042" name="Picture 18" descr="Image result for netflix">
-            <a:extLst>
-              <a:ext uri="{FF2B5EF4-FFF2-40B4-BE49-F238E27FC236}">
-                <a16:creationId xmlns:a16="http://schemas.microsoft.com/office/drawing/2014/main" id="{A9793126-8BA7-3B4D-9B69-A872FCA98610}"/>
-              </a:ext>
-            </a:extLst>
-          </p:cNvPr>
-          <p:cNvPicPr>
-            <a:picLocks noChangeAspect="1" noChangeArrowheads="1"/>
-          </p:cNvPicPr>
-          <p:nvPr/>
-        </p:nvPicPr>
-        <p:blipFill>
-          <a:blip r:embed="rId6">
-            <a:extLst>
-              <a:ext uri="{28A0092B-C50C-407E-A947-70E740481C1C}">
-                <a14:useLocalDpi xmlns:a14="http://schemas.microsoft.com/office/drawing/2010/main" val="0"/>
-              </a:ext>
-            </a:extLst>
-          </a:blip>
-          <a:srcRect/>
-          <a:stretch>
-            <a:fillRect/>
-          </a:stretch>
-        </p:blipFill>
-        <p:spPr bwMode="auto">
-          <a:xfrm>
-            <a:off x="10668464" y="2889911"/>
-            <a:ext cx="1136069" cy="639038"/>
-          </a:xfrm>
-          <a:prstGeom prst="rect">
-            <a:avLst/>
-          </a:prstGeom>
-          <a:noFill/>
-          <a:extLst>
-            <a:ext uri="{909E8E84-426E-40DD-AFC4-6F175D3DCCD1}">
-              <a14:hiddenFill xmlns:a14="http://schemas.microsoft.com/office/drawing/2010/main">
-                <a:solidFill>
-                  <a:srgbClr val="FFFFFF"/>
-                </a:solidFill>
-              </a14:hiddenFill>
-            </a:ext>
-          </a:extLst>
-        </p:spPr>
-      </p:pic>
-      <p:pic>
-        <p:nvPicPr>
-          <p:cNvPr id="1044" name="Picture 20" descr="Image result for hulu logo">
-            <a:extLst>
-              <a:ext uri="{FF2B5EF4-FFF2-40B4-BE49-F238E27FC236}">
-                <a16:creationId xmlns:a16="http://schemas.microsoft.com/office/drawing/2014/main" id="{38425B16-8223-814E-8943-5A6EF771AD2A}"/>
-              </a:ext>
-            </a:extLst>
-          </p:cNvPr>
-          <p:cNvPicPr>
-            <a:picLocks noChangeAspect="1" noChangeArrowheads="1"/>
-          </p:cNvPicPr>
-          <p:nvPr/>
-        </p:nvPicPr>
-        <p:blipFill>
-          <a:blip r:embed="rId7">
-            <a:extLst>
-              <a:ext uri="{28A0092B-C50C-407E-A947-70E740481C1C}">
-                <a14:useLocalDpi xmlns:a14="http://schemas.microsoft.com/office/drawing/2010/main" val="0"/>
-              </a:ext>
-            </a:extLst>
-          </a:blip>
-          <a:srcRect/>
-          <a:stretch>
-            <a:fillRect/>
-          </a:stretch>
-        </p:blipFill>
-        <p:spPr bwMode="auto">
-          <a:xfrm>
-            <a:off x="10668464" y="3815855"/>
-            <a:ext cx="1136069" cy="596437"/>
-          </a:xfrm>
-          <a:prstGeom prst="rect">
-            <a:avLst/>
-          </a:prstGeom>
-          <a:noFill/>
-          <a:extLst>
-            <a:ext uri="{909E8E84-426E-40DD-AFC4-6F175D3DCCD1}">
-              <a14:hiddenFill xmlns:a14="http://schemas.microsoft.com/office/drawing/2010/main">
-                <a:solidFill>
-                  <a:srgbClr val="FFFFFF"/>
-                </a:solidFill>
-              </a14:hiddenFill>
-            </a:ext>
-          </a:extLst>
-        </p:spPr>
-      </p:pic>
-      <p:pic>
-        <p:nvPicPr>
-          <p:cNvPr id="1046" name="Picture 22" descr="Image result for universal studio logo">
-            <a:extLst>
-              <a:ext uri="{FF2B5EF4-FFF2-40B4-BE49-F238E27FC236}">
-                <a16:creationId xmlns:a16="http://schemas.microsoft.com/office/drawing/2014/main" id="{B4BEA43A-CAC5-3F46-96C8-BAEF500D1B26}"/>
-              </a:ext>
-            </a:extLst>
-          </p:cNvPr>
-          <p:cNvPicPr>
-            <a:picLocks noChangeAspect="1" noChangeArrowheads="1"/>
-          </p:cNvPicPr>
-          <p:nvPr/>
-        </p:nvPicPr>
-        <p:blipFill rotWithShape="1">
-          <a:blip r:embed="rId8">
-            <a:extLst>
-              <a:ext uri="{28A0092B-C50C-407E-A947-70E740481C1C}">
-                <a14:useLocalDpi xmlns:a14="http://schemas.microsoft.com/office/drawing/2010/main" val="0"/>
-              </a:ext>
-            </a:extLst>
-          </a:blip>
-          <a:srcRect t="20909" b="18579"/>
-          <a:stretch/>
-        </p:blipFill>
-        <p:spPr bwMode="auto">
-          <a:xfrm>
-            <a:off x="10679907" y="4699199"/>
-            <a:ext cx="1113183" cy="673607"/>
-          </a:xfrm>
-          <a:prstGeom prst="rect">
-            <a:avLst/>
-          </a:prstGeom>
-          <a:noFill/>
-          <a:extLst>
-            <a:ext uri="{909E8E84-426E-40DD-AFC4-6F175D3DCCD1}">
-              <a14:hiddenFill xmlns:a14="http://schemas.microsoft.com/office/drawing/2010/main">
-                <a:solidFill>
-                  <a:srgbClr val="FFFFFF"/>
-                </a:solidFill>
-              </a14:hiddenFill>
-            </a:ext>
-          </a:extLst>
-        </p:spPr>
-      </p:pic>
-      <p:sp>
-        <p:nvSpPr>
-          <p:cNvPr id="5" name="TextBox 4">
-            <a:extLst>
-              <a:ext uri="{FF2B5EF4-FFF2-40B4-BE49-F238E27FC236}">
-                <a16:creationId xmlns:a16="http://schemas.microsoft.com/office/drawing/2014/main" id="{96C7B6BB-33B4-4647-92DC-2FFD28AAA9BB}"/>
-              </a:ext>
-            </a:extLst>
-          </p:cNvPr>
-          <p:cNvSpPr txBox="1"/>
-          <p:nvPr/>
-        </p:nvSpPr>
-        <p:spPr>
-          <a:xfrm rot="936057">
-            <a:off x="7361760" y="3950627"/>
-            <a:ext cx="2252915" cy="923330"/>
-          </a:xfrm>
-          <a:prstGeom prst="rect">
-            <a:avLst/>
-          </a:prstGeom>
-          <a:noFill/>
-        </p:spPr>
-        <p:txBody>
-          <a:bodyPr wrap="square" rtlCol="0">
-            <a:spAutoFit/>
-          </a:bodyPr>
-          <a:lstStyle/>
-          <a:p>
-            <a:pPr algn="ctr"/>
-            <a:r>
-              <a:rPr lang="en-US" b="1" i="1" dirty="0">
-                <a:solidFill>
-                  <a:schemeClr val="bg1"/>
-                </a:solidFill>
-                <a:latin typeface="Segoe UI" panose="020B0502040204020203" pitchFamily="34" charset="0"/>
-                <a:cs typeface="Segoe UI" panose="020B0502040204020203" pitchFamily="34" charset="0"/>
-              </a:rPr>
-              <a:t>How to compete with powerhouse film companies?</a:t>
-            </a:r>
-          </a:p>
-        </p:txBody>
-      </p:sp>
-      <p:pic>
-        <p:nvPicPr>
-          <p:cNvPr id="33" name="Picture 32" descr="A picture containing text, clipart&#10;&#10;Description automatically generated">
-            <a:extLst>
-              <a:ext uri="{FF2B5EF4-FFF2-40B4-BE49-F238E27FC236}">
-                <a16:creationId xmlns:a16="http://schemas.microsoft.com/office/drawing/2014/main" id="{0110B302-B90A-F149-B681-D2736ACD5176}"/>
+                <a16:creationId xmlns:a16="http://schemas.microsoft.com/office/drawing/2014/main" id="{CED8ECAD-6482-4D49-B1EC-AFFB5FB27201}"/>
               </a:ext>
             </a:extLst>
           </p:cNvPr>
@@ -8887,28 +8514,201 @@
           </p:cNvPicPr>
           <p:nvPr/>
         </p:nvPicPr>
-        <p:blipFill>
-          <a:blip r:embed="rId9">
+        <p:blipFill rotWithShape="1">
+          <a:blip r:embed="rId2">
+            <a:alphaModFix amt="70000"/>
             <a:extLst>
               <a:ext uri="{28A0092B-C50C-407E-A947-70E740481C1C}">
                 <a14:useLocalDpi xmlns:a14="http://schemas.microsoft.com/office/drawing/2010/main" val="0"/>
               </a:ext>
             </a:extLst>
           </a:blip>
-          <a:stretch>
-            <a:fillRect/>
-          </a:stretch>
+          <a:srcRect l="695" r="1878"/>
+          <a:stretch/>
         </p:blipFill>
         <p:spPr>
-          <a:xfrm rot="872898">
-            <a:off x="7806327" y="3587797"/>
-            <a:ext cx="1725298" cy="370845"/>
+          <a:xfrm>
+            <a:off x="5561423" y="1710227"/>
+            <a:ext cx="6296629" cy="4523997"/>
           </a:xfrm>
           <a:prstGeom prst="rect">
             <a:avLst/>
           </a:prstGeom>
         </p:spPr>
       </p:pic>
+      <p:sp>
+        <p:nvSpPr>
+          <p:cNvPr id="6" name="Rectangle 5">
+            <a:extLst>
+              <a:ext uri="{FF2B5EF4-FFF2-40B4-BE49-F238E27FC236}">
+                <a16:creationId xmlns:a16="http://schemas.microsoft.com/office/drawing/2014/main" id="{F9E02D28-8459-7748-BCB9-135DE8FB6F8B}"/>
+              </a:ext>
+            </a:extLst>
+          </p:cNvPr>
+          <p:cNvSpPr/>
+          <p:nvPr/>
+        </p:nvSpPr>
+        <p:spPr>
+          <a:xfrm>
+            <a:off x="1030146" y="2087661"/>
+            <a:ext cx="4435409" cy="4093428"/>
+          </a:xfrm>
+          <a:prstGeom prst="rect">
+            <a:avLst/>
+          </a:prstGeom>
+        </p:spPr>
+        <p:txBody>
+          <a:bodyPr wrap="square">
+            <a:spAutoFit/>
+          </a:bodyPr>
+          <a:lstStyle/>
+          <a:p>
+            <a:pPr marL="457200" indent="-457200">
+              <a:buFont typeface="+mj-lt"/>
+              <a:buAutoNum type="arabicPeriod"/>
+            </a:pPr>
+            <a:r>
+              <a:rPr lang="en-US" sz="2000" dirty="0">
+                <a:latin typeface="Segoe UI" panose="020B0502040204020203" pitchFamily="34" charset="0"/>
+                <a:cs typeface="Segoe UI" panose="020B0502040204020203" pitchFamily="34" charset="0"/>
+              </a:rPr>
+              <a:t>Find best initial prediction model for Seattle area home prices</a:t>
+            </a:r>
+          </a:p>
+          <a:p>
+            <a:pPr marL="457200" indent="-457200">
+              <a:buFont typeface="+mj-lt"/>
+              <a:buAutoNum type="arabicPeriod"/>
+            </a:pPr>
+            <a:endParaRPr lang="en-US" sz="2000" dirty="0">
+              <a:latin typeface="Segoe UI" panose="020B0502040204020203" pitchFamily="34" charset="0"/>
+              <a:cs typeface="Segoe UI" panose="020B0502040204020203" pitchFamily="34" charset="0"/>
+            </a:endParaRPr>
+          </a:p>
+          <a:p>
+            <a:pPr marL="457200" indent="-457200">
+              <a:buFont typeface="+mj-lt"/>
+              <a:buAutoNum type="arabicPeriod"/>
+            </a:pPr>
+            <a:r>
+              <a:rPr lang="en-US" sz="2000" dirty="0">
+                <a:latin typeface="Segoe UI" panose="020B0502040204020203" pitchFamily="34" charset="0"/>
+                <a:cs typeface="Segoe UI" panose="020B0502040204020203" pitchFamily="34" charset="0"/>
+              </a:rPr>
+              <a:t>Model performance significantly better than using "averages”</a:t>
+            </a:r>
+          </a:p>
+          <a:p>
+            <a:pPr marL="457200" indent="-457200">
+              <a:buFont typeface="+mj-lt"/>
+              <a:buAutoNum type="arabicPeriod"/>
+            </a:pPr>
+            <a:endParaRPr lang="en-US" sz="2000" dirty="0">
+              <a:latin typeface="Segoe UI" panose="020B0502040204020203" pitchFamily="34" charset="0"/>
+              <a:cs typeface="Segoe UI" panose="020B0502040204020203" pitchFamily="34" charset="0"/>
+            </a:endParaRPr>
+          </a:p>
+          <a:p>
+            <a:pPr marL="457200" indent="-457200">
+              <a:buFont typeface="+mj-lt"/>
+              <a:buAutoNum type="arabicPeriod"/>
+            </a:pPr>
+            <a:r>
+              <a:rPr lang="en-US" sz="2000" dirty="0">
+                <a:latin typeface="Segoe UI" panose="020B0502040204020203" pitchFamily="34" charset="0"/>
+                <a:cs typeface="Segoe UI" panose="020B0502040204020203" pitchFamily="34" charset="0"/>
+              </a:rPr>
+              <a:t>Predictor inputs into model commonly available for new home buyers/sellers</a:t>
+            </a:r>
+          </a:p>
+          <a:p>
+            <a:pPr marL="457200" indent="-457200">
+              <a:buFont typeface="+mj-lt"/>
+              <a:buAutoNum type="arabicPeriod"/>
+            </a:pPr>
+            <a:endParaRPr lang="en-US" sz="2000" dirty="0">
+              <a:latin typeface="Segoe UI" panose="020B0502040204020203" pitchFamily="34" charset="0"/>
+              <a:cs typeface="Segoe UI" panose="020B0502040204020203" pitchFamily="34" charset="0"/>
+            </a:endParaRPr>
+          </a:p>
+          <a:p>
+            <a:pPr marL="457200" indent="-457200">
+              <a:buFont typeface="+mj-lt"/>
+              <a:buAutoNum type="arabicPeriod"/>
+            </a:pPr>
+            <a:r>
+              <a:rPr lang="en-US" sz="2000" dirty="0">
+                <a:latin typeface="Segoe UI" panose="020B0502040204020203" pitchFamily="34" charset="0"/>
+                <a:cs typeface="Segoe UI" panose="020B0502040204020203" pitchFamily="34" charset="0"/>
+              </a:rPr>
+              <a:t>Explain relative influence that each predictor has on overall model predictions</a:t>
+            </a:r>
+          </a:p>
+        </p:txBody>
+      </p:sp>
+      <p:sp>
+        <p:nvSpPr>
+          <p:cNvPr id="7" name="Rectangle 6">
+            <a:extLst>
+              <a:ext uri="{FF2B5EF4-FFF2-40B4-BE49-F238E27FC236}">
+                <a16:creationId xmlns:a16="http://schemas.microsoft.com/office/drawing/2014/main" id="{24A0273E-442B-FE4E-961E-44544010B1B3}"/>
+              </a:ext>
+            </a:extLst>
+          </p:cNvPr>
+          <p:cNvSpPr/>
+          <p:nvPr/>
+        </p:nvSpPr>
+        <p:spPr>
+          <a:xfrm>
+            <a:off x="1149163" y="1708760"/>
+            <a:ext cx="4435410" cy="348463"/>
+          </a:xfrm>
+          <a:prstGeom prst="rect">
+            <a:avLst/>
+          </a:prstGeom>
+          <a:solidFill>
+            <a:srgbClr val="C8E1E7"/>
+          </a:solidFill>
+          <a:ln>
+            <a:noFill/>
+          </a:ln>
+        </p:spPr>
+        <p:style>
+          <a:lnRef idx="2">
+            <a:schemeClr val="accent1">
+              <a:shade val="50000"/>
+            </a:schemeClr>
+          </a:lnRef>
+          <a:fillRef idx="1">
+            <a:schemeClr val="accent1"/>
+          </a:fillRef>
+          <a:effectRef idx="0">
+            <a:schemeClr val="accent1"/>
+          </a:effectRef>
+          <a:fontRef idx="minor">
+            <a:schemeClr val="lt1"/>
+          </a:fontRef>
+        </p:style>
+        <p:txBody>
+          <a:bodyPr rtlCol="0" anchor="ctr"/>
+          <a:lstStyle/>
+          <a:p>
+            <a:pPr algn="ctr"/>
+            <a:r>
+              <a:rPr lang="en-US" dirty="0"/>
+              <a:t>R e q u </a:t>
+            </a:r>
+            <a:r>
+              <a:rPr lang="en-US" dirty="0" err="1"/>
+              <a:t>i</a:t>
+            </a:r>
+            <a:r>
+              <a:rPr lang="en-US" dirty="0"/>
+              <a:t> r e m e n t s</a:t>
+            </a:r>
+          </a:p>
+        </p:txBody>
+      </p:sp>
     </p:spTree>
     <p:extLst>
       <p:ext uri="{BB962C8B-B14F-4D97-AF65-F5344CB8AC3E}">
@@ -8947,8 +8747,8 @@
         </p:nvSpPr>
         <p:spPr>
           <a:xfrm>
-            <a:off x="1032793" y="952468"/>
-            <a:ext cx="10330937" cy="5293757"/>
+            <a:off x="1144537" y="1351508"/>
+            <a:ext cx="10330937" cy="4154984"/>
           </a:xfrm>
           <a:prstGeom prst="rect">
             <a:avLst/>
@@ -8970,7 +8770,7 @@
                 <a:latin typeface="Segoe UI" panose="020B0502040204020203" pitchFamily="34" charset="0"/>
                 <a:cs typeface="Segoe UI" panose="020B0502040204020203" pitchFamily="34" charset="0"/>
               </a:rPr>
-              <a:t>Data Sources (6)</a:t>
+              <a:t>Data Source</a:t>
             </a:r>
           </a:p>
           <a:p>
@@ -8983,7 +8783,7 @@
                 <a:latin typeface="Segoe UI" panose="020B0502040204020203" pitchFamily="34" charset="0"/>
                 <a:cs typeface="Segoe UI" panose="020B0502040204020203" pitchFamily="34" charset="0"/>
               </a:rPr>
-              <a:t>IMDB Titles, Ratings, Principals, Actor Names </a:t>
+              <a:t>King County homes sales (May  2014 - May 2015)</a:t>
             </a:r>
           </a:p>
           <a:p>
@@ -8996,20 +8796,7 @@
                 <a:latin typeface="Segoe UI" panose="020B0502040204020203" pitchFamily="34" charset="0"/>
                 <a:cs typeface="Segoe UI" panose="020B0502040204020203" pitchFamily="34" charset="0"/>
               </a:rPr>
-              <a:t>The Numbers Movie Budgets &amp; Sales</a:t>
-            </a:r>
-          </a:p>
-          <a:p>
-            <a:pPr marL="800100" lvl="1" indent="-342900">
-              <a:buFont typeface="Courier New" panose="02070309020205020404" pitchFamily="49" charset="0"/>
-              <a:buChar char="o"/>
-            </a:pPr>
-            <a:r>
-              <a:rPr lang="en-US" sz="1600" dirty="0">
-                <a:latin typeface="Segoe UI" panose="020B0502040204020203" pitchFamily="34" charset="0"/>
-                <a:cs typeface="Segoe UI" panose="020B0502040204020203" pitchFamily="34" charset="0"/>
-              </a:rPr>
-              <a:t>Box Office Mojo Gross Sales</a:t>
+              <a:t>Target Variable: Sales Price</a:t>
             </a:r>
           </a:p>
           <a:p>
@@ -9024,15 +8811,15 @@
           </a:p>
           <a:p>
             <a:pPr marL="342900" indent="-342900">
-              <a:buFont typeface="Courier New" panose="02070309020205020404" pitchFamily="49" charset="0"/>
-              <a:buChar char="o"/>
+              <a:buFont typeface="Arial" panose="020B0604020202020204" pitchFamily="34" charset="0"/>
+              <a:buChar char="•"/>
             </a:pPr>
             <a:r>
               <a:rPr lang="en-US" sz="2000" dirty="0">
                 <a:latin typeface="Segoe UI" panose="020B0502040204020203" pitchFamily="34" charset="0"/>
                 <a:cs typeface="Segoe UI" panose="020B0502040204020203" pitchFamily="34" charset="0"/>
               </a:rPr>
-              <a:t>Data Filters</a:t>
+              <a:t>Raw Source Features</a:t>
             </a:r>
           </a:p>
           <a:p>
@@ -9045,7 +8832,7 @@
                 <a:latin typeface="Segoe UI" panose="020B0502040204020203" pitchFamily="34" charset="0"/>
                 <a:cs typeface="Segoe UI" panose="020B0502040204020203" pitchFamily="34" charset="0"/>
               </a:rPr>
-              <a:t>Years inclusive 2010-2018</a:t>
+              <a:t>Date Sold, Year Built, Floors, Bedrooms, Bathrooms, Condition, Grade</a:t>
             </a:r>
           </a:p>
           <a:p>
@@ -9058,7 +8845,7 @@
                 <a:latin typeface="Segoe UI" panose="020B0502040204020203" pitchFamily="34" charset="0"/>
                 <a:cs typeface="Segoe UI" panose="020B0502040204020203" pitchFamily="34" charset="0"/>
               </a:rPr>
-              <a:t>Only matches between IMDB and TN/BOM</a:t>
+              <a:t>Living sq. ft., Basement sq. ft, Lot sq. ft., Closest 15 neighbors average living and lot sq. ft.</a:t>
             </a:r>
           </a:p>
           <a:p>
@@ -9071,119 +8858,103 @@
                 <a:latin typeface="Segoe UI" panose="020B0502040204020203" pitchFamily="34" charset="0"/>
                 <a:cs typeface="Segoe UI" panose="020B0502040204020203" pitchFamily="34" charset="0"/>
               </a:rPr>
-              <a:t>Excluded genres (11): Reality-TV, Talk-Show, Adult, Short, Game-Show, War, Horror, Western, News, Musical, Documentary</a:t>
-            </a:r>
-          </a:p>
-          <a:p>
-            <a:pPr marL="1257300" lvl="2" indent="-342900">
-              <a:buFont typeface="Wingdings" pitchFamily="2" charset="2"/>
-              <a:buChar char="§"/>
+              <a:t>Zip code, Latitude-Longitude, Waterfront, View indicators</a:t>
+            </a:r>
+          </a:p>
+          <a:p>
+            <a:pPr marL="800100" lvl="1" indent="-342900">
+              <a:buFont typeface="Courier New" panose="02070309020205020404" pitchFamily="49" charset="0"/>
+              <a:buChar char="o"/>
             </a:pPr>
-            <a:r>
-              <a:rPr lang="en-US" sz="1400" dirty="0">
+            <a:endParaRPr lang="en-US" sz="1600" dirty="0">
+              <a:latin typeface="Segoe UI" panose="020B0502040204020203" pitchFamily="34" charset="0"/>
+              <a:cs typeface="Segoe UI" panose="020B0502040204020203" pitchFamily="34" charset="0"/>
+            </a:endParaRPr>
+          </a:p>
+          <a:p>
+            <a:pPr marL="342900" indent="-342900">
+              <a:buFont typeface="Arial" panose="020B0604020202020204" pitchFamily="34" charset="0"/>
+              <a:buChar char="•"/>
+            </a:pPr>
+            <a:r>
+              <a:rPr lang="en-US" sz="2000" dirty="0">
                 <a:latin typeface="Segoe UI" panose="020B0502040204020203" pitchFamily="34" charset="0"/>
                 <a:cs typeface="Segoe UI" panose="020B0502040204020203" pitchFamily="34" charset="0"/>
               </a:rPr>
-              <a:t>Deemed “non-core”, TV-series or inappropriate content</a:t>
-            </a:r>
+              <a:t>Features Engineered</a:t>
+            </a:r>
+          </a:p>
+          <a:p>
+            <a:pPr marL="800100" lvl="1" indent="-342900">
+              <a:buFont typeface="Courier New" panose="02070309020205020404" pitchFamily="49" charset="0"/>
+              <a:buChar char="o"/>
+            </a:pPr>
+            <a:r>
+              <a:rPr lang="en-US" sz="1600" dirty="0">
+                <a:latin typeface="Segoe UI" panose="020B0502040204020203" pitchFamily="34" charset="0"/>
+                <a:cs typeface="Segoe UI" panose="020B0502040204020203" pitchFamily="34" charset="0"/>
+              </a:rPr>
+              <a:t>Log transformations, Renovation indicator, Basement indicator, Grade group, Miles from Seattle, Zip price-per-</a:t>
+            </a:r>
+            <a:r>
+              <a:rPr lang="en-US" sz="1600" dirty="0" err="1">
+                <a:latin typeface="Segoe UI" panose="020B0502040204020203" pitchFamily="34" charset="0"/>
+                <a:cs typeface="Segoe UI" panose="020B0502040204020203" pitchFamily="34" charset="0"/>
+              </a:rPr>
+              <a:t>sqft</a:t>
+            </a:r>
+            <a:r>
+              <a:rPr lang="en-US" sz="1600" dirty="0">
+                <a:latin typeface="Segoe UI" panose="020B0502040204020203" pitchFamily="34" charset="0"/>
+                <a:cs typeface="Segoe UI" panose="020B0502040204020203" pitchFamily="34" charset="0"/>
+              </a:rPr>
+              <a:t> decile, Zip price-per-</a:t>
+            </a:r>
+            <a:r>
+              <a:rPr lang="en-US" sz="1600" dirty="0" err="1">
+                <a:latin typeface="Segoe UI" panose="020B0502040204020203" pitchFamily="34" charset="0"/>
+                <a:cs typeface="Segoe UI" panose="020B0502040204020203" pitchFamily="34" charset="0"/>
+              </a:rPr>
+              <a:t>sqft</a:t>
+            </a:r>
+            <a:r>
+              <a:rPr lang="en-US" sz="1600" dirty="0">
+                <a:latin typeface="Segoe UI" panose="020B0502040204020203" pitchFamily="34" charset="0"/>
+                <a:cs typeface="Segoe UI" panose="020B0502040204020203" pitchFamily="34" charset="0"/>
+              </a:rPr>
+              <a:t> median</a:t>
+            </a:r>
+          </a:p>
+          <a:p>
+            <a:endParaRPr lang="en-US" sz="2000" dirty="0">
+              <a:latin typeface="Segoe UI" panose="020B0502040204020203" pitchFamily="34" charset="0"/>
+              <a:cs typeface="Segoe UI" panose="020B0502040204020203" pitchFamily="34" charset="0"/>
+            </a:endParaRPr>
           </a:p>
           <a:p>
             <a:pPr marL="285750" indent="-285750">
               <a:buFont typeface="Arial" panose="020B0604020202020204" pitchFamily="34" charset="0"/>
               <a:buChar char="•"/>
             </a:pPr>
-            <a:endParaRPr lang="en-US" sz="2000" dirty="0">
-              <a:latin typeface="Segoe UI" panose="020B0502040204020203" pitchFamily="34" charset="0"/>
-              <a:cs typeface="Segoe UI" panose="020B0502040204020203" pitchFamily="34" charset="0"/>
-            </a:endParaRPr>
-          </a:p>
-          <a:p>
-            <a:pPr marL="285750" indent="-285750">
-              <a:buFont typeface="Arial" panose="020B0604020202020204" pitchFamily="34" charset="0"/>
-              <a:buChar char="•"/>
-            </a:pPr>
             <a:r>
               <a:rPr lang="en-US" sz="2000" dirty="0">
                 <a:latin typeface="Segoe UI" panose="020B0502040204020203" pitchFamily="34" charset="0"/>
                 <a:cs typeface="Segoe UI" panose="020B0502040204020203" pitchFamily="34" charset="0"/>
               </a:rPr>
-              <a:t>Key Methods Used</a:t>
-            </a:r>
-          </a:p>
-          <a:p>
-            <a:pPr marL="742950" lvl="1" indent="-285750">
-              <a:buFont typeface="Arial" panose="020B0604020202020204" pitchFamily="34" charset="0"/>
-              <a:buChar char="•"/>
+              <a:t>Model Type</a:t>
+            </a:r>
+          </a:p>
+          <a:p>
+            <a:pPr marL="800100" lvl="1" indent="-342900">
+              <a:buFont typeface="Courier New" panose="02070309020205020404" pitchFamily="49" charset="0"/>
+              <a:buChar char="o"/>
             </a:pPr>
             <a:r>
               <a:rPr lang="en-US" sz="1600" dirty="0">
                 <a:latin typeface="Segoe UI" panose="020B0502040204020203" pitchFamily="34" charset="0"/>
                 <a:cs typeface="Segoe UI" panose="020B0502040204020203" pitchFamily="34" charset="0"/>
               </a:rPr>
-              <a:t>Data Cleansing, De-duplicate, Merge Data, Data Profiling, Calculations, </a:t>
-            </a:r>
-            <a:r>
-              <a:rPr lang="en-US" sz="1600" b="1" dirty="0">
-                <a:latin typeface="Segoe UI" panose="020B0502040204020203" pitchFamily="34" charset="0"/>
-                <a:cs typeface="Segoe UI" panose="020B0502040204020203" pitchFamily="34" charset="0"/>
-              </a:rPr>
-              <a:t>Genre Splitting</a:t>
-            </a:r>
-            <a:r>
-              <a:rPr lang="en-US" sz="1600" dirty="0">
-                <a:latin typeface="Segoe UI" panose="020B0502040204020203" pitchFamily="34" charset="0"/>
-                <a:cs typeface="Segoe UI" panose="020B0502040204020203" pitchFamily="34" charset="0"/>
-              </a:rPr>
-              <a:t>, Correlation, Standard Deviation, Mean, Median, Plotting</a:t>
-            </a:r>
-          </a:p>
-          <a:p>
-            <a:pPr marL="285750" indent="-285750">
-              <a:buFont typeface="Arial" panose="020B0604020202020204" pitchFamily="34" charset="0"/>
-              <a:buChar char="•"/>
-            </a:pPr>
-            <a:endParaRPr lang="en-US" sz="2000" dirty="0">
-              <a:latin typeface="Segoe UI" panose="020B0502040204020203" pitchFamily="34" charset="0"/>
-              <a:cs typeface="Segoe UI" panose="020B0502040204020203" pitchFamily="34" charset="0"/>
-            </a:endParaRPr>
-          </a:p>
-          <a:p>
-            <a:pPr marL="285750" indent="-285750">
-              <a:buFont typeface="Arial" panose="020B0604020202020204" pitchFamily="34" charset="0"/>
-              <a:buChar char="•"/>
-            </a:pPr>
-            <a:r>
-              <a:rPr lang="en-US" sz="2000" dirty="0">
-                <a:latin typeface="Segoe UI" panose="020B0502040204020203" pitchFamily="34" charset="0"/>
-                <a:cs typeface="Segoe UI" panose="020B0502040204020203" pitchFamily="34" charset="0"/>
-              </a:rPr>
-              <a:t>Primary limitation</a:t>
-            </a:r>
-          </a:p>
-          <a:p>
-            <a:pPr marL="800100" lvl="1" indent="-342900">
-              <a:buFont typeface="Courier New" panose="02070309020205020404" pitchFamily="49" charset="0"/>
-              <a:buChar char="o"/>
-            </a:pPr>
-            <a:r>
-              <a:rPr lang="en-US" sz="1600" dirty="0">
-                <a:latin typeface="Segoe UI" panose="020B0502040204020203" pitchFamily="34" charset="0"/>
-                <a:cs typeface="Segoe UI" panose="020B0502040204020203" pitchFamily="34" charset="0"/>
-              </a:rPr>
-              <a:t>Budget and gross sales data only match IMDB titles for between 1.5K to 3K titles</a:t>
-            </a:r>
-          </a:p>
-          <a:p>
-            <a:pPr marL="800100" lvl="1" indent="-342900">
-              <a:buFont typeface="Courier New" panose="02070309020205020404" pitchFamily="49" charset="0"/>
-              <a:buChar char="o"/>
-            </a:pPr>
-            <a:r>
-              <a:rPr lang="en-US" sz="1600" dirty="0">
-                <a:latin typeface="Segoe UI" panose="020B0502040204020203" pitchFamily="34" charset="0"/>
-                <a:cs typeface="Segoe UI" panose="020B0502040204020203" pitchFamily="34" charset="0"/>
-              </a:rPr>
-              <a:t>Still confident in conclusions as good cross-section of major films included</a:t>
+              <a:t>Multiple linear regression model with cross-validation</a:t>
             </a:r>
           </a:p>
         </p:txBody>
@@ -9369,8 +9140,8 @@
         </p:nvSpPr>
         <p:spPr>
           <a:xfrm>
-            <a:off x="4393094" y="6101366"/>
-            <a:ext cx="3530454" cy="276999"/>
+            <a:off x="4412196" y="6094905"/>
+            <a:ext cx="3572132" cy="276999"/>
           </a:xfrm>
           <a:prstGeom prst="rect">
             <a:avLst/>
@@ -9388,8 +9159,20 @@
                 <a:latin typeface="Segoe UI" panose="020B0502040204020203" pitchFamily="34" charset="0"/>
                 <a:cs typeface="Segoe UI" panose="020B0502040204020203" pitchFamily="34" charset="0"/>
               </a:rPr>
-              <a:t>Additional technical details available upon request</a:t>
-            </a:r>
+              <a:t>technical details available on request and at </a:t>
+            </a:r>
+            <a:r>
+              <a:rPr lang="en-US" sz="1200" i="1" dirty="0">
+                <a:latin typeface="Segoe UI" panose="020B0502040204020203" pitchFamily="34" charset="0"/>
+                <a:cs typeface="Segoe UI" panose="020B0502040204020203" pitchFamily="34" charset="0"/>
+                <a:hlinkClick r:id="rId2"/>
+              </a:rPr>
+              <a:t>github</a:t>
+            </a:r>
+            <a:endParaRPr lang="en-US" sz="1200" i="1" dirty="0">
+              <a:latin typeface="Segoe UI" panose="020B0502040204020203" pitchFamily="34" charset="0"/>
+              <a:cs typeface="Segoe UI" panose="020B0502040204020203" pitchFamily="34" charset="0"/>
+            </a:endParaRPr>
           </a:p>
         </p:txBody>
       </p:sp>
@@ -9423,12 +9206,445 @@
           <a:chExt cx="0" cy="0"/>
         </a:xfrm>
       </p:grpSpPr>
+      <p:sp>
+        <p:nvSpPr>
+          <p:cNvPr id="10" name="TextBox 9"/>
+          <p:cNvSpPr txBox="1"/>
+          <p:nvPr/>
+        </p:nvSpPr>
+        <p:spPr>
+          <a:xfrm>
+            <a:off x="8495681" y="1386884"/>
+            <a:ext cx="3210213" cy="4524315"/>
+          </a:xfrm>
+          <a:prstGeom prst="rect">
+            <a:avLst/>
+          </a:prstGeom>
+          <a:noFill/>
+        </p:spPr>
+        <p:txBody>
+          <a:bodyPr wrap="square" rtlCol="0">
+            <a:spAutoFit/>
+          </a:bodyPr>
+          <a:lstStyle/>
+          <a:p>
+            <a:pPr lvl="1"/>
+            <a:r>
+              <a:rPr lang="en-US" b="1" dirty="0">
+                <a:latin typeface="Segoe UI" panose="020B0502040204020203" pitchFamily="34" charset="0"/>
+                <a:cs typeface="Segoe UI" panose="020B0502040204020203" pitchFamily="34" charset="0"/>
+              </a:rPr>
+              <a:t>Model 8 was best performing model</a:t>
+            </a:r>
+            <a:r>
+              <a:rPr lang="en-US" dirty="0">
+                <a:latin typeface="Segoe UI" panose="020B0502040204020203" pitchFamily="34" charset="0"/>
+                <a:cs typeface="Segoe UI" panose="020B0502040204020203" pitchFamily="34" charset="0"/>
+              </a:rPr>
+              <a:t>:</a:t>
+            </a:r>
+          </a:p>
+          <a:p>
+            <a:pPr marL="285750" indent="-285750">
+              <a:buFont typeface="Arial" panose="020B0604020202020204" pitchFamily="34" charset="0"/>
+              <a:buChar char="•"/>
+            </a:pPr>
+            <a:endParaRPr lang="en-US" sz="1600" dirty="0">
+              <a:latin typeface="Segoe UI" panose="020B0502040204020203" pitchFamily="34" charset="0"/>
+              <a:cs typeface="Segoe UI" panose="020B0502040204020203" pitchFamily="34" charset="0"/>
+            </a:endParaRPr>
+          </a:p>
+          <a:p>
+            <a:pPr marL="742950" lvl="1" indent="-285750">
+              <a:buFont typeface="Arial" panose="020B0604020202020204" pitchFamily="34" charset="0"/>
+              <a:buChar char="•"/>
+            </a:pPr>
+            <a:r>
+              <a:rPr lang="en-US" sz="1400" dirty="0">
+                <a:latin typeface="Segoe UI" panose="020B0502040204020203" pitchFamily="34" charset="0"/>
+                <a:cs typeface="Segoe UI" panose="020B0502040204020203" pitchFamily="34" charset="0"/>
+              </a:rPr>
+              <a:t>0.745 Adjusted R-squared</a:t>
+            </a:r>
+          </a:p>
+          <a:p>
+            <a:pPr marL="742950" lvl="1" indent="-285750">
+              <a:buFont typeface="Arial" panose="020B0604020202020204" pitchFamily="34" charset="0"/>
+              <a:buChar char="•"/>
+            </a:pPr>
+            <a:r>
+              <a:rPr lang="en-US" sz="1400" dirty="0">
+                <a:latin typeface="Segoe UI" panose="020B0502040204020203" pitchFamily="34" charset="0"/>
+                <a:cs typeface="Segoe UI" panose="020B0502040204020203" pitchFamily="34" charset="0"/>
+              </a:rPr>
+              <a:t>$108K  Mean Absolute Error</a:t>
+            </a:r>
+          </a:p>
+          <a:p>
+            <a:pPr marL="742950" lvl="1" indent="-285750">
+              <a:buFont typeface="Arial" panose="020B0604020202020204" pitchFamily="34" charset="0"/>
+              <a:buChar char="•"/>
+            </a:pPr>
+            <a:r>
+              <a:rPr lang="en-US" sz="1400" dirty="0">
+                <a:latin typeface="Segoe UI" panose="020B0502040204020203" pitchFamily="34" charset="0"/>
+                <a:cs typeface="Segoe UI" panose="020B0502040204020203" pitchFamily="34" charset="0"/>
+              </a:rPr>
+              <a:t>0.00 P-Value</a:t>
+            </a:r>
+            <a:endParaRPr lang="en-US" sz="1600" dirty="0">
+              <a:latin typeface="Segoe UI" panose="020B0502040204020203" pitchFamily="34" charset="0"/>
+              <a:cs typeface="Segoe UI" panose="020B0502040204020203" pitchFamily="34" charset="0"/>
+            </a:endParaRPr>
+          </a:p>
+          <a:p>
+            <a:pPr algn="ctr"/>
+            <a:endParaRPr lang="en-US" sz="1600" dirty="0">
+              <a:latin typeface="Segoe UI" panose="020B0502040204020203" pitchFamily="34" charset="0"/>
+              <a:cs typeface="Segoe UI" panose="020B0502040204020203" pitchFamily="34" charset="0"/>
+            </a:endParaRPr>
+          </a:p>
+          <a:p>
+            <a:pPr lvl="1"/>
+            <a:r>
+              <a:rPr lang="en-US" b="1" dirty="0">
+                <a:latin typeface="Segoe UI" panose="020B0502040204020203" pitchFamily="34" charset="0"/>
+                <a:cs typeface="Segoe UI" panose="020B0502040204020203" pitchFamily="34" charset="0"/>
+              </a:rPr>
+              <a:t>Variables in Model 8</a:t>
+            </a:r>
+          </a:p>
+          <a:p>
+            <a:pPr marL="742950" lvl="1" indent="-285750">
+              <a:buFont typeface="Arial" panose="020B0604020202020204" pitchFamily="34" charset="0"/>
+              <a:buChar char="•"/>
+            </a:pPr>
+            <a:r>
+              <a:rPr lang="en-US" sz="1400" dirty="0">
+                <a:latin typeface="Segoe UI" panose="020B0502040204020203" pitchFamily="34" charset="0"/>
+                <a:cs typeface="Segoe UI" panose="020B0502040204020203" pitchFamily="34" charset="0"/>
+              </a:rPr>
+              <a:t>Target: Price</a:t>
+            </a:r>
+          </a:p>
+          <a:p>
+            <a:pPr marL="742950" lvl="1" indent="-285750">
+              <a:buFont typeface="Arial" panose="020B0604020202020204" pitchFamily="34" charset="0"/>
+              <a:buChar char="•"/>
+            </a:pPr>
+            <a:r>
+              <a:rPr lang="en-US" sz="1400" dirty="0">
+                <a:latin typeface="Segoe UI" panose="020B0502040204020203" pitchFamily="34" charset="0"/>
+                <a:cs typeface="Segoe UI" panose="020B0502040204020203" pitchFamily="34" charset="0"/>
+              </a:rPr>
+              <a:t>Predictors:</a:t>
+            </a:r>
+          </a:p>
+          <a:p>
+            <a:pPr marL="1085850" lvl="2" indent="-171450">
+              <a:buFont typeface="Courier New" panose="02070309020205020404" pitchFamily="49" charset="0"/>
+              <a:buChar char="o"/>
+            </a:pPr>
+            <a:r>
+              <a:rPr lang="en-US" sz="1200" dirty="0">
+                <a:latin typeface="Segoe UI" panose="020B0502040204020203" pitchFamily="34" charset="0"/>
+                <a:cs typeface="Segoe UI" panose="020B0502040204020203" pitchFamily="34" charset="0"/>
+              </a:rPr>
+              <a:t>Sq. Ft. Living Space</a:t>
+            </a:r>
+          </a:p>
+          <a:p>
+            <a:pPr marL="1085850" lvl="2" indent="-171450">
+              <a:buFont typeface="Courier New" panose="02070309020205020404" pitchFamily="49" charset="0"/>
+              <a:buChar char="o"/>
+            </a:pPr>
+            <a:r>
+              <a:rPr lang="en-US" sz="1200" dirty="0">
+                <a:latin typeface="Segoe UI" panose="020B0502040204020203" pitchFamily="34" charset="0"/>
+                <a:cs typeface="Segoe UI" panose="020B0502040204020203" pitchFamily="34" charset="0"/>
+              </a:rPr>
+              <a:t>Sq. Ft. Per Bedroom</a:t>
+            </a:r>
+          </a:p>
+          <a:p>
+            <a:pPr marL="1085850" lvl="2" indent="-171450">
+              <a:buFont typeface="Courier New" panose="02070309020205020404" pitchFamily="49" charset="0"/>
+              <a:buChar char="o"/>
+            </a:pPr>
+            <a:r>
+              <a:rPr lang="en-US" sz="1200" dirty="0">
+                <a:latin typeface="Segoe UI" panose="020B0502040204020203" pitchFamily="34" charset="0"/>
+                <a:cs typeface="Segoe UI" panose="020B0502040204020203" pitchFamily="34" charset="0"/>
+              </a:rPr>
+              <a:t>View</a:t>
+            </a:r>
+          </a:p>
+          <a:p>
+            <a:pPr marL="1085850" lvl="2" indent="-171450">
+              <a:buFont typeface="Courier New" panose="02070309020205020404" pitchFamily="49" charset="0"/>
+              <a:buChar char="o"/>
+            </a:pPr>
+            <a:r>
+              <a:rPr lang="en-US" sz="1200" dirty="0">
+                <a:latin typeface="Segoe UI" panose="020B0502040204020203" pitchFamily="34" charset="0"/>
+                <a:cs typeface="Segoe UI" panose="020B0502040204020203" pitchFamily="34" charset="0"/>
+              </a:rPr>
+              <a:t>Grade</a:t>
+            </a:r>
+          </a:p>
+          <a:p>
+            <a:pPr marL="1085850" lvl="2" indent="-171450">
+              <a:buFont typeface="Courier New" panose="02070309020205020404" pitchFamily="49" charset="0"/>
+              <a:buChar char="o"/>
+            </a:pPr>
+            <a:r>
+              <a:rPr lang="en-US" sz="1200" dirty="0">
+                <a:latin typeface="Segoe UI" panose="020B0502040204020203" pitchFamily="34" charset="0"/>
+                <a:cs typeface="Segoe UI" panose="020B0502040204020203" pitchFamily="34" charset="0"/>
+              </a:rPr>
+              <a:t>Condition</a:t>
+            </a:r>
+          </a:p>
+          <a:p>
+            <a:pPr marL="1085850" lvl="2" indent="-171450">
+              <a:buFont typeface="Courier New" panose="02070309020205020404" pitchFamily="49" charset="0"/>
+              <a:buChar char="o"/>
+            </a:pPr>
+            <a:r>
+              <a:rPr lang="en-US" sz="1200" dirty="0">
+                <a:latin typeface="Segoe UI" panose="020B0502040204020203" pitchFamily="34" charset="0"/>
+                <a:cs typeface="Segoe UI" panose="020B0502040204020203" pitchFamily="34" charset="0"/>
+              </a:rPr>
+              <a:t>Waterfront</a:t>
+            </a:r>
+          </a:p>
+          <a:p>
+            <a:pPr marL="1085850" lvl="2" indent="-171450">
+              <a:buFont typeface="Courier New" panose="02070309020205020404" pitchFamily="49" charset="0"/>
+              <a:buChar char="o"/>
+            </a:pPr>
+            <a:r>
+              <a:rPr lang="en-US" sz="1200" dirty="0">
+                <a:latin typeface="Segoe UI" panose="020B0502040204020203" pitchFamily="34" charset="0"/>
+                <a:cs typeface="Segoe UI" panose="020B0502040204020203" pitchFamily="34" charset="0"/>
+              </a:rPr>
+              <a:t>Basement Indicator</a:t>
+            </a:r>
+          </a:p>
+          <a:p>
+            <a:pPr marL="1085850" lvl="2" indent="-171450">
+              <a:buFont typeface="Courier New" panose="02070309020205020404" pitchFamily="49" charset="0"/>
+              <a:buChar char="o"/>
+            </a:pPr>
+            <a:r>
+              <a:rPr lang="en-US" sz="1200" dirty="0">
+                <a:latin typeface="Segoe UI" panose="020B0502040204020203" pitchFamily="34" charset="0"/>
+                <a:cs typeface="Segoe UI" panose="020B0502040204020203" pitchFamily="34" charset="0"/>
+              </a:rPr>
+              <a:t>Renovation Indicator</a:t>
+            </a:r>
+          </a:p>
+          <a:p>
+            <a:pPr marL="1085850" lvl="2" indent="-171450">
+              <a:buFont typeface="Courier New" panose="02070309020205020404" pitchFamily="49" charset="0"/>
+              <a:buChar char="o"/>
+            </a:pPr>
+            <a:r>
+              <a:rPr lang="en-US" sz="1200" dirty="0">
+                <a:latin typeface="Segoe UI" panose="020B0502040204020203" pitchFamily="34" charset="0"/>
+                <a:cs typeface="Segoe UI" panose="020B0502040204020203" pitchFamily="34" charset="0"/>
+              </a:rPr>
+              <a:t>Miles From Seattle</a:t>
+            </a:r>
+          </a:p>
+          <a:p>
+            <a:pPr marL="1085850" lvl="2" indent="-171450">
+              <a:buFont typeface="Courier New" panose="02070309020205020404" pitchFamily="49" charset="0"/>
+              <a:buChar char="o"/>
+            </a:pPr>
+            <a:r>
+              <a:rPr lang="en-US" sz="1200" dirty="0">
+                <a:latin typeface="Segoe UI" panose="020B0502040204020203" pitchFamily="34" charset="0"/>
+                <a:cs typeface="Segoe UI" panose="020B0502040204020203" pitchFamily="34" charset="0"/>
+              </a:rPr>
+              <a:t>Zip code Median Price-Per-Sq. Ft. </a:t>
+            </a:r>
+          </a:p>
+        </p:txBody>
+      </p:sp>
+      <p:sp>
+        <p:nvSpPr>
+          <p:cNvPr id="11" name="Date Placeholder 1"/>
+          <p:cNvSpPr>
+            <a:spLocks noGrp="1"/>
+          </p:cNvSpPr>
+          <p:nvPr>
+            <p:ph type="dt" sz="half" idx="10"/>
+          </p:nvPr>
+        </p:nvSpPr>
+        <p:spPr>
+          <a:xfrm>
+            <a:off x="735856" y="6510505"/>
+            <a:ext cx="846754" cy="348463"/>
+          </a:xfrm>
+        </p:spPr>
+        <p:txBody>
+          <a:bodyPr/>
+          <a:lstStyle/>
+          <a:p>
+            <a:fld id="{176B1F7D-A64B-4A90-8D4F-4ED41DDBE69A}" type="datetime1">
+              <a:rPr lang="en-US" smtClean="0"/>
+              <a:t>3/16/21</a:t>
+            </a:fld>
+            <a:endParaRPr lang="en-US" dirty="0"/>
+          </a:p>
+        </p:txBody>
+      </p:sp>
+      <p:sp>
+        <p:nvSpPr>
+          <p:cNvPr id="14" name="Slide Number Placeholder 3"/>
+          <p:cNvSpPr>
+            <a:spLocks noGrp="1"/>
+          </p:cNvSpPr>
+          <p:nvPr>
+            <p:ph type="sldNum" sz="quarter" idx="12"/>
+          </p:nvPr>
+        </p:nvSpPr>
+        <p:spPr>
+          <a:xfrm>
+            <a:off x="11518163" y="6511838"/>
+            <a:ext cx="351464" cy="345796"/>
+          </a:xfrm>
+        </p:spPr>
+        <p:txBody>
+          <a:bodyPr/>
+          <a:lstStyle/>
+          <a:p>
+            <a:fld id="{2677B570-5BCE-435F-8FE4-883586746873}" type="slidenum">
+              <a:rPr lang="en-US" smtClean="0"/>
+              <a:t>5</a:t>
+            </a:fld>
+            <a:endParaRPr lang="en-US" dirty="0"/>
+          </a:p>
+        </p:txBody>
+      </p:sp>
+      <p:sp>
+        <p:nvSpPr>
+          <p:cNvPr id="5" name="Title 4"/>
+          <p:cNvSpPr>
+            <a:spLocks noGrp="1"/>
+          </p:cNvSpPr>
+          <p:nvPr>
+            <p:ph type="title"/>
+          </p:nvPr>
+        </p:nvSpPr>
+        <p:spPr/>
+        <p:txBody>
+          <a:bodyPr/>
+          <a:lstStyle/>
+          <a:p>
+            <a:r>
+              <a:rPr lang="en-US" dirty="0"/>
+              <a:t>MODEL PROGRESSIONS</a:t>
+            </a:r>
+          </a:p>
+        </p:txBody>
+      </p:sp>
+      <p:sp>
+        <p:nvSpPr>
+          <p:cNvPr id="16" name="Rounded Rectangle 15"/>
+          <p:cNvSpPr/>
+          <p:nvPr/>
+        </p:nvSpPr>
+        <p:spPr>
+          <a:xfrm>
+            <a:off x="10841181" y="315192"/>
+            <a:ext cx="990600" cy="471053"/>
+          </a:xfrm>
+          <a:prstGeom prst="roundRect">
+            <a:avLst/>
+          </a:prstGeom>
+          <a:solidFill>
+            <a:schemeClr val="tx1"/>
+          </a:solidFill>
+          <a:ln>
+            <a:noFill/>
+          </a:ln>
+        </p:spPr>
+        <p:style>
+          <a:lnRef idx="2">
+            <a:schemeClr val="accent1">
+              <a:shade val="50000"/>
+            </a:schemeClr>
+          </a:lnRef>
+          <a:fillRef idx="1">
+            <a:schemeClr val="accent1"/>
+          </a:fillRef>
+          <a:effectRef idx="0">
+            <a:schemeClr val="accent1"/>
+          </a:effectRef>
+          <a:fontRef idx="minor">
+            <a:schemeClr val="lt1"/>
+          </a:fontRef>
+        </p:style>
+        <p:txBody>
+          <a:bodyPr rtlCol="0" anchor="ctr"/>
+          <a:lstStyle/>
+          <a:p>
+            <a:pPr algn="ctr"/>
+            <a:r>
+              <a:rPr lang="en-US" sz="1000" b="1" dirty="0">
+                <a:latin typeface="Segoe UI" panose="020B0502040204020203" pitchFamily="34" charset="0"/>
+                <a:cs typeface="Segoe UI" panose="020B0502040204020203" pitchFamily="34" charset="0"/>
+              </a:rPr>
+              <a:t>Model Summary</a:t>
+            </a:r>
+          </a:p>
+        </p:txBody>
+      </p:sp>
+      <p:sp>
+        <p:nvSpPr>
+          <p:cNvPr id="21" name="Footer Placeholder 2">
+            <a:extLst>
+              <a:ext uri="{FF2B5EF4-FFF2-40B4-BE49-F238E27FC236}">
+                <a16:creationId xmlns:a16="http://schemas.microsoft.com/office/drawing/2014/main" id="{59AD246D-245A-C94F-A5DE-9FDD7873A7FB}"/>
+              </a:ext>
+            </a:extLst>
+          </p:cNvPr>
+          <p:cNvSpPr>
+            <a:spLocks noGrp="1"/>
+          </p:cNvSpPr>
+          <p:nvPr>
+            <p:ph type="ftr" sz="quarter" idx="11"/>
+          </p:nvPr>
+        </p:nvSpPr>
+        <p:spPr>
+          <a:xfrm>
+            <a:off x="4140862" y="6510505"/>
+            <a:ext cx="4114800" cy="345796"/>
+          </a:xfrm>
+        </p:spPr>
+        <p:txBody>
+          <a:bodyPr/>
+          <a:lstStyle/>
+          <a:p>
+            <a:pPr algn="ctr"/>
+            <a:r>
+              <a:rPr lang="en-US" dirty="0">
+                <a:latin typeface="Segoe UI" panose="020B0502040204020203" pitchFamily="34" charset="0"/>
+                <a:cs typeface="Segoe UI" panose="020B0502040204020203" pitchFamily="34" charset="0"/>
+              </a:rPr>
+              <a:t>Flatiron Data Science Bootcamp Project </a:t>
+            </a:r>
+          </a:p>
+        </p:txBody>
+      </p:sp>
       <p:pic>
         <p:nvPicPr>
-          <p:cNvPr id="25" name="Picture 24" descr="Chart, bar chart&#10;&#10;Description automatically generated">
+          <p:cNvPr id="3" name="Picture 2" descr="Chart, bar chart&#10;&#10;Description automatically generated">
             <a:extLst>
               <a:ext uri="{FF2B5EF4-FFF2-40B4-BE49-F238E27FC236}">
-                <a16:creationId xmlns:a16="http://schemas.microsoft.com/office/drawing/2014/main" id="{1CC6EFDF-8A82-104B-8A59-27148D2E9FD3}"/>
+                <a16:creationId xmlns:a16="http://schemas.microsoft.com/office/drawing/2014/main" id="{32CF1206-81D4-744C-9685-1E84C74C93DE}"/>
               </a:ext>
             </a:extLst>
           </p:cNvPr>
@@ -9451,334 +9667,14 @@
         </p:blipFill>
         <p:spPr>
           <a:xfrm>
-            <a:off x="984528" y="1855872"/>
-            <a:ext cx="7684004" cy="3707783"/>
+            <a:off x="1076188" y="1695930"/>
+            <a:ext cx="7670247" cy="3805698"/>
           </a:xfrm>
           <a:prstGeom prst="rect">
             <a:avLst/>
           </a:prstGeom>
         </p:spPr>
       </p:pic>
-      <p:sp>
-        <p:nvSpPr>
-          <p:cNvPr id="10" name="TextBox 9"/>
-          <p:cNvSpPr txBox="1"/>
-          <p:nvPr/>
-        </p:nvSpPr>
-        <p:spPr>
-          <a:xfrm>
-            <a:off x="8746435" y="1232995"/>
-            <a:ext cx="3085346" cy="4832092"/>
-          </a:xfrm>
-          <a:prstGeom prst="rect">
-            <a:avLst/>
-          </a:prstGeom>
-          <a:noFill/>
-        </p:spPr>
-        <p:txBody>
-          <a:bodyPr wrap="square" rtlCol="0">
-            <a:spAutoFit/>
-          </a:bodyPr>
-          <a:lstStyle/>
-          <a:p>
-            <a:pPr marL="285750" indent="-285750">
-              <a:buFont typeface="Arial" panose="020B0604020202020204" pitchFamily="34" charset="0"/>
-              <a:buChar char="•"/>
-            </a:pPr>
-            <a:r>
-              <a:rPr lang="en-US" sz="1600" b="1" dirty="0">
-                <a:latin typeface="Segoe UI" panose="020B0502040204020203" pitchFamily="34" charset="0"/>
-                <a:cs typeface="Segoe UI" panose="020B0502040204020203" pitchFamily="34" charset="0"/>
-              </a:rPr>
-              <a:t>Animation ranked #1 in Worldwide Profit metrics </a:t>
-            </a:r>
-            <a:r>
-              <a:rPr lang="en-US" sz="1600" dirty="0">
-                <a:latin typeface="Segoe UI" panose="020B0502040204020203" pitchFamily="34" charset="0"/>
-                <a:cs typeface="Segoe UI" panose="020B0502040204020203" pitchFamily="34" charset="0"/>
-              </a:rPr>
-              <a:t>amongst all genres:</a:t>
-            </a:r>
-          </a:p>
-          <a:p>
-            <a:pPr marL="285750" indent="-285750">
-              <a:buFont typeface="Arial" panose="020B0604020202020204" pitchFamily="34" charset="0"/>
-              <a:buChar char="•"/>
-            </a:pPr>
-            <a:endParaRPr lang="en-US" sz="1600" dirty="0">
-              <a:latin typeface="Segoe UI" panose="020B0502040204020203" pitchFamily="34" charset="0"/>
-              <a:cs typeface="Segoe UI" panose="020B0502040204020203" pitchFamily="34" charset="0"/>
-            </a:endParaRPr>
-          </a:p>
-          <a:p>
-            <a:pPr marL="742950" lvl="1" indent="-285750">
-              <a:buFont typeface="Courier New" panose="02070309020205020404" pitchFamily="49" charset="0"/>
-              <a:buChar char="o"/>
-            </a:pPr>
-            <a:r>
-              <a:rPr lang="en-US" sz="1200" dirty="0">
-                <a:latin typeface="Segoe UI" panose="020B0502040204020203" pitchFamily="34" charset="0"/>
-                <a:cs typeface="Segoe UI" panose="020B0502040204020203" pitchFamily="34" charset="0"/>
-              </a:rPr>
-              <a:t>$208M  Median Profit</a:t>
-            </a:r>
-          </a:p>
-          <a:p>
-            <a:pPr marL="742950" lvl="1" indent="-285750">
-              <a:buFont typeface="Courier New" panose="02070309020205020404" pitchFamily="49" charset="0"/>
-              <a:buChar char="o"/>
-            </a:pPr>
-            <a:r>
-              <a:rPr lang="en-US" sz="1200" dirty="0">
-                <a:latin typeface="Segoe UI" panose="020B0502040204020203" pitchFamily="34" charset="0"/>
-                <a:cs typeface="Segoe UI" panose="020B0502040204020203" pitchFamily="34" charset="0"/>
-              </a:rPr>
-              <a:t>$55M    25</a:t>
-            </a:r>
-            <a:r>
-              <a:rPr lang="en-US" sz="1200" baseline="30000" dirty="0">
-                <a:latin typeface="Segoe UI" panose="020B0502040204020203" pitchFamily="34" charset="0"/>
-                <a:cs typeface="Segoe UI" panose="020B0502040204020203" pitchFamily="34" charset="0"/>
-              </a:rPr>
-              <a:t>th</a:t>
-            </a:r>
-            <a:r>
-              <a:rPr lang="en-US" sz="1200" dirty="0">
-                <a:latin typeface="Segoe UI" panose="020B0502040204020203" pitchFamily="34" charset="0"/>
-                <a:cs typeface="Segoe UI" panose="020B0502040204020203" pitchFamily="34" charset="0"/>
-              </a:rPr>
-              <a:t> Percentile</a:t>
-            </a:r>
-          </a:p>
-          <a:p>
-            <a:pPr marL="742950" lvl="1" indent="-285750">
-              <a:buFont typeface="Courier New" panose="02070309020205020404" pitchFamily="49" charset="0"/>
-              <a:buChar char="o"/>
-            </a:pPr>
-            <a:r>
-              <a:rPr lang="en-US" sz="1200" dirty="0">
-                <a:latin typeface="Segoe UI" panose="020B0502040204020203" pitchFamily="34" charset="0"/>
-                <a:cs typeface="Segoe UI" panose="020B0502040204020203" pitchFamily="34" charset="0"/>
-              </a:rPr>
-              <a:t>0.99    Coefficient Variation (CV)</a:t>
-            </a:r>
-          </a:p>
-          <a:p>
-            <a:pPr marL="285750" indent="-285750">
-              <a:buFont typeface="Arial" panose="020B0604020202020204" pitchFamily="34" charset="0"/>
-              <a:buChar char="•"/>
-            </a:pPr>
-            <a:endParaRPr lang="en-US" sz="1600" dirty="0">
-              <a:latin typeface="Segoe UI" panose="020B0502040204020203" pitchFamily="34" charset="0"/>
-              <a:cs typeface="Segoe UI" panose="020B0502040204020203" pitchFamily="34" charset="0"/>
-            </a:endParaRPr>
-          </a:p>
-          <a:p>
-            <a:pPr marL="285750" indent="-285750">
-              <a:buFont typeface="Arial" panose="020B0604020202020204" pitchFamily="34" charset="0"/>
-              <a:buChar char="•"/>
-            </a:pPr>
-            <a:endParaRPr lang="en-US" sz="1600" dirty="0">
-              <a:latin typeface="Segoe UI" panose="020B0502040204020203" pitchFamily="34" charset="0"/>
-              <a:cs typeface="Segoe UI" panose="020B0502040204020203" pitchFamily="34" charset="0"/>
-            </a:endParaRPr>
-          </a:p>
-          <a:p>
-            <a:pPr marL="285750" indent="-285750">
-              <a:buFont typeface="Arial" panose="020B0604020202020204" pitchFamily="34" charset="0"/>
-              <a:buChar char="•"/>
-            </a:pPr>
-            <a:r>
-              <a:rPr lang="en-US" sz="1600" b="1" dirty="0">
-                <a:latin typeface="Segoe UI" panose="020B0502040204020203" pitchFamily="34" charset="0"/>
-                <a:cs typeface="Segoe UI" panose="020B0502040204020203" pitchFamily="34" charset="0"/>
-              </a:rPr>
-              <a:t>Animation is the most consistently profitable genre </a:t>
-            </a:r>
-            <a:r>
-              <a:rPr lang="en-US" sz="1600" dirty="0">
-                <a:latin typeface="Segoe UI" panose="020B0502040204020203" pitchFamily="34" charset="0"/>
-                <a:cs typeface="Segoe UI" panose="020B0502040204020203" pitchFamily="34" charset="0"/>
-              </a:rPr>
-              <a:t>(18% more consistent than #2 Adventure). This reduces risk.</a:t>
-            </a:r>
-          </a:p>
-          <a:p>
-            <a:pPr marL="285750" indent="-285750">
-              <a:buFont typeface="Arial" panose="020B0604020202020204" pitchFamily="34" charset="0"/>
-              <a:buChar char="•"/>
-            </a:pPr>
-            <a:endParaRPr lang="en-US" sz="1600" dirty="0">
-              <a:latin typeface="Segoe UI" panose="020B0502040204020203" pitchFamily="34" charset="0"/>
-              <a:cs typeface="Segoe UI" panose="020B0502040204020203" pitchFamily="34" charset="0"/>
-            </a:endParaRPr>
-          </a:p>
-          <a:p>
-            <a:pPr marL="285750" indent="-285750">
-              <a:buFont typeface="Arial" panose="020B0604020202020204" pitchFamily="34" charset="0"/>
-              <a:buChar char="•"/>
-            </a:pPr>
-            <a:endParaRPr lang="en-US" sz="1600" dirty="0">
-              <a:latin typeface="Segoe UI" panose="020B0502040204020203" pitchFamily="34" charset="0"/>
-              <a:cs typeface="Segoe UI" panose="020B0502040204020203" pitchFamily="34" charset="0"/>
-            </a:endParaRPr>
-          </a:p>
-          <a:p>
-            <a:pPr marL="285750" indent="-285750">
-              <a:buFont typeface="Arial" panose="020B0604020202020204" pitchFamily="34" charset="0"/>
-              <a:buChar char="•"/>
-            </a:pPr>
-            <a:r>
-              <a:rPr lang="en-US" sz="1600" dirty="0">
-                <a:latin typeface="Segoe UI" panose="020B0502040204020203" pitchFamily="34" charset="0"/>
-                <a:cs typeface="Segoe UI" panose="020B0502040204020203" pitchFamily="34" charset="0"/>
-              </a:rPr>
-              <a:t>The 97 Animation movies in our sample also had the </a:t>
-            </a:r>
-            <a:r>
-              <a:rPr lang="en-US" sz="1600" b="1" dirty="0">
-                <a:latin typeface="Segoe UI" panose="020B0502040204020203" pitchFamily="34" charset="0"/>
-                <a:cs typeface="Segoe UI" panose="020B0502040204020203" pitchFamily="34" charset="0"/>
-              </a:rPr>
-              <a:t>highest median Worldwide Gross Sales of $322M</a:t>
-            </a:r>
-          </a:p>
-        </p:txBody>
-      </p:sp>
-      <p:sp>
-        <p:nvSpPr>
-          <p:cNvPr id="11" name="Date Placeholder 1"/>
-          <p:cNvSpPr>
-            <a:spLocks noGrp="1"/>
-          </p:cNvSpPr>
-          <p:nvPr>
-            <p:ph type="dt" sz="half" idx="10"/>
-          </p:nvPr>
-        </p:nvSpPr>
-        <p:spPr>
-          <a:xfrm>
-            <a:off x="735856" y="6510505"/>
-            <a:ext cx="846754" cy="348463"/>
-          </a:xfrm>
-        </p:spPr>
-        <p:txBody>
-          <a:bodyPr/>
-          <a:lstStyle/>
-          <a:p>
-            <a:fld id="{176B1F7D-A64B-4A90-8D4F-4ED41DDBE69A}" type="datetime1">
-              <a:rPr lang="en-US" smtClean="0"/>
-              <a:t>3/15/21</a:t>
-            </a:fld>
-            <a:endParaRPr lang="en-US" dirty="0"/>
-          </a:p>
-        </p:txBody>
-      </p:sp>
-      <p:sp>
-        <p:nvSpPr>
-          <p:cNvPr id="14" name="Slide Number Placeholder 3"/>
-          <p:cNvSpPr>
-            <a:spLocks noGrp="1"/>
-          </p:cNvSpPr>
-          <p:nvPr>
-            <p:ph type="sldNum" sz="quarter" idx="12"/>
-          </p:nvPr>
-        </p:nvSpPr>
-        <p:spPr>
-          <a:xfrm>
-            <a:off x="11518163" y="6511838"/>
-            <a:ext cx="351464" cy="345796"/>
-          </a:xfrm>
-        </p:spPr>
-        <p:txBody>
-          <a:bodyPr/>
-          <a:lstStyle/>
-          <a:p>
-            <a:fld id="{2677B570-5BCE-435F-8FE4-883586746873}" type="slidenum">
-              <a:rPr lang="en-US" smtClean="0"/>
-              <a:t>5</a:t>
-            </a:fld>
-            <a:endParaRPr lang="en-US" dirty="0"/>
-          </a:p>
-        </p:txBody>
-      </p:sp>
-      <p:sp>
-        <p:nvSpPr>
-          <p:cNvPr id="5" name="Title 4"/>
-          <p:cNvSpPr>
-            <a:spLocks noGrp="1"/>
-          </p:cNvSpPr>
-          <p:nvPr>
-            <p:ph type="title"/>
-          </p:nvPr>
-        </p:nvSpPr>
-        <p:spPr/>
-        <p:txBody>
-          <a:bodyPr/>
-          <a:lstStyle/>
-          <a:p>
-            <a:r>
-              <a:rPr lang="en-US" u="sng" dirty="0"/>
-              <a:t>Proposal #1</a:t>
-            </a:r>
-            <a:r>
-              <a:rPr lang="en-US" dirty="0"/>
-              <a:t>: Go After Animation genre first</a:t>
-            </a:r>
-          </a:p>
-        </p:txBody>
-      </p:sp>
-      <p:sp>
-        <p:nvSpPr>
-          <p:cNvPr id="16" name="Rounded Rectangle 15"/>
-          <p:cNvSpPr/>
-          <p:nvPr/>
-        </p:nvSpPr>
-        <p:spPr>
-          <a:xfrm>
-            <a:off x="10841181" y="315192"/>
-            <a:ext cx="990600" cy="471053"/>
-          </a:xfrm>
-          <a:prstGeom prst="roundRect">
-            <a:avLst/>
-          </a:prstGeom>
-          <a:solidFill>
-            <a:schemeClr val="tx1"/>
-          </a:solidFill>
-          <a:ln>
-            <a:noFill/>
-          </a:ln>
-        </p:spPr>
-        <p:style>
-          <a:lnRef idx="2">
-            <a:schemeClr val="accent1">
-              <a:shade val="50000"/>
-            </a:schemeClr>
-          </a:lnRef>
-          <a:fillRef idx="1">
-            <a:schemeClr val="accent1"/>
-          </a:fillRef>
-          <a:effectRef idx="0">
-            <a:schemeClr val="accent1"/>
-          </a:effectRef>
-          <a:fontRef idx="minor">
-            <a:schemeClr val="lt1"/>
-          </a:fontRef>
-        </p:style>
-        <p:txBody>
-          <a:bodyPr rtlCol="0" anchor="ctr"/>
-          <a:lstStyle/>
-          <a:p>
-            <a:pPr algn="ctr"/>
-            <a:r>
-              <a:rPr lang="en-US" sz="1000" b="1" dirty="0">
-                <a:latin typeface="Segoe UI" panose="020B0502040204020203" pitchFamily="34" charset="0"/>
-                <a:cs typeface="Segoe UI" panose="020B0502040204020203" pitchFamily="34" charset="0"/>
-              </a:rPr>
-              <a:t>Animation</a:t>
-            </a:r>
-          </a:p>
-        </p:txBody>
-      </p:sp>
       <p:sp>
         <p:nvSpPr>
           <p:cNvPr id="20" name="Rectangle 19">
@@ -9793,16 +9689,16 @@
         </p:nvSpPr>
         <p:spPr>
           <a:xfrm>
-            <a:off x="2214410" y="2067339"/>
-            <a:ext cx="439337" cy="3493117"/>
+            <a:off x="6632295" y="1437397"/>
+            <a:ext cx="1469984" cy="4384671"/>
           </a:xfrm>
           <a:prstGeom prst="rect">
             <a:avLst/>
           </a:prstGeom>
           <a:noFill/>
-          <a:ln w="28575" cap="flat" cmpd="sng" algn="ctr">
+          <a:ln w="38100" cap="flat" cmpd="sng" algn="ctr">
             <a:solidFill>
-              <a:srgbClr val="FFFF00"/>
+              <a:schemeClr val="tx1"/>
             </a:solidFill>
             <a:prstDash val="solid"/>
             <a:round/>
@@ -9835,37 +9731,35 @@
       </p:sp>
       <p:sp>
         <p:nvSpPr>
-          <p:cNvPr id="21" name="Footer Placeholder 2">
+          <p:cNvPr id="4" name="TextBox 3">
             <a:extLst>
               <a:ext uri="{FF2B5EF4-FFF2-40B4-BE49-F238E27FC236}">
-                <a16:creationId xmlns:a16="http://schemas.microsoft.com/office/drawing/2014/main" id="{59AD246D-245A-C94F-A5DE-9FDD7873A7FB}"/>
+                <a16:creationId xmlns:a16="http://schemas.microsoft.com/office/drawing/2014/main" id="{95CE60BD-DC5F-4B45-94DA-B207A2B55252}"/>
               </a:ext>
             </a:extLst>
           </p:cNvPr>
-          <p:cNvSpPr>
-            <a:spLocks noGrp="1"/>
-          </p:cNvSpPr>
-          <p:nvPr>
-            <p:ph type="ftr" sz="quarter" idx="11"/>
-          </p:nvPr>
+          <p:cNvSpPr txBox="1"/>
+          <p:nvPr/>
         </p:nvSpPr>
         <p:spPr>
           <a:xfrm>
-            <a:off x="4140862" y="6510505"/>
-            <a:ext cx="4114800" cy="345796"/>
-          </a:xfrm>
+            <a:off x="6747566" y="1109661"/>
+            <a:ext cx="1239442" cy="369332"/>
+          </a:xfrm>
+          <a:prstGeom prst="rect">
+            <a:avLst/>
+          </a:prstGeom>
+          <a:noFill/>
         </p:spPr>
         <p:txBody>
-          <a:bodyPr/>
+          <a:bodyPr wrap="none" rtlCol="0">
+            <a:spAutoFit/>
+          </a:bodyPr>
           <a:lstStyle/>
           <a:p>
-            <a:pPr algn="ctr"/>
-            <a:r>
-              <a:rPr lang="en-US" dirty="0">
-                <a:latin typeface="Segoe UI" panose="020B0502040204020203" pitchFamily="34" charset="0"/>
-                <a:cs typeface="Segoe UI" panose="020B0502040204020203" pitchFamily="34" charset="0"/>
-              </a:rPr>
-              <a:t>Flatiron Data Science Bootcamp Project </a:t>
+            <a:r>
+              <a:rPr lang="en-US" dirty="0"/>
+              <a:t>Best Model</a:t>
             </a:r>
           </a:p>
         </p:txBody>

</xml_diff>

<commit_message>
Adding model comparison plots and slides
</commit_message>
<xml_diff>
--- a/Seattle_Home_Price_Predictive_Model.pptx
+++ b/Seattle_Home_Price_Predictive_Model.pptx
@@ -5,21 +5,20 @@
     <p:sldMasterId id="2147483790" r:id="rId1"/>
   </p:sldMasterIdLst>
   <p:notesMasterIdLst>
-    <p:notesMasterId r:id="rId11"/>
+    <p:notesMasterId r:id="rId10"/>
   </p:notesMasterIdLst>
   <p:handoutMasterIdLst>
-    <p:handoutMasterId r:id="rId12"/>
+    <p:handoutMasterId r:id="rId11"/>
   </p:handoutMasterIdLst>
   <p:sldIdLst>
     <p:sldId id="256" r:id="rId2"/>
     <p:sldId id="287" r:id="rId3"/>
     <p:sldId id="275" r:id="rId4"/>
     <p:sldId id="288" r:id="rId5"/>
-    <p:sldId id="277" r:id="rId6"/>
-    <p:sldId id="290" r:id="rId7"/>
-    <p:sldId id="291" r:id="rId8"/>
-    <p:sldId id="286" r:id="rId9"/>
-    <p:sldId id="273" r:id="rId10"/>
+    <p:sldId id="289" r:id="rId6"/>
+    <p:sldId id="277" r:id="rId7"/>
+    <p:sldId id="286" r:id="rId8"/>
+    <p:sldId id="273" r:id="rId9"/>
   </p:sldIdLst>
   <p:sldSz cx="12192000" cy="6858000"/>
   <p:notesSz cx="6858000" cy="9144000"/>
@@ -9215,7 +9214,7 @@
         <p:spPr>
           <a:xfrm>
             <a:off x="8495681" y="1386884"/>
-            <a:ext cx="3210213" cy="4524315"/>
+            <a:ext cx="3336100" cy="4801314"/>
           </a:xfrm>
           <a:prstGeom prst="rect">
             <a:avLst/>
@@ -9234,15 +9233,12 @@
                 <a:latin typeface="Segoe UI" panose="020B0502040204020203" pitchFamily="34" charset="0"/>
                 <a:cs typeface="Segoe UI" panose="020B0502040204020203" pitchFamily="34" charset="0"/>
               </a:rPr>
-              <a:t>Model 8 was best performing model</a:t>
-            </a:r>
-            <a:r>
-              <a:rPr lang="en-US" dirty="0">
-                <a:latin typeface="Segoe UI" panose="020B0502040204020203" pitchFamily="34" charset="0"/>
-                <a:cs typeface="Segoe UI" panose="020B0502040204020203" pitchFamily="34" charset="0"/>
-              </a:rPr>
-              <a:t>:</a:t>
-            </a:r>
+              <a:t>Model 8 performed best with 74% of variance explained</a:t>
+            </a:r>
+            <a:endParaRPr lang="en-US" dirty="0">
+              <a:latin typeface="Segoe UI" panose="020B0502040204020203" pitchFamily="34" charset="0"/>
+              <a:cs typeface="Segoe UI" panose="020B0502040204020203" pitchFamily="34" charset="0"/>
+            </a:endParaRPr>
           </a:p>
           <a:p>
             <a:pPr marL="285750" indent="-285750">
@@ -9545,7 +9541,7 @@
           <a:p>
             <a:r>
               <a:rPr lang="en-US" dirty="0"/>
-              <a:t>MODEL PROGRESSIONS</a:t>
+              <a:t>MODEL PREDICTIONS</a:t>
             </a:r>
           </a:p>
         </p:txBody>
@@ -9767,7 +9763,7 @@
     </p:spTree>
     <p:extLst>
       <p:ext uri="{BB962C8B-B14F-4D97-AF65-F5344CB8AC3E}">
-        <p14:creationId xmlns:p14="http://schemas.microsoft.com/office/powerpoint/2010/main" val="1914768012"/>
+        <p14:creationId xmlns:p14="http://schemas.microsoft.com/office/powerpoint/2010/main" val="560938733"/>
       </p:ext>
     </p:extLst>
   </p:cSld>
@@ -9802,62 +9798,29 @@
         </p:nvSpPr>
         <p:spPr>
           <a:xfrm>
-            <a:off x="1159233" y="4806265"/>
-            <a:ext cx="4901508" cy="1231106"/>
+            <a:off x="8495681" y="1386884"/>
+            <a:ext cx="3336100" cy="4801314"/>
           </a:xfrm>
           <a:prstGeom prst="rect">
             <a:avLst/>
           </a:prstGeom>
+          <a:noFill/>
         </p:spPr>
-        <p:style>
-          <a:lnRef idx="2">
-            <a:schemeClr val="dk1">
-              <a:shade val="50000"/>
-            </a:schemeClr>
-          </a:lnRef>
-          <a:fillRef idx="1">
-            <a:schemeClr val="dk1"/>
-          </a:fillRef>
-          <a:effectRef idx="0">
-            <a:schemeClr val="dk1"/>
-          </a:effectRef>
-          <a:fontRef idx="minor">
-            <a:schemeClr val="lt1"/>
-          </a:fontRef>
-        </p:style>
         <p:txBody>
           <a:bodyPr wrap="square" rtlCol="0">
             <a:spAutoFit/>
           </a:bodyPr>
           <a:lstStyle/>
           <a:p>
-            <a:r>
-              <a:rPr lang="en-US" sz="1600" b="1" i="1" dirty="0">
+            <a:pPr lvl="1"/>
+            <a:r>
+              <a:rPr lang="en-US" b="1" dirty="0">
                 <a:latin typeface="Segoe UI" panose="020B0502040204020203" pitchFamily="34" charset="0"/>
                 <a:cs typeface="Segoe UI" panose="020B0502040204020203" pitchFamily="34" charset="0"/>
               </a:rPr>
-              <a:t>Committing to an ideal </a:t>
-            </a:r>
-            <a:r>
-              <a:rPr lang="en-US" sz="1600" b="1" i="1" dirty="0">
-                <a:solidFill>
-                  <a:srgbClr val="FFFF00"/>
-                </a:solidFill>
-                <a:latin typeface="Segoe UI" panose="020B0502040204020203" pitchFamily="34" charset="0"/>
-                <a:cs typeface="Segoe UI" panose="020B0502040204020203" pitchFamily="34" charset="0"/>
-              </a:rPr>
-              <a:t>Production Budget </a:t>
-            </a:r>
-            <a:r>
-              <a:rPr lang="en-US" sz="1600" b="1" i="1" dirty="0">
-                <a:latin typeface="Segoe UI" panose="020B0502040204020203" pitchFamily="34" charset="0"/>
-                <a:cs typeface="Segoe UI" panose="020B0502040204020203" pitchFamily="34" charset="0"/>
-              </a:rPr>
-              <a:t>increases chances of a profitable movie</a:t>
-            </a:r>
-          </a:p>
-          <a:p>
-            <a:endParaRPr lang="en-US" sz="1400" dirty="0">
+              <a:t>Model 8 performed best with 74% of variance explained</a:t>
+            </a:r>
+            <a:endParaRPr lang="en-US" dirty="0">
               <a:latin typeface="Segoe UI" panose="020B0502040204020203" pitchFamily="34" charset="0"/>
               <a:cs typeface="Segoe UI" panose="020B0502040204020203" pitchFamily="34" charset="0"/>
             </a:endParaRPr>
@@ -9867,16 +9830,26 @@
               <a:buFont typeface="Arial" panose="020B0604020202020204" pitchFamily="34" charset="0"/>
               <a:buChar char="•"/>
             </a:pPr>
+            <a:endParaRPr lang="en-US" sz="1600" dirty="0">
+              <a:latin typeface="Segoe UI" panose="020B0502040204020203" pitchFamily="34" charset="0"/>
+              <a:cs typeface="Segoe UI" panose="020B0502040204020203" pitchFamily="34" charset="0"/>
+            </a:endParaRPr>
+          </a:p>
+          <a:p>
+            <a:pPr marL="742950" lvl="1" indent="-285750">
+              <a:buFont typeface="Arial" panose="020B0604020202020204" pitchFamily="34" charset="0"/>
+              <a:buChar char="•"/>
+            </a:pPr>
             <a:r>
               <a:rPr lang="en-US" sz="1400" dirty="0">
                 <a:latin typeface="Segoe UI" panose="020B0502040204020203" pitchFamily="34" charset="0"/>
                 <a:cs typeface="Segoe UI" panose="020B0502040204020203" pitchFamily="34" charset="0"/>
               </a:rPr>
-              <a:t>Special:  $112M to $150M (50% better chance)</a:t>
-            </a:r>
-          </a:p>
-          <a:p>
-            <a:pPr marL="285750" indent="-285750">
+              <a:t>0.745 Adjusted R-squared</a:t>
+            </a:r>
+          </a:p>
+          <a:p>
+            <a:pPr marL="742950" lvl="1" indent="-285750">
               <a:buFont typeface="Arial" panose="020B0604020202020204" pitchFamily="34" charset="0"/>
               <a:buChar char="•"/>
             </a:pPr>
@@ -9885,7 +9858,197 @@
                 <a:latin typeface="Segoe UI" panose="020B0502040204020203" pitchFamily="34" charset="0"/>
                 <a:cs typeface="Segoe UI" panose="020B0502040204020203" pitchFamily="34" charset="0"/>
               </a:rPr>
-              <a:t>Traditional: $75M - $112M (40% better chance)</a:t>
+              <a:t>$108K  Mean Absolute Error</a:t>
+            </a:r>
+          </a:p>
+          <a:p>
+            <a:pPr marL="742950" lvl="1" indent="-285750">
+              <a:buFont typeface="Arial" panose="020B0604020202020204" pitchFamily="34" charset="0"/>
+              <a:buChar char="•"/>
+            </a:pPr>
+            <a:r>
+              <a:rPr lang="en-US" sz="1400" dirty="0">
+                <a:latin typeface="Segoe UI" panose="020B0502040204020203" pitchFamily="34" charset="0"/>
+                <a:cs typeface="Segoe UI" panose="020B0502040204020203" pitchFamily="34" charset="0"/>
+              </a:rPr>
+              <a:t>0.00 P-Value</a:t>
+            </a:r>
+            <a:endParaRPr lang="en-US" sz="1600" dirty="0">
+              <a:latin typeface="Segoe UI" panose="020B0502040204020203" pitchFamily="34" charset="0"/>
+              <a:cs typeface="Segoe UI" panose="020B0502040204020203" pitchFamily="34" charset="0"/>
+            </a:endParaRPr>
+          </a:p>
+          <a:p>
+            <a:pPr algn="ctr"/>
+            <a:endParaRPr lang="en-US" sz="1600" dirty="0">
+              <a:latin typeface="Segoe UI" panose="020B0502040204020203" pitchFamily="34" charset="0"/>
+              <a:cs typeface="Segoe UI" panose="020B0502040204020203" pitchFamily="34" charset="0"/>
+            </a:endParaRPr>
+          </a:p>
+          <a:p>
+            <a:pPr lvl="1"/>
+            <a:r>
+              <a:rPr lang="en-US" b="1" dirty="0">
+                <a:latin typeface="Segoe UI" panose="020B0502040204020203" pitchFamily="34" charset="0"/>
+                <a:cs typeface="Segoe UI" panose="020B0502040204020203" pitchFamily="34" charset="0"/>
+              </a:rPr>
+              <a:t>Variables in Model 8</a:t>
+            </a:r>
+          </a:p>
+          <a:p>
+            <a:pPr marL="742950" lvl="1" indent="-285750">
+              <a:buFont typeface="Arial" panose="020B0604020202020204" pitchFamily="34" charset="0"/>
+              <a:buChar char="•"/>
+            </a:pPr>
+            <a:r>
+              <a:rPr lang="en-US" sz="1400" dirty="0">
+                <a:latin typeface="Segoe UI" panose="020B0502040204020203" pitchFamily="34" charset="0"/>
+                <a:cs typeface="Segoe UI" panose="020B0502040204020203" pitchFamily="34" charset="0"/>
+              </a:rPr>
+              <a:t>Target: Price</a:t>
+            </a:r>
+          </a:p>
+          <a:p>
+            <a:pPr marL="742950" lvl="1" indent="-285750">
+              <a:buFont typeface="Arial" panose="020B0604020202020204" pitchFamily="34" charset="0"/>
+              <a:buChar char="•"/>
+            </a:pPr>
+            <a:r>
+              <a:rPr lang="en-US" sz="1400" dirty="0">
+                <a:latin typeface="Segoe UI" panose="020B0502040204020203" pitchFamily="34" charset="0"/>
+                <a:cs typeface="Segoe UI" panose="020B0502040204020203" pitchFamily="34" charset="0"/>
+              </a:rPr>
+              <a:t>Predictors:</a:t>
+            </a:r>
+          </a:p>
+          <a:p>
+            <a:pPr marL="1085850" lvl="2" indent="-171450">
+              <a:buFont typeface="Courier New" panose="02070309020205020404" pitchFamily="49" charset="0"/>
+              <a:buChar char="o"/>
+            </a:pPr>
+            <a:r>
+              <a:rPr lang="en-US" sz="1200" dirty="0">
+                <a:latin typeface="Segoe UI" panose="020B0502040204020203" pitchFamily="34" charset="0"/>
+                <a:cs typeface="Segoe UI" panose="020B0502040204020203" pitchFamily="34" charset="0"/>
+              </a:rPr>
+              <a:t>Sq. Ft. Living Space</a:t>
+            </a:r>
+          </a:p>
+          <a:p>
+            <a:pPr marL="1085850" lvl="2" indent="-171450">
+              <a:buFont typeface="Courier New" panose="02070309020205020404" pitchFamily="49" charset="0"/>
+              <a:buChar char="o"/>
+            </a:pPr>
+            <a:r>
+              <a:rPr lang="en-US" sz="1200" dirty="0">
+                <a:latin typeface="Segoe UI" panose="020B0502040204020203" pitchFamily="34" charset="0"/>
+                <a:cs typeface="Segoe UI" panose="020B0502040204020203" pitchFamily="34" charset="0"/>
+              </a:rPr>
+              <a:t>Sq. Ft. Per Bedroom</a:t>
+            </a:r>
+          </a:p>
+          <a:p>
+            <a:pPr marL="1085850" lvl="2" indent="-171450">
+              <a:buFont typeface="Courier New" panose="02070309020205020404" pitchFamily="49" charset="0"/>
+              <a:buChar char="o"/>
+            </a:pPr>
+            <a:r>
+              <a:rPr lang="en-US" sz="1200" dirty="0">
+                <a:latin typeface="Segoe UI" panose="020B0502040204020203" pitchFamily="34" charset="0"/>
+                <a:cs typeface="Segoe UI" panose="020B0502040204020203" pitchFamily="34" charset="0"/>
+              </a:rPr>
+              <a:t>View</a:t>
+            </a:r>
+          </a:p>
+          <a:p>
+            <a:pPr marL="1085850" lvl="2" indent="-171450">
+              <a:buFont typeface="Courier New" panose="02070309020205020404" pitchFamily="49" charset="0"/>
+              <a:buChar char="o"/>
+            </a:pPr>
+            <a:r>
+              <a:rPr lang="en-US" sz="1200" dirty="0">
+                <a:latin typeface="Segoe UI" panose="020B0502040204020203" pitchFamily="34" charset="0"/>
+                <a:cs typeface="Segoe UI" panose="020B0502040204020203" pitchFamily="34" charset="0"/>
+              </a:rPr>
+              <a:t>Grade</a:t>
+            </a:r>
+          </a:p>
+          <a:p>
+            <a:pPr marL="1085850" lvl="2" indent="-171450">
+              <a:buFont typeface="Courier New" panose="02070309020205020404" pitchFamily="49" charset="0"/>
+              <a:buChar char="o"/>
+            </a:pPr>
+            <a:r>
+              <a:rPr lang="en-US" sz="1200" dirty="0">
+                <a:latin typeface="Segoe UI" panose="020B0502040204020203" pitchFamily="34" charset="0"/>
+                <a:cs typeface="Segoe UI" panose="020B0502040204020203" pitchFamily="34" charset="0"/>
+              </a:rPr>
+              <a:t>Condition</a:t>
+            </a:r>
+          </a:p>
+          <a:p>
+            <a:pPr marL="1085850" lvl="2" indent="-171450">
+              <a:buFont typeface="Courier New" panose="02070309020205020404" pitchFamily="49" charset="0"/>
+              <a:buChar char="o"/>
+            </a:pPr>
+            <a:r>
+              <a:rPr lang="en-US" sz="1200" dirty="0">
+                <a:latin typeface="Segoe UI" panose="020B0502040204020203" pitchFamily="34" charset="0"/>
+                <a:cs typeface="Segoe UI" panose="020B0502040204020203" pitchFamily="34" charset="0"/>
+              </a:rPr>
+              <a:t>Waterfront</a:t>
+            </a:r>
+          </a:p>
+          <a:p>
+            <a:pPr marL="1085850" lvl="2" indent="-171450">
+              <a:buFont typeface="Courier New" panose="02070309020205020404" pitchFamily="49" charset="0"/>
+              <a:buChar char="o"/>
+            </a:pPr>
+            <a:r>
+              <a:rPr lang="en-US" sz="1200" dirty="0">
+                <a:latin typeface="Segoe UI" panose="020B0502040204020203" pitchFamily="34" charset="0"/>
+                <a:cs typeface="Segoe UI" panose="020B0502040204020203" pitchFamily="34" charset="0"/>
+              </a:rPr>
+              <a:t>Basement Indicator</a:t>
+            </a:r>
+          </a:p>
+          <a:p>
+            <a:pPr marL="1085850" lvl="2" indent="-171450">
+              <a:buFont typeface="Courier New" panose="02070309020205020404" pitchFamily="49" charset="0"/>
+              <a:buChar char="o"/>
+            </a:pPr>
+            <a:r>
+              <a:rPr lang="en-US" sz="1200" dirty="0">
+                <a:latin typeface="Segoe UI" panose="020B0502040204020203" pitchFamily="34" charset="0"/>
+                <a:cs typeface="Segoe UI" panose="020B0502040204020203" pitchFamily="34" charset="0"/>
+              </a:rPr>
+              <a:t>Renovation Indicator</a:t>
+            </a:r>
+          </a:p>
+          <a:p>
+            <a:pPr marL="1085850" lvl="2" indent="-171450">
+              <a:buFont typeface="Courier New" panose="02070309020205020404" pitchFamily="49" charset="0"/>
+              <a:buChar char="o"/>
+            </a:pPr>
+            <a:r>
+              <a:rPr lang="en-US" sz="1200" dirty="0">
+                <a:latin typeface="Segoe UI" panose="020B0502040204020203" pitchFamily="34" charset="0"/>
+                <a:cs typeface="Segoe UI" panose="020B0502040204020203" pitchFamily="34" charset="0"/>
+              </a:rPr>
+              <a:t>Miles From Seattle</a:t>
+            </a:r>
+          </a:p>
+          <a:p>
+            <a:pPr marL="1085850" lvl="2" indent="-171450">
+              <a:buFont typeface="Courier New" panose="02070309020205020404" pitchFamily="49" charset="0"/>
+              <a:buChar char="o"/>
+            </a:pPr>
+            <a:r>
+              <a:rPr lang="en-US" sz="1200" dirty="0">
+                <a:latin typeface="Segoe UI" panose="020B0502040204020203" pitchFamily="34" charset="0"/>
+                <a:cs typeface="Segoe UI" panose="020B0502040204020203" pitchFamily="34" charset="0"/>
+              </a:rPr>
+              <a:t>Zip code Median Price-Per-Sq. Ft. </a:t>
             </a:r>
           </a:p>
         </p:txBody>
@@ -9912,7 +10075,7 @@
           <a:p>
             <a:fld id="{176B1F7D-A64B-4A90-8D4F-4ED41DDBE69A}" type="datetime1">
               <a:rPr lang="en-US" smtClean="0"/>
-              <a:t>3/15/21</a:t>
+              <a:t>3/16/21</a:t>
             </a:fld>
             <a:endParaRPr lang="en-US" dirty="0"/>
           </a:p>
@@ -9962,12 +10125,8 @@
           <a:lstStyle/>
           <a:p>
             <a:r>
-              <a:rPr lang="en-US" u="sng" dirty="0"/>
-              <a:t>Proposal #2</a:t>
-            </a:r>
-            <a:r>
               <a:rPr lang="en-US" dirty="0"/>
-              <a:t>: Authorize A Budget of $131M or $93M</a:t>
+              <a:t>Model Fit Against Living Sq. Ft.</a:t>
             </a:r>
           </a:p>
         </p:txBody>
@@ -10019,17 +10178,54 @@
                 <a:latin typeface="Segoe UI" panose="020B0502040204020203" pitchFamily="34" charset="0"/>
                 <a:cs typeface="Segoe UI" panose="020B0502040204020203" pitchFamily="34" charset="0"/>
               </a:rPr>
-              <a:t>Minimum Budget</a:t>
+              <a:t>Linear Model</a:t>
+            </a:r>
+          </a:p>
+        </p:txBody>
+      </p:sp>
+      <p:sp>
+        <p:nvSpPr>
+          <p:cNvPr id="21" name="Footer Placeholder 2">
+            <a:extLst>
+              <a:ext uri="{FF2B5EF4-FFF2-40B4-BE49-F238E27FC236}">
+                <a16:creationId xmlns:a16="http://schemas.microsoft.com/office/drawing/2014/main" id="{59AD246D-245A-C94F-A5DE-9FDD7873A7FB}"/>
+              </a:ext>
+            </a:extLst>
+          </p:cNvPr>
+          <p:cNvSpPr>
+            <a:spLocks noGrp="1"/>
+          </p:cNvSpPr>
+          <p:nvPr>
+            <p:ph type="ftr" sz="quarter" idx="11"/>
+          </p:nvPr>
+        </p:nvSpPr>
+        <p:spPr>
+          <a:xfrm>
+            <a:off x="4140862" y="6510505"/>
+            <a:ext cx="4114800" cy="345796"/>
+          </a:xfrm>
+        </p:spPr>
+        <p:txBody>
+          <a:bodyPr/>
+          <a:lstStyle/>
+          <a:p>
+            <a:pPr algn="ctr"/>
+            <a:r>
+              <a:rPr lang="en-US" dirty="0">
+                <a:latin typeface="Segoe UI" panose="020B0502040204020203" pitchFamily="34" charset="0"/>
+                <a:cs typeface="Segoe UI" panose="020B0502040204020203" pitchFamily="34" charset="0"/>
+              </a:rPr>
+              <a:t>Flatiron Data Science Bootcamp Project </a:t>
             </a:r>
           </a:p>
         </p:txBody>
       </p:sp>
       <p:pic>
         <p:nvPicPr>
-          <p:cNvPr id="9" name="Picture 8" descr="Chart, histogram&#10;&#10;Description automatically generated">
+          <p:cNvPr id="7" name="Picture 6" descr="Chart, scatter chart&#10;&#10;Description automatically generated">
             <a:extLst>
               <a:ext uri="{FF2B5EF4-FFF2-40B4-BE49-F238E27FC236}">
-                <a16:creationId xmlns:a16="http://schemas.microsoft.com/office/drawing/2014/main" id="{948032B2-5B6A-9647-A634-35363389CCC5}"/>
+                <a16:creationId xmlns:a16="http://schemas.microsoft.com/office/drawing/2014/main" id="{019A4AC9-0345-FE4A-821E-C7F25E287756}"/>
               </a:ext>
             </a:extLst>
           </p:cNvPr>
@@ -10052,524 +10248,18 @@
         </p:blipFill>
         <p:spPr>
           <a:xfrm>
-            <a:off x="1220752" y="1367800"/>
-            <a:ext cx="9774986" cy="3194260"/>
+            <a:off x="1341925" y="908696"/>
+            <a:ext cx="6614548" cy="5279502"/>
           </a:xfrm>
           <a:prstGeom prst="rect">
             <a:avLst/>
           </a:prstGeom>
         </p:spPr>
       </p:pic>
-      <p:sp>
-        <p:nvSpPr>
-          <p:cNvPr id="12" name="Rectangle 11">
-            <a:extLst>
-              <a:ext uri="{FF2B5EF4-FFF2-40B4-BE49-F238E27FC236}">
-                <a16:creationId xmlns:a16="http://schemas.microsoft.com/office/drawing/2014/main" id="{90D14EAE-B128-7440-94F3-F24EB4B45668}"/>
-              </a:ext>
-            </a:extLst>
-          </p:cNvPr>
-          <p:cNvSpPr/>
-          <p:nvPr/>
-        </p:nvSpPr>
-        <p:spPr>
-          <a:xfrm>
-            <a:off x="2554357" y="1560443"/>
-            <a:ext cx="279044" cy="2643809"/>
-          </a:xfrm>
-          <a:prstGeom prst="rect">
-            <a:avLst/>
-          </a:prstGeom>
-          <a:noFill/>
-          <a:ln w="28575">
-            <a:solidFill>
-              <a:schemeClr val="tx1"/>
-            </a:solidFill>
-          </a:ln>
-        </p:spPr>
-        <p:style>
-          <a:lnRef idx="2">
-            <a:schemeClr val="accent1">
-              <a:shade val="50000"/>
-            </a:schemeClr>
-          </a:lnRef>
-          <a:fillRef idx="1">
-            <a:schemeClr val="accent1"/>
-          </a:fillRef>
-          <a:effectRef idx="0">
-            <a:schemeClr val="accent1"/>
-          </a:effectRef>
-          <a:fontRef idx="minor">
-            <a:schemeClr val="lt1"/>
-          </a:fontRef>
-        </p:style>
-        <p:txBody>
-          <a:bodyPr rtlCol="0" anchor="ctr"/>
-          <a:lstStyle/>
-          <a:p>
-            <a:pPr algn="ctr"/>
-            <a:endParaRPr lang="en-US" dirty="0"/>
-          </a:p>
-        </p:txBody>
-      </p:sp>
-      <p:sp>
-        <p:nvSpPr>
-          <p:cNvPr id="18" name="Rectangle 17">
-            <a:extLst>
-              <a:ext uri="{FF2B5EF4-FFF2-40B4-BE49-F238E27FC236}">
-                <a16:creationId xmlns:a16="http://schemas.microsoft.com/office/drawing/2014/main" id="{9782CDB9-9B3C-7742-BD6C-7298E141781F}"/>
-              </a:ext>
-            </a:extLst>
-          </p:cNvPr>
-          <p:cNvSpPr/>
-          <p:nvPr/>
-        </p:nvSpPr>
-        <p:spPr>
-          <a:xfrm>
-            <a:off x="5430079" y="1560442"/>
-            <a:ext cx="279045" cy="2643809"/>
-          </a:xfrm>
-          <a:prstGeom prst="rect">
-            <a:avLst/>
-          </a:prstGeom>
-          <a:noFill/>
-          <a:ln w="28575">
-            <a:solidFill>
-              <a:schemeClr val="tx1"/>
-            </a:solidFill>
-          </a:ln>
-        </p:spPr>
-        <p:style>
-          <a:lnRef idx="2">
-            <a:schemeClr val="accent1">
-              <a:shade val="50000"/>
-            </a:schemeClr>
-          </a:lnRef>
-          <a:fillRef idx="1">
-            <a:schemeClr val="accent1"/>
-          </a:fillRef>
-          <a:effectRef idx="0">
-            <a:schemeClr val="accent1"/>
-          </a:effectRef>
-          <a:fontRef idx="minor">
-            <a:schemeClr val="lt1"/>
-          </a:fontRef>
-        </p:style>
-        <p:txBody>
-          <a:bodyPr rtlCol="0" anchor="ctr"/>
-          <a:lstStyle/>
-          <a:p>
-            <a:pPr algn="ctr"/>
-            <a:endParaRPr lang="en-US" dirty="0"/>
-          </a:p>
-        </p:txBody>
-      </p:sp>
-      <p:sp>
-        <p:nvSpPr>
-          <p:cNvPr id="15" name="TextBox 14">
-            <a:extLst>
-              <a:ext uri="{FF2B5EF4-FFF2-40B4-BE49-F238E27FC236}">
-                <a16:creationId xmlns:a16="http://schemas.microsoft.com/office/drawing/2014/main" id="{4659BD08-4E8A-E04A-916E-4B80A2DF4832}"/>
-              </a:ext>
-            </a:extLst>
-          </p:cNvPr>
-          <p:cNvSpPr txBox="1"/>
-          <p:nvPr/>
-        </p:nvSpPr>
-        <p:spPr>
-          <a:xfrm>
-            <a:off x="6108246" y="2575041"/>
-            <a:ext cx="806631" cy="646331"/>
-          </a:xfrm>
-          <a:prstGeom prst="rect">
-            <a:avLst/>
-          </a:prstGeom>
-          <a:noFill/>
-        </p:spPr>
-        <p:txBody>
-          <a:bodyPr wrap="none" rtlCol="0">
-            <a:spAutoFit/>
-          </a:bodyPr>
-          <a:lstStyle/>
-          <a:p>
-            <a:pPr algn="ctr"/>
-            <a:r>
-              <a:rPr lang="en-US" sz="1200" dirty="0">
-                <a:latin typeface="Segoe UI" panose="020B0502040204020203" pitchFamily="34" charset="0"/>
-                <a:cs typeface="Segoe UI" panose="020B0502040204020203" pitchFamily="34" charset="0"/>
-              </a:rPr>
-              <a:t>Target</a:t>
-            </a:r>
-          </a:p>
-          <a:p>
-            <a:pPr algn="ctr"/>
-            <a:r>
-              <a:rPr lang="en-US" sz="1200" dirty="0">
-                <a:latin typeface="Segoe UI" panose="020B0502040204020203" pitchFamily="34" charset="0"/>
-                <a:cs typeface="Segoe UI" panose="020B0502040204020203" pitchFamily="34" charset="0"/>
-              </a:rPr>
-              <a:t>$93M </a:t>
-            </a:r>
-          </a:p>
-          <a:p>
-            <a:pPr algn="ctr"/>
-            <a:r>
-              <a:rPr lang="en-US" sz="1200" dirty="0">
-                <a:latin typeface="Segoe UI" panose="020B0502040204020203" pitchFamily="34" charset="0"/>
-                <a:cs typeface="Segoe UI" panose="020B0502040204020203" pitchFamily="34" charset="0"/>
-              </a:rPr>
-              <a:t>Midpoint</a:t>
-            </a:r>
-          </a:p>
-        </p:txBody>
-      </p:sp>
-      <p:cxnSp>
-        <p:nvCxnSpPr>
-          <p:cNvPr id="40" name="Straight Connector 39">
-            <a:extLst>
-              <a:ext uri="{FF2B5EF4-FFF2-40B4-BE49-F238E27FC236}">
-                <a16:creationId xmlns:a16="http://schemas.microsoft.com/office/drawing/2014/main" id="{E125A894-9BB9-0340-96EF-F9B3E39DB6A6}"/>
-              </a:ext>
-            </a:extLst>
-          </p:cNvPr>
-          <p:cNvCxnSpPr>
-            <a:cxnSpLocks/>
-          </p:cNvCxnSpPr>
-          <p:nvPr/>
-        </p:nvCxnSpPr>
-        <p:spPr>
-          <a:xfrm>
-            <a:off x="5709124" y="2882347"/>
-            <a:ext cx="502770" cy="0"/>
-          </a:xfrm>
-          <a:prstGeom prst="line">
-            <a:avLst/>
-          </a:prstGeom>
-          <a:ln w="19050">
-            <a:solidFill>
-              <a:schemeClr val="tx1"/>
-            </a:solidFill>
-          </a:ln>
-        </p:spPr>
-        <p:style>
-          <a:lnRef idx="1">
-            <a:schemeClr val="accent1"/>
-          </a:lnRef>
-          <a:fillRef idx="0">
-            <a:schemeClr val="accent1"/>
-          </a:fillRef>
-          <a:effectRef idx="0">
-            <a:schemeClr val="accent1"/>
-          </a:effectRef>
-          <a:fontRef idx="minor">
-            <a:schemeClr val="tx1"/>
-          </a:fontRef>
-        </p:style>
-      </p:cxnSp>
-      <p:sp>
-        <p:nvSpPr>
-          <p:cNvPr id="43" name="TextBox 42">
-            <a:extLst>
-              <a:ext uri="{FF2B5EF4-FFF2-40B4-BE49-F238E27FC236}">
-                <a16:creationId xmlns:a16="http://schemas.microsoft.com/office/drawing/2014/main" id="{BD9791B3-A092-C243-8554-0D7210534D5A}"/>
-              </a:ext>
-            </a:extLst>
-          </p:cNvPr>
-          <p:cNvSpPr txBox="1"/>
-          <p:nvPr/>
-        </p:nvSpPr>
-        <p:spPr>
-          <a:xfrm>
-            <a:off x="3176951" y="2575041"/>
-            <a:ext cx="806631" cy="646331"/>
-          </a:xfrm>
-          <a:prstGeom prst="rect">
-            <a:avLst/>
-          </a:prstGeom>
-          <a:noFill/>
-        </p:spPr>
-        <p:txBody>
-          <a:bodyPr wrap="none" rtlCol="0">
-            <a:spAutoFit/>
-          </a:bodyPr>
-          <a:lstStyle/>
-          <a:p>
-            <a:pPr algn="ctr"/>
-            <a:r>
-              <a:rPr lang="en-US" sz="1200" dirty="0">
-                <a:latin typeface="Segoe UI" panose="020B0502040204020203" pitchFamily="34" charset="0"/>
-                <a:cs typeface="Segoe UI" panose="020B0502040204020203" pitchFamily="34" charset="0"/>
-              </a:rPr>
-              <a:t>Target</a:t>
-            </a:r>
-          </a:p>
-          <a:p>
-            <a:pPr algn="ctr"/>
-            <a:r>
-              <a:rPr lang="en-US" sz="1200" dirty="0">
-                <a:latin typeface="Segoe UI" panose="020B0502040204020203" pitchFamily="34" charset="0"/>
-                <a:cs typeface="Segoe UI" panose="020B0502040204020203" pitchFamily="34" charset="0"/>
-              </a:rPr>
-              <a:t>$131M </a:t>
-            </a:r>
-          </a:p>
-          <a:p>
-            <a:pPr algn="ctr"/>
-            <a:r>
-              <a:rPr lang="en-US" sz="1200" dirty="0">
-                <a:latin typeface="Segoe UI" panose="020B0502040204020203" pitchFamily="34" charset="0"/>
-                <a:cs typeface="Segoe UI" panose="020B0502040204020203" pitchFamily="34" charset="0"/>
-              </a:rPr>
-              <a:t>Midpoint</a:t>
-            </a:r>
-          </a:p>
-        </p:txBody>
-      </p:sp>
-      <p:cxnSp>
-        <p:nvCxnSpPr>
-          <p:cNvPr id="44" name="Straight Connector 43">
-            <a:extLst>
-              <a:ext uri="{FF2B5EF4-FFF2-40B4-BE49-F238E27FC236}">
-                <a16:creationId xmlns:a16="http://schemas.microsoft.com/office/drawing/2014/main" id="{EDE9248D-4D7C-0241-9113-B3F641DE7832}"/>
-              </a:ext>
-            </a:extLst>
-          </p:cNvPr>
-          <p:cNvCxnSpPr>
-            <a:cxnSpLocks/>
-          </p:cNvCxnSpPr>
-          <p:nvPr/>
-        </p:nvCxnSpPr>
-        <p:spPr>
-          <a:xfrm>
-            <a:off x="2833401" y="2882347"/>
-            <a:ext cx="447198" cy="0"/>
-          </a:xfrm>
-          <a:prstGeom prst="line">
-            <a:avLst/>
-          </a:prstGeom>
-          <a:ln w="19050">
-            <a:solidFill>
-              <a:schemeClr val="tx1"/>
-            </a:solidFill>
-          </a:ln>
-        </p:spPr>
-        <p:style>
-          <a:lnRef idx="1">
-            <a:schemeClr val="accent1"/>
-          </a:lnRef>
-          <a:fillRef idx="0">
-            <a:schemeClr val="accent1"/>
-          </a:fillRef>
-          <a:effectRef idx="0">
-            <a:schemeClr val="accent1"/>
-          </a:effectRef>
-          <a:fontRef idx="minor">
-            <a:schemeClr val="tx1"/>
-          </a:fontRef>
-        </p:style>
-      </p:cxnSp>
-      <p:sp>
-        <p:nvSpPr>
-          <p:cNvPr id="47" name="TextBox 46">
-            <a:extLst>
-              <a:ext uri="{FF2B5EF4-FFF2-40B4-BE49-F238E27FC236}">
-                <a16:creationId xmlns:a16="http://schemas.microsoft.com/office/drawing/2014/main" id="{E57AF6AD-F9CC-3F4C-AB31-96799511E2D8}"/>
-              </a:ext>
-            </a:extLst>
-          </p:cNvPr>
-          <p:cNvSpPr txBox="1"/>
-          <p:nvPr/>
-        </p:nvSpPr>
-        <p:spPr>
-          <a:xfrm>
-            <a:off x="6315940" y="4775487"/>
-            <a:ext cx="5553687" cy="1538883"/>
-          </a:xfrm>
-          <a:prstGeom prst="rect">
-            <a:avLst/>
-          </a:prstGeom>
-          <a:noFill/>
-        </p:spPr>
-        <p:txBody>
-          <a:bodyPr wrap="square" rtlCol="0">
-            <a:spAutoFit/>
-          </a:bodyPr>
-          <a:lstStyle/>
-          <a:p>
-            <a:r>
-              <a:rPr lang="en-US" sz="1600" b="1" i="1" dirty="0">
-                <a:latin typeface="Segoe UI" panose="020B0502040204020203" pitchFamily="34" charset="0"/>
-                <a:cs typeface="Segoe UI" panose="020B0502040204020203" pitchFamily="34" charset="0"/>
-              </a:rPr>
-              <a:t>** Smaller production budgets correlate with higher movie loss rates **</a:t>
-            </a:r>
-          </a:p>
-          <a:p>
-            <a:endParaRPr lang="en-US" sz="1200" dirty="0">
-              <a:latin typeface="Segoe UI" panose="020B0502040204020203" pitchFamily="34" charset="0"/>
-              <a:cs typeface="Segoe UI" panose="020B0502040204020203" pitchFamily="34" charset="0"/>
-            </a:endParaRPr>
-          </a:p>
-          <a:p>
-            <a:r>
-              <a:rPr lang="en-US" sz="1200" dirty="0">
-                <a:solidFill>
-                  <a:schemeClr val="bg1">
-                    <a:lumMod val="50000"/>
-                  </a:schemeClr>
-                </a:solidFill>
-                <a:latin typeface="Segoe UI" panose="020B0502040204020203" pitchFamily="34" charset="0"/>
-                <a:cs typeface="Segoe UI" panose="020B0502040204020203" pitchFamily="34" charset="0"/>
-              </a:rPr>
-              <a:t>Super-Genre groups genres into similar categories</a:t>
-            </a:r>
-          </a:p>
-          <a:p>
-            <a:pPr marL="285750" indent="-285750">
-              <a:buFont typeface="Arial" panose="020B0604020202020204" pitchFamily="34" charset="0"/>
-              <a:buChar char="•"/>
-            </a:pPr>
-            <a:r>
-              <a:rPr lang="en-US" sz="1200" dirty="0">
-                <a:solidFill>
-                  <a:schemeClr val="bg1">
-                    <a:lumMod val="50000"/>
-                  </a:schemeClr>
-                </a:solidFill>
-                <a:latin typeface="Segoe UI" panose="020B0502040204020203" pitchFamily="34" charset="0"/>
-                <a:cs typeface="Segoe UI" panose="020B0502040204020203" pitchFamily="34" charset="0"/>
-              </a:rPr>
-              <a:t>Special: Action, Sci-Fi, Thriller, Mystery, Adventure, Fantasy</a:t>
-            </a:r>
-          </a:p>
-          <a:p>
-            <a:pPr marL="285750" indent="-285750">
-              <a:buFont typeface="Arial" panose="020B0604020202020204" pitchFamily="34" charset="0"/>
-              <a:buChar char="•"/>
-            </a:pPr>
-            <a:r>
-              <a:rPr lang="en-US" sz="1200" dirty="0">
-                <a:solidFill>
-                  <a:schemeClr val="bg1">
-                    <a:lumMod val="50000"/>
-                  </a:schemeClr>
-                </a:solidFill>
-                <a:latin typeface="Segoe UI" panose="020B0502040204020203" pitchFamily="34" charset="0"/>
-                <a:cs typeface="Segoe UI" panose="020B0502040204020203" pitchFamily="34" charset="0"/>
-              </a:rPr>
-              <a:t>Traditional: Animation, Family, Comedy, Drama, Crime, Romance</a:t>
-            </a:r>
-          </a:p>
-          <a:p>
-            <a:pPr marL="285750" indent="-285750">
-              <a:buFont typeface="Arial" panose="020B0604020202020204" pitchFamily="34" charset="0"/>
-              <a:buChar char="•"/>
-            </a:pPr>
-            <a:r>
-              <a:rPr lang="en-US" sz="1200" dirty="0">
-                <a:solidFill>
-                  <a:schemeClr val="bg1">
-                    <a:lumMod val="50000"/>
-                  </a:schemeClr>
-                </a:solidFill>
-                <a:latin typeface="Segoe UI" panose="020B0502040204020203" pitchFamily="34" charset="0"/>
-                <a:cs typeface="Segoe UI" panose="020B0502040204020203" pitchFamily="34" charset="0"/>
-              </a:rPr>
-              <a:t>Reference:  Music, Sport, History, Biography</a:t>
-            </a:r>
-          </a:p>
-        </p:txBody>
-      </p:sp>
-      <p:sp>
-        <p:nvSpPr>
-          <p:cNvPr id="48" name="TextBox 47">
-            <a:extLst>
-              <a:ext uri="{FF2B5EF4-FFF2-40B4-BE49-F238E27FC236}">
-                <a16:creationId xmlns:a16="http://schemas.microsoft.com/office/drawing/2014/main" id="{3698D829-2578-D540-83EC-075F4553FDBC}"/>
-              </a:ext>
-            </a:extLst>
-          </p:cNvPr>
-          <p:cNvSpPr txBox="1"/>
-          <p:nvPr/>
-        </p:nvSpPr>
-        <p:spPr>
-          <a:xfrm>
-            <a:off x="8351338" y="2667374"/>
-            <a:ext cx="1207895" cy="461665"/>
-          </a:xfrm>
-          <a:prstGeom prst="rect">
-            <a:avLst/>
-          </a:prstGeom>
-          <a:noFill/>
-        </p:spPr>
-        <p:txBody>
-          <a:bodyPr wrap="none" rtlCol="0">
-            <a:spAutoFit/>
-          </a:bodyPr>
-          <a:lstStyle/>
-          <a:p>
-            <a:pPr algn="ctr"/>
-            <a:r>
-              <a:rPr lang="en-US" sz="1200" dirty="0">
-                <a:latin typeface="Segoe UI" panose="020B0502040204020203" pitchFamily="34" charset="0"/>
-                <a:cs typeface="Segoe UI" panose="020B0502040204020203" pitchFamily="34" charset="0"/>
-              </a:rPr>
-              <a:t>Not </a:t>
-            </a:r>
-          </a:p>
-          <a:p>
-            <a:pPr algn="ctr"/>
-            <a:r>
-              <a:rPr lang="en-US" sz="1200" dirty="0">
-                <a:latin typeface="Segoe UI" panose="020B0502040204020203" pitchFamily="34" charset="0"/>
-                <a:cs typeface="Segoe UI" panose="020B0502040204020203" pitchFamily="34" charset="0"/>
-              </a:rPr>
-              <a:t>Recommended</a:t>
-            </a:r>
-          </a:p>
-        </p:txBody>
-      </p:sp>
-      <p:sp>
-        <p:nvSpPr>
-          <p:cNvPr id="49" name="Footer Placeholder 2">
-            <a:extLst>
-              <a:ext uri="{FF2B5EF4-FFF2-40B4-BE49-F238E27FC236}">
-                <a16:creationId xmlns:a16="http://schemas.microsoft.com/office/drawing/2014/main" id="{3CD717EC-34C3-7644-90BF-4C1AA25D8E4A}"/>
-              </a:ext>
-            </a:extLst>
-          </p:cNvPr>
-          <p:cNvSpPr>
-            <a:spLocks noGrp="1"/>
-          </p:cNvSpPr>
-          <p:nvPr>
-            <p:ph type="ftr" sz="quarter" idx="11"/>
-          </p:nvPr>
-        </p:nvSpPr>
-        <p:spPr>
-          <a:xfrm>
-            <a:off x="4140862" y="6510505"/>
-            <a:ext cx="4114800" cy="345796"/>
-          </a:xfrm>
-        </p:spPr>
-        <p:txBody>
-          <a:bodyPr/>
-          <a:lstStyle/>
-          <a:p>
-            <a:pPr algn="ctr"/>
-            <a:r>
-              <a:rPr lang="en-US" dirty="0">
-                <a:latin typeface="Segoe UI" panose="020B0502040204020203" pitchFamily="34" charset="0"/>
-                <a:cs typeface="Segoe UI" panose="020B0502040204020203" pitchFamily="34" charset="0"/>
-              </a:rPr>
-              <a:t>Flatiron Data Science Bootcamp Project </a:t>
-            </a:r>
-          </a:p>
-        </p:txBody>
-      </p:sp>
     </p:spTree>
     <p:extLst>
       <p:ext uri="{BB962C8B-B14F-4D97-AF65-F5344CB8AC3E}">
-        <p14:creationId xmlns:p14="http://schemas.microsoft.com/office/powerpoint/2010/main" val="891971909"/>
+        <p14:creationId xmlns:p14="http://schemas.microsoft.com/office/powerpoint/2010/main" val="1914768012"/>
       </p:ext>
     </p:extLst>
   </p:cSld>
@@ -10580,541 +10270,6 @@
 </file>
 
 <file path=ppt/slides/slide7.xml><?xml version="1.0" encoding="utf-8"?>
-<p:sld xmlns:a="http://schemas.openxmlformats.org/drawingml/2006/main" xmlns:r="http://schemas.openxmlformats.org/officeDocument/2006/relationships" xmlns:p="http://schemas.openxmlformats.org/presentationml/2006/main">
-  <p:cSld>
-    <p:spTree>
-      <p:nvGrpSpPr>
-        <p:cNvPr id="1" name=""/>
-        <p:cNvGrpSpPr/>
-        <p:nvPr/>
-      </p:nvGrpSpPr>
-      <p:grpSpPr>
-        <a:xfrm>
-          <a:off x="0" y="0"/>
-          <a:ext cx="0" cy="0"/>
-          <a:chOff x="0" y="0"/>
-          <a:chExt cx="0" cy="0"/>
-        </a:xfrm>
-      </p:grpSpPr>
-      <p:sp>
-        <p:nvSpPr>
-          <p:cNvPr id="10" name="TextBox 9"/>
-          <p:cNvSpPr txBox="1"/>
-          <p:nvPr/>
-        </p:nvSpPr>
-        <p:spPr>
-          <a:xfrm>
-            <a:off x="8639741" y="1214208"/>
-            <a:ext cx="2941983" cy="4985980"/>
-          </a:xfrm>
-          <a:prstGeom prst="rect">
-            <a:avLst/>
-          </a:prstGeom>
-          <a:noFill/>
-        </p:spPr>
-        <p:txBody>
-          <a:bodyPr wrap="square" rtlCol="0">
-            <a:spAutoFit/>
-          </a:bodyPr>
-          <a:lstStyle/>
-          <a:p>
-            <a:pPr marL="285750" indent="-285750">
-              <a:buFont typeface="Arial" panose="020B0604020202020204" pitchFamily="34" charset="0"/>
-              <a:buChar char="•"/>
-            </a:pPr>
-            <a:r>
-              <a:rPr lang="en-US" dirty="0">
-                <a:latin typeface="Segoe UI" panose="020B0502040204020203" pitchFamily="34" charset="0"/>
-                <a:cs typeface="Segoe UI" panose="020B0502040204020203" pitchFamily="34" charset="0"/>
-              </a:rPr>
-              <a:t>Profits are highly correlated (0.98) with worldwide gross sales</a:t>
-            </a:r>
-          </a:p>
-          <a:p>
-            <a:pPr marL="285750" indent="-285750">
-              <a:buFont typeface="Arial" panose="020B0604020202020204" pitchFamily="34" charset="0"/>
-              <a:buChar char="•"/>
-            </a:pPr>
-            <a:endParaRPr lang="en-US" dirty="0">
-              <a:latin typeface="Segoe UI" panose="020B0502040204020203" pitchFamily="34" charset="0"/>
-              <a:cs typeface="Segoe UI" panose="020B0502040204020203" pitchFamily="34" charset="0"/>
-            </a:endParaRPr>
-          </a:p>
-          <a:p>
-            <a:pPr marL="285750" indent="-285750">
-              <a:buFont typeface="Arial" panose="020B0604020202020204" pitchFamily="34" charset="0"/>
-              <a:buChar char="•"/>
-            </a:pPr>
-            <a:r>
-              <a:rPr lang="en-US" dirty="0">
-                <a:latin typeface="Segoe UI" panose="020B0502040204020203" pitchFamily="34" charset="0"/>
-                <a:cs typeface="Segoe UI" panose="020B0502040204020203" pitchFamily="34" charset="0"/>
-              </a:rPr>
-              <a:t>Top 20 actor’s average</a:t>
-            </a:r>
-          </a:p>
-          <a:p>
-            <a:pPr marL="742950" lvl="1" indent="-285750">
-              <a:buFont typeface="Courier New" panose="02070309020205020404" pitchFamily="49" charset="0"/>
-              <a:buChar char="o"/>
-            </a:pPr>
-            <a:r>
-              <a:rPr lang="en-US" dirty="0">
-                <a:latin typeface="Segoe UI" panose="020B0502040204020203" pitchFamily="34" charset="0"/>
-                <a:cs typeface="Segoe UI" panose="020B0502040204020203" pitchFamily="34" charset="0"/>
-              </a:rPr>
-              <a:t>11 movies</a:t>
-            </a:r>
-          </a:p>
-          <a:p>
-            <a:pPr marL="742950" lvl="1" indent="-285750">
-              <a:buFont typeface="Courier New" panose="02070309020205020404" pitchFamily="49" charset="0"/>
-              <a:buChar char="o"/>
-            </a:pPr>
-            <a:r>
-              <a:rPr lang="en-US" dirty="0">
-                <a:latin typeface="Segoe UI" panose="020B0502040204020203" pitchFamily="34" charset="0"/>
-                <a:cs typeface="Segoe UI" panose="020B0502040204020203" pitchFamily="34" charset="0"/>
-              </a:rPr>
-              <a:t>$3.9B sales</a:t>
-            </a:r>
-          </a:p>
-          <a:p>
-            <a:pPr marL="285750" indent="-285750">
-              <a:buFont typeface="Arial" panose="020B0604020202020204" pitchFamily="34" charset="0"/>
-              <a:buChar char="•"/>
-            </a:pPr>
-            <a:endParaRPr lang="en-US" dirty="0">
-              <a:latin typeface="Segoe UI" panose="020B0502040204020203" pitchFamily="34" charset="0"/>
-              <a:cs typeface="Segoe UI" panose="020B0502040204020203" pitchFamily="34" charset="0"/>
-            </a:endParaRPr>
-          </a:p>
-          <a:p>
-            <a:pPr marL="285750" indent="-285750">
-              <a:buFont typeface="Arial" panose="020B0604020202020204" pitchFamily="34" charset="0"/>
-              <a:buChar char="•"/>
-            </a:pPr>
-            <a:r>
-              <a:rPr lang="en-US" dirty="0">
-                <a:latin typeface="Segoe UI" panose="020B0502040204020203" pitchFamily="34" charset="0"/>
-                <a:cs typeface="Segoe UI" panose="020B0502040204020203" pitchFamily="34" charset="0"/>
-              </a:rPr>
-              <a:t>Top Actors Benefits</a:t>
-            </a:r>
-          </a:p>
-          <a:p>
-            <a:pPr marL="742950" lvl="1" indent="-285750">
-              <a:buFont typeface="Courier New" panose="02070309020205020404" pitchFamily="49" charset="0"/>
-              <a:buChar char="o"/>
-            </a:pPr>
-            <a:r>
-              <a:rPr lang="en-US" sz="1600" dirty="0">
-                <a:latin typeface="Segoe UI" panose="020B0502040204020203" pitchFamily="34" charset="0"/>
-                <a:cs typeface="Segoe UI" panose="020B0502040204020203" pitchFamily="34" charset="0"/>
-              </a:rPr>
-              <a:t>Consistency</a:t>
-            </a:r>
-          </a:p>
-          <a:p>
-            <a:pPr marL="742950" lvl="1" indent="-285750">
-              <a:buFont typeface="Courier New" panose="02070309020205020404" pitchFamily="49" charset="0"/>
-              <a:buChar char="o"/>
-            </a:pPr>
-            <a:r>
-              <a:rPr lang="en-US" sz="1600" dirty="0">
-                <a:latin typeface="Segoe UI" panose="020B0502040204020203" pitchFamily="34" charset="0"/>
-                <a:cs typeface="Segoe UI" panose="020B0502040204020203" pitchFamily="34" charset="0"/>
-              </a:rPr>
-              <a:t>Consumer favorites</a:t>
-            </a:r>
-          </a:p>
-          <a:p>
-            <a:pPr marL="742950" lvl="1" indent="-285750">
-              <a:buFont typeface="Courier New" panose="02070309020205020404" pitchFamily="49" charset="0"/>
-              <a:buChar char="o"/>
-            </a:pPr>
-            <a:r>
-              <a:rPr lang="en-US" sz="1600" dirty="0">
-                <a:latin typeface="Segoe UI" panose="020B0502040204020203" pitchFamily="34" charset="0"/>
-                <a:cs typeface="Segoe UI" panose="020B0502040204020203" pitchFamily="34" charset="0"/>
-              </a:rPr>
-              <a:t>Franchise players</a:t>
-            </a:r>
-          </a:p>
-          <a:p>
-            <a:pPr marL="742950" lvl="1" indent="-285750">
-              <a:buFont typeface="Courier New" panose="02070309020205020404" pitchFamily="49" charset="0"/>
-              <a:buChar char="o"/>
-            </a:pPr>
-            <a:r>
-              <a:rPr lang="en-US" sz="1600" dirty="0">
-                <a:latin typeface="Segoe UI" panose="020B0502040204020203" pitchFamily="34" charset="0"/>
-                <a:cs typeface="Segoe UI" panose="020B0502040204020203" pitchFamily="34" charset="0"/>
-              </a:rPr>
-              <a:t>Marketing lift</a:t>
-            </a:r>
-          </a:p>
-          <a:p>
-            <a:pPr marL="742950" lvl="1" indent="-285750">
-              <a:buFont typeface="Courier New" panose="02070309020205020404" pitchFamily="49" charset="0"/>
-              <a:buChar char="o"/>
-            </a:pPr>
-            <a:endParaRPr lang="en-US" sz="1600" dirty="0">
-              <a:latin typeface="Segoe UI" panose="020B0502040204020203" pitchFamily="34" charset="0"/>
-              <a:cs typeface="Segoe UI" panose="020B0502040204020203" pitchFamily="34" charset="0"/>
-            </a:endParaRPr>
-          </a:p>
-          <a:p>
-            <a:pPr marL="285750" indent="-285750">
-              <a:buFont typeface="Arial" panose="020B0604020202020204" pitchFamily="34" charset="0"/>
-              <a:buChar char="•"/>
-            </a:pPr>
-            <a:r>
-              <a:rPr lang="en-US" dirty="0">
-                <a:latin typeface="Segoe UI" panose="020B0502040204020203" pitchFamily="34" charset="0"/>
-                <a:cs typeface="Segoe UI" panose="020B0502040204020203" pitchFamily="34" charset="0"/>
-              </a:rPr>
-              <a:t>Most Consistent Actors </a:t>
-            </a:r>
-            <a:r>
-              <a:rPr lang="en-US" sz="1400" dirty="0">
-                <a:latin typeface="Segoe UI" panose="020B0502040204020203" pitchFamily="34" charset="0"/>
-                <a:cs typeface="Segoe UI" panose="020B0502040204020203" pitchFamily="34" charset="0"/>
-              </a:rPr>
-              <a:t>Andy Serkis , Ian McKellen, Josh Hutcherson, Vin Diesel, Robert Downey Jr., Tom Cruise</a:t>
-            </a:r>
-          </a:p>
-          <a:p>
-            <a:pPr marL="742950" lvl="1" indent="-285750">
-              <a:buFont typeface="Courier New" panose="02070309020205020404" pitchFamily="49" charset="0"/>
-              <a:buChar char="o"/>
-            </a:pPr>
-            <a:endParaRPr lang="en-US" sz="1600" dirty="0">
-              <a:latin typeface="Segoe UI" panose="020B0502040204020203" pitchFamily="34" charset="0"/>
-              <a:cs typeface="Segoe UI" panose="020B0502040204020203" pitchFamily="34" charset="0"/>
-            </a:endParaRPr>
-          </a:p>
-        </p:txBody>
-      </p:sp>
-      <p:sp>
-        <p:nvSpPr>
-          <p:cNvPr id="11" name="Date Placeholder 1"/>
-          <p:cNvSpPr>
-            <a:spLocks noGrp="1"/>
-          </p:cNvSpPr>
-          <p:nvPr>
-            <p:ph type="dt" sz="half" idx="10"/>
-          </p:nvPr>
-        </p:nvSpPr>
-        <p:spPr>
-          <a:xfrm>
-            <a:off x="735856" y="6510505"/>
-            <a:ext cx="846754" cy="348463"/>
-          </a:xfrm>
-        </p:spPr>
-        <p:txBody>
-          <a:bodyPr/>
-          <a:lstStyle/>
-          <a:p>
-            <a:fld id="{176B1F7D-A64B-4A90-8D4F-4ED41DDBE69A}" type="datetime1">
-              <a:rPr lang="en-US" smtClean="0"/>
-              <a:t>3/15/21</a:t>
-            </a:fld>
-            <a:endParaRPr lang="en-US" dirty="0"/>
-          </a:p>
-        </p:txBody>
-      </p:sp>
-      <p:sp>
-        <p:nvSpPr>
-          <p:cNvPr id="14" name="Slide Number Placeholder 3"/>
-          <p:cNvSpPr>
-            <a:spLocks noGrp="1"/>
-          </p:cNvSpPr>
-          <p:nvPr>
-            <p:ph type="sldNum" sz="quarter" idx="12"/>
-          </p:nvPr>
-        </p:nvSpPr>
-        <p:spPr>
-          <a:xfrm>
-            <a:off x="11518163" y="6511838"/>
-            <a:ext cx="351464" cy="345796"/>
-          </a:xfrm>
-        </p:spPr>
-        <p:txBody>
-          <a:bodyPr/>
-          <a:lstStyle/>
-          <a:p>
-            <a:fld id="{2677B570-5BCE-435F-8FE4-883586746873}" type="slidenum">
-              <a:rPr lang="en-US" smtClean="0"/>
-              <a:t>7</a:t>
-            </a:fld>
-            <a:endParaRPr lang="en-US" dirty="0"/>
-          </a:p>
-        </p:txBody>
-      </p:sp>
-      <p:sp>
-        <p:nvSpPr>
-          <p:cNvPr id="5" name="Title 4"/>
-          <p:cNvSpPr>
-            <a:spLocks noGrp="1"/>
-          </p:cNvSpPr>
-          <p:nvPr>
-            <p:ph type="title"/>
-          </p:nvPr>
-        </p:nvSpPr>
-        <p:spPr/>
-        <p:txBody>
-          <a:bodyPr/>
-          <a:lstStyle/>
-          <a:p>
-            <a:r>
-              <a:rPr lang="en-US" u="sng" dirty="0"/>
-              <a:t>Proposal #3</a:t>
-            </a:r>
-            <a:r>
-              <a:rPr lang="en-US" dirty="0"/>
-              <a:t>: Strike a deal with one of the Top 20 actors</a:t>
-            </a:r>
-          </a:p>
-        </p:txBody>
-      </p:sp>
-      <p:sp>
-        <p:nvSpPr>
-          <p:cNvPr id="16" name="Rounded Rectangle 15"/>
-          <p:cNvSpPr/>
-          <p:nvPr/>
-        </p:nvSpPr>
-        <p:spPr>
-          <a:xfrm>
-            <a:off x="10841181" y="315192"/>
-            <a:ext cx="990600" cy="471053"/>
-          </a:xfrm>
-          <a:prstGeom prst="roundRect">
-            <a:avLst/>
-          </a:prstGeom>
-          <a:solidFill>
-            <a:schemeClr val="tx1"/>
-          </a:solidFill>
-          <a:ln>
-            <a:noFill/>
-          </a:ln>
-        </p:spPr>
-        <p:style>
-          <a:lnRef idx="2">
-            <a:schemeClr val="accent1">
-              <a:shade val="50000"/>
-            </a:schemeClr>
-          </a:lnRef>
-          <a:fillRef idx="1">
-            <a:schemeClr val="accent1"/>
-          </a:fillRef>
-          <a:effectRef idx="0">
-            <a:schemeClr val="accent1"/>
-          </a:effectRef>
-          <a:fontRef idx="minor">
-            <a:schemeClr val="lt1"/>
-          </a:fontRef>
-        </p:style>
-        <p:txBody>
-          <a:bodyPr rtlCol="0" anchor="ctr"/>
-          <a:lstStyle/>
-          <a:p>
-            <a:pPr algn="ctr"/>
-            <a:r>
-              <a:rPr lang="en-US" sz="1000" b="1" dirty="0">
-                <a:latin typeface="Segoe UI" panose="020B0502040204020203" pitchFamily="34" charset="0"/>
-                <a:cs typeface="Segoe UI" panose="020B0502040204020203" pitchFamily="34" charset="0"/>
-              </a:rPr>
-              <a:t>Top Actors</a:t>
-            </a:r>
-          </a:p>
-        </p:txBody>
-      </p:sp>
-      <p:sp>
-        <p:nvSpPr>
-          <p:cNvPr id="15" name="Footer Placeholder 2">
-            <a:extLst>
-              <a:ext uri="{FF2B5EF4-FFF2-40B4-BE49-F238E27FC236}">
-                <a16:creationId xmlns:a16="http://schemas.microsoft.com/office/drawing/2014/main" id="{FE7322CB-706C-EF4E-9B1D-66756DB12017}"/>
-              </a:ext>
-            </a:extLst>
-          </p:cNvPr>
-          <p:cNvSpPr>
-            <a:spLocks noGrp="1"/>
-          </p:cNvSpPr>
-          <p:nvPr>
-            <p:ph type="ftr" sz="quarter" idx="11"/>
-          </p:nvPr>
-        </p:nvSpPr>
-        <p:spPr>
-          <a:xfrm>
-            <a:off x="4140862" y="6510505"/>
-            <a:ext cx="4114800" cy="345796"/>
-          </a:xfrm>
-        </p:spPr>
-        <p:txBody>
-          <a:bodyPr/>
-          <a:lstStyle/>
-          <a:p>
-            <a:pPr algn="ctr"/>
-            <a:r>
-              <a:rPr lang="en-US" dirty="0">
-                <a:latin typeface="Segoe UI" panose="020B0502040204020203" pitchFamily="34" charset="0"/>
-                <a:cs typeface="Segoe UI" panose="020B0502040204020203" pitchFamily="34" charset="0"/>
-              </a:rPr>
-              <a:t>Flatiron Data Science Bootcamp Project </a:t>
-            </a:r>
-          </a:p>
-        </p:txBody>
-      </p:sp>
-      <p:pic>
-        <p:nvPicPr>
-          <p:cNvPr id="12" name="Picture 11" descr="Chart, scatter chart&#10;&#10;Description automatically generated">
-            <a:extLst>
-              <a:ext uri="{FF2B5EF4-FFF2-40B4-BE49-F238E27FC236}">
-                <a16:creationId xmlns:a16="http://schemas.microsoft.com/office/drawing/2014/main" id="{39DE6446-4446-6F44-9A18-174F49352748}"/>
-              </a:ext>
-            </a:extLst>
-          </p:cNvPr>
-          <p:cNvPicPr>
-            <a:picLocks noChangeAspect="1"/>
-          </p:cNvPicPr>
-          <p:nvPr/>
-        </p:nvPicPr>
-        <p:blipFill>
-          <a:blip r:embed="rId2">
-            <a:extLst>
-              <a:ext uri="{28A0092B-C50C-407E-A947-70E740481C1C}">
-                <a14:useLocalDpi xmlns:a14="http://schemas.microsoft.com/office/drawing/2010/main" val="0"/>
-              </a:ext>
-            </a:extLst>
-          </a:blip>
-          <a:stretch>
-            <a:fillRect/>
-          </a:stretch>
-        </p:blipFill>
-        <p:spPr>
-          <a:xfrm>
-            <a:off x="1302050" y="1294821"/>
-            <a:ext cx="7177432" cy="4917136"/>
-          </a:xfrm>
-          <a:prstGeom prst="rect">
-            <a:avLst/>
-          </a:prstGeom>
-        </p:spPr>
-      </p:pic>
-      <p:sp>
-        <p:nvSpPr>
-          <p:cNvPr id="18" name="5-Point Star 17">
-            <a:extLst>
-              <a:ext uri="{FF2B5EF4-FFF2-40B4-BE49-F238E27FC236}">
-                <a16:creationId xmlns:a16="http://schemas.microsoft.com/office/drawing/2014/main" id="{D164B96A-77C2-6247-AA55-AF256732B8C7}"/>
-              </a:ext>
-            </a:extLst>
-          </p:cNvPr>
-          <p:cNvSpPr/>
-          <p:nvPr/>
-        </p:nvSpPr>
-        <p:spPr>
-          <a:xfrm>
-            <a:off x="4471230" y="4462670"/>
-            <a:ext cx="319432" cy="298174"/>
-          </a:xfrm>
-          <a:prstGeom prst="star5">
-            <a:avLst/>
-          </a:prstGeom>
-          <a:solidFill>
-            <a:srgbClr val="FFFF00"/>
-          </a:solidFill>
-        </p:spPr>
-        <p:style>
-          <a:lnRef idx="2">
-            <a:schemeClr val="accent1">
-              <a:shade val="50000"/>
-            </a:schemeClr>
-          </a:lnRef>
-          <a:fillRef idx="1">
-            <a:schemeClr val="accent1"/>
-          </a:fillRef>
-          <a:effectRef idx="0">
-            <a:schemeClr val="accent1"/>
-          </a:effectRef>
-          <a:fontRef idx="minor">
-            <a:schemeClr val="lt1"/>
-          </a:fontRef>
-        </p:style>
-        <p:txBody>
-          <a:bodyPr rtlCol="0" anchor="ctr"/>
-          <a:lstStyle/>
-          <a:p>
-            <a:pPr algn="ctr"/>
-            <a:endParaRPr lang="en-US" b="1" dirty="0"/>
-          </a:p>
-        </p:txBody>
-      </p:sp>
-      <p:sp>
-        <p:nvSpPr>
-          <p:cNvPr id="19" name="5-Point Star 18">
-            <a:extLst>
-              <a:ext uri="{FF2B5EF4-FFF2-40B4-BE49-F238E27FC236}">
-                <a16:creationId xmlns:a16="http://schemas.microsoft.com/office/drawing/2014/main" id="{F1EA4EB4-34DE-3845-9377-F7B6E94991E3}"/>
-              </a:ext>
-            </a:extLst>
-          </p:cNvPr>
-          <p:cNvSpPr/>
-          <p:nvPr/>
-        </p:nvSpPr>
-        <p:spPr>
-          <a:xfrm>
-            <a:off x="10673423" y="2724702"/>
-            <a:ext cx="319432" cy="298174"/>
-          </a:xfrm>
-          <a:prstGeom prst="star5">
-            <a:avLst/>
-          </a:prstGeom>
-          <a:solidFill>
-            <a:srgbClr val="FFFF00"/>
-          </a:solidFill>
-        </p:spPr>
-        <p:style>
-          <a:lnRef idx="2">
-            <a:schemeClr val="accent1">
-              <a:shade val="50000"/>
-            </a:schemeClr>
-          </a:lnRef>
-          <a:fillRef idx="1">
-            <a:schemeClr val="accent1"/>
-          </a:fillRef>
-          <a:effectRef idx="0">
-            <a:schemeClr val="accent1"/>
-          </a:effectRef>
-          <a:fontRef idx="minor">
-            <a:schemeClr val="lt1"/>
-          </a:fontRef>
-        </p:style>
-        <p:txBody>
-          <a:bodyPr rtlCol="0" anchor="ctr"/>
-          <a:lstStyle/>
-          <a:p>
-            <a:pPr algn="ctr"/>
-            <a:endParaRPr lang="en-US" b="1" dirty="0"/>
-          </a:p>
-        </p:txBody>
-      </p:sp>
-    </p:spTree>
-    <p:extLst>
-      <p:ext uri="{BB962C8B-B14F-4D97-AF65-F5344CB8AC3E}">
-        <p14:creationId xmlns:p14="http://schemas.microsoft.com/office/powerpoint/2010/main" val="98119414"/>
-      </p:ext>
-    </p:extLst>
-  </p:cSld>
-  <p:clrMapOvr>
-    <a:masterClrMapping/>
-  </p:clrMapOvr>
-</p:sld>
-</file>
-
-<file path=ppt/slides/slide8.xml><?xml version="1.0" encoding="utf-8"?>
 <p:sld xmlns:a="http://schemas.openxmlformats.org/drawingml/2006/main" xmlns:r="http://schemas.openxmlformats.org/officeDocument/2006/relationships" xmlns:p="http://schemas.openxmlformats.org/presentationml/2006/main">
   <p:cSld>
     <p:spTree>
@@ -11356,7 +10511,7 @@
           <a:p>
             <a:fld id="{2677B570-5BCE-435F-8FE4-883586746873}" type="slidenum">
               <a:rPr lang="en-US" smtClean="0"/>
-              <a:t>8</a:t>
+              <a:t>7</a:t>
             </a:fld>
             <a:endParaRPr lang="en-US" dirty="0"/>
           </a:p>
@@ -11486,7 +10641,7 @@
 </p:sld>
 </file>
 
-<file path=ppt/slides/slide9.xml><?xml version="1.0" encoding="utf-8"?>
+<file path=ppt/slides/slide8.xml><?xml version="1.0" encoding="utf-8"?>
 <p:sld xmlns:a="http://schemas.openxmlformats.org/drawingml/2006/main" xmlns:r="http://schemas.openxmlformats.org/officeDocument/2006/relationships" xmlns:p="http://schemas.openxmlformats.org/presentationml/2006/main">
   <p:cSld>
     <p:spTree>
@@ -11818,7 +10973,7 @@
           <a:p>
             <a:fld id="{2677B570-5BCE-435F-8FE4-883586746873}" type="slidenum">
               <a:rPr lang="en-US" smtClean="0"/>
-              <a:t>9</a:t>
+              <a:t>8</a:t>
             </a:fld>
             <a:endParaRPr lang="en-US" dirty="0"/>
           </a:p>

</xml_diff>

<commit_message>
Adding final presentation and README
</commit_message>
<xml_diff>
--- a/Seattle_Home_Price_Predictive_Model.pptx
+++ b/Seattle_Home_Price_Predictive_Model.pptx
@@ -5,10 +5,10 @@
     <p:sldMasterId id="2147483790" r:id="rId1"/>
   </p:sldMasterIdLst>
   <p:notesMasterIdLst>
-    <p:notesMasterId r:id="rId10"/>
+    <p:notesMasterId r:id="rId11"/>
   </p:notesMasterIdLst>
   <p:handoutMasterIdLst>
-    <p:handoutMasterId r:id="rId11"/>
+    <p:handoutMasterId r:id="rId12"/>
   </p:handoutMasterIdLst>
   <p:sldIdLst>
     <p:sldId id="256" r:id="rId2"/>
@@ -17,8 +17,9 @@
     <p:sldId id="288" r:id="rId5"/>
     <p:sldId id="289" r:id="rId6"/>
     <p:sldId id="277" r:id="rId7"/>
-    <p:sldId id="286" r:id="rId8"/>
-    <p:sldId id="273" r:id="rId9"/>
+    <p:sldId id="290" r:id="rId8"/>
+    <p:sldId id="286" r:id="rId9"/>
+    <p:sldId id="273" r:id="rId10"/>
   </p:sldIdLst>
   <p:sldSz cx="12192000" cy="6858000"/>
   <p:notesSz cx="6858000" cy="9144000"/>
@@ -7939,6 +7940,9 @@
   <p:clrMapOvr>
     <a:masterClrMapping/>
   </p:clrMapOvr>
+  <p:transition spd="slow">
+    <p:randomBar dir="vert"/>
+  </p:transition>
 </p:sld>
 </file>
 
@@ -8042,7 +8046,7 @@
                 <a:latin typeface="Segoe UI" panose="020B0502040204020203" pitchFamily="34" charset="0"/>
                 <a:cs typeface="Segoe UI" panose="020B0502040204020203" pitchFamily="34" charset="0"/>
               </a:rPr>
-              <a:t>Model Examples</a:t>
+              <a:t>Model Prediction Sample Home</a:t>
             </a:r>
           </a:p>
           <a:p>
@@ -8243,6 +8247,9 @@
   <p:clrMapOvr>
     <a:masterClrMapping/>
   </p:clrMapOvr>
+  <p:transition spd="slow">
+    <p:randomBar dir="vert"/>
+  </p:transition>
 </p:sld>
 </file>
 
@@ -8695,15 +8702,7 @@
             <a:pPr algn="ctr"/>
             <a:r>
               <a:rPr lang="en-US" dirty="0"/>
-              <a:t>R e q u </a:t>
-            </a:r>
-            <a:r>
-              <a:rPr lang="en-US" dirty="0" err="1"/>
-              <a:t>i</a:t>
-            </a:r>
-            <a:r>
-              <a:rPr lang="en-US" dirty="0"/>
-              <a:t> r e m e n t s</a:t>
+              <a:t>R e q u i r e m e n t s</a:t>
             </a:r>
           </a:p>
         </p:txBody>
@@ -8718,6 +8717,9 @@
   <p:clrMapOvr>
     <a:masterClrMapping/>
   </p:clrMapOvr>
+  <p:transition spd="slow">
+    <p:randomBar dir="vert"/>
+  </p:transition>
 </p:sld>
 </file>
 
@@ -8893,35 +8895,7 @@
                 <a:latin typeface="Segoe UI" panose="020B0502040204020203" pitchFamily="34" charset="0"/>
                 <a:cs typeface="Segoe UI" panose="020B0502040204020203" pitchFamily="34" charset="0"/>
               </a:rPr>
-              <a:t>Log transformations, Renovation indicator, Basement indicator, Grade group, Miles from Seattle, Zip price-per-</a:t>
-            </a:r>
-            <a:r>
-              <a:rPr lang="en-US" sz="1600" dirty="0" err="1">
-                <a:latin typeface="Segoe UI" panose="020B0502040204020203" pitchFamily="34" charset="0"/>
-                <a:cs typeface="Segoe UI" panose="020B0502040204020203" pitchFamily="34" charset="0"/>
-              </a:rPr>
-              <a:t>sqft</a:t>
-            </a:r>
-            <a:r>
-              <a:rPr lang="en-US" sz="1600" dirty="0">
-                <a:latin typeface="Segoe UI" panose="020B0502040204020203" pitchFamily="34" charset="0"/>
-                <a:cs typeface="Segoe UI" panose="020B0502040204020203" pitchFamily="34" charset="0"/>
-              </a:rPr>
-              <a:t> decile, Zip price-per-</a:t>
-            </a:r>
-            <a:r>
-              <a:rPr lang="en-US" sz="1600" dirty="0" err="1">
-                <a:latin typeface="Segoe UI" panose="020B0502040204020203" pitchFamily="34" charset="0"/>
-                <a:cs typeface="Segoe UI" panose="020B0502040204020203" pitchFamily="34" charset="0"/>
-              </a:rPr>
-              <a:t>sqft</a:t>
-            </a:r>
-            <a:r>
-              <a:rPr lang="en-US" sz="1600" dirty="0">
-                <a:latin typeface="Segoe UI" panose="020B0502040204020203" pitchFamily="34" charset="0"/>
-                <a:cs typeface="Segoe UI" panose="020B0502040204020203" pitchFamily="34" charset="0"/>
-              </a:rPr>
-              <a:t> median</a:t>
+              <a:t>Log transformations, Renovation indicator, Basement indicator, Grade group, Miles from Seattle, Zip price-per-sqft decile, Zip price-per-sqft median</a:t>
             </a:r>
           </a:p>
           <a:p>
@@ -9185,6 +9159,9 @@
   <p:clrMapOvr>
     <a:masterClrMapping/>
   </p:clrMapOvr>
+  <p:transition spd="slow">
+    <p:randomBar dir="vert"/>
+  </p:transition>
 </p:sld>
 </file>
 
@@ -9213,8 +9190,8 @@
         </p:nvSpPr>
         <p:spPr>
           <a:xfrm>
-            <a:off x="8495681" y="1386884"/>
-            <a:ext cx="3336100" cy="4801314"/>
+            <a:off x="8533527" y="1174071"/>
+            <a:ext cx="3336100" cy="5016758"/>
           </a:xfrm>
           <a:prstGeom prst="rect">
             <a:avLst/>
@@ -9286,6 +9263,19 @@
                 <a:latin typeface="Segoe UI" panose="020B0502040204020203" pitchFamily="34" charset="0"/>
                 <a:cs typeface="Segoe UI" panose="020B0502040204020203" pitchFamily="34" charset="0"/>
               </a:rPr>
+              <a:t>$182K Root Mean Sq. Error</a:t>
+            </a:r>
+          </a:p>
+          <a:p>
+            <a:pPr marL="742950" lvl="1" indent="-285750">
+              <a:buFont typeface="Arial" panose="020B0604020202020204" pitchFamily="34" charset="0"/>
+              <a:buChar char="•"/>
+            </a:pPr>
+            <a:r>
+              <a:rPr lang="en-US" sz="1400" dirty="0">
+                <a:latin typeface="Segoe UI" panose="020B0502040204020203" pitchFamily="34" charset="0"/>
+                <a:cs typeface="Segoe UI" panose="020B0502040204020203" pitchFamily="34" charset="0"/>
+              </a:rPr>
               <a:t>0.00 P-Value</a:t>
             </a:r>
             <a:endParaRPr lang="en-US" sz="1600" dirty="0">
@@ -9333,7 +9323,7 @@
                 <a:latin typeface="Segoe UI" panose="020B0502040204020203" pitchFamily="34" charset="0"/>
                 <a:cs typeface="Segoe UI" panose="020B0502040204020203" pitchFamily="34" charset="0"/>
               </a:rPr>
-              <a:t>Predictors:</a:t>
+              <a:t>Predictors (10):</a:t>
             </a:r>
           </a:p>
           <a:p>
@@ -9770,6 +9760,9 @@
   <p:clrMapOvr>
     <a:masterClrMapping/>
   </p:clrMapOvr>
+  <p:transition spd="slow">
+    <p:randomBar dir="vert"/>
+  </p:transition>
 </p:sld>
 </file>
 
@@ -9798,8 +9791,8 @@
         </p:nvSpPr>
         <p:spPr>
           <a:xfrm>
-            <a:off x="8495681" y="1386884"/>
-            <a:ext cx="3336100" cy="4801314"/>
+            <a:off x="8255662" y="1068047"/>
+            <a:ext cx="3576119" cy="5262979"/>
           </a:xfrm>
           <a:prstGeom prst="rect">
             <a:avLst/>
@@ -9812,117 +9805,43 @@
           </a:bodyPr>
           <a:lstStyle/>
           <a:p>
-            <a:pPr lvl="1"/>
+            <a:pPr marL="285750" indent="-285750">
+              <a:buFont typeface="Arial" panose="020B0604020202020204" pitchFamily="34" charset="0"/>
+              <a:buChar char="•"/>
+            </a:pPr>
             <a:r>
               <a:rPr lang="en-US" b="1" dirty="0">
                 <a:latin typeface="Segoe UI" panose="020B0502040204020203" pitchFamily="34" charset="0"/>
                 <a:cs typeface="Segoe UI" panose="020B0502040204020203" pitchFamily="34" charset="0"/>
               </a:rPr>
-              <a:t>Model 8 performed best with 74% of variance explained</a:t>
-            </a:r>
-            <a:endParaRPr lang="en-US" dirty="0">
-              <a:latin typeface="Segoe UI" panose="020B0502040204020203" pitchFamily="34" charset="0"/>
-              <a:cs typeface="Segoe UI" panose="020B0502040204020203" pitchFamily="34" charset="0"/>
-            </a:endParaRPr>
+              <a:t>Model 8 includes 10 predictor variables</a:t>
+            </a:r>
           </a:p>
           <a:p>
             <a:pPr marL="285750" indent="-285750">
               <a:buFont typeface="Arial" panose="020B0604020202020204" pitchFamily="34" charset="0"/>
               <a:buChar char="•"/>
             </a:pPr>
-            <a:endParaRPr lang="en-US" sz="1600" dirty="0">
+            <a:endParaRPr lang="en-US" b="1" dirty="0">
               <a:latin typeface="Segoe UI" panose="020B0502040204020203" pitchFamily="34" charset="0"/>
               <a:cs typeface="Segoe UI" panose="020B0502040204020203" pitchFamily="34" charset="0"/>
             </a:endParaRPr>
           </a:p>
           <a:p>
-            <a:pPr marL="742950" lvl="1" indent="-285750">
+            <a:pPr marL="285750" indent="-285750">
               <a:buFont typeface="Arial" panose="020B0604020202020204" pitchFamily="34" charset="0"/>
               <a:buChar char="•"/>
             </a:pPr>
-            <a:r>
-              <a:rPr lang="en-US" sz="1400" dirty="0">
-                <a:latin typeface="Segoe UI" panose="020B0502040204020203" pitchFamily="34" charset="0"/>
-                <a:cs typeface="Segoe UI" panose="020B0502040204020203" pitchFamily="34" charset="0"/>
-              </a:rPr>
-              <a:t>0.745 Adjusted R-squared</a:t>
-            </a:r>
-          </a:p>
-          <a:p>
-            <a:pPr marL="742950" lvl="1" indent="-285750">
-              <a:buFont typeface="Arial" panose="020B0604020202020204" pitchFamily="34" charset="0"/>
-              <a:buChar char="•"/>
-            </a:pPr>
-            <a:r>
-              <a:rPr lang="en-US" sz="1400" dirty="0">
-                <a:latin typeface="Segoe UI" panose="020B0502040204020203" pitchFamily="34" charset="0"/>
-                <a:cs typeface="Segoe UI" panose="020B0502040204020203" pitchFamily="34" charset="0"/>
-              </a:rPr>
-              <a:t>$108K  Mean Absolute Error</a:t>
-            </a:r>
-          </a:p>
-          <a:p>
-            <a:pPr marL="742950" lvl="1" indent="-285750">
-              <a:buFont typeface="Arial" panose="020B0604020202020204" pitchFamily="34" charset="0"/>
-              <a:buChar char="•"/>
-            </a:pPr>
-            <a:r>
-              <a:rPr lang="en-US" sz="1400" dirty="0">
-                <a:latin typeface="Segoe UI" panose="020B0502040204020203" pitchFamily="34" charset="0"/>
-                <a:cs typeface="Segoe UI" panose="020B0502040204020203" pitchFamily="34" charset="0"/>
-              </a:rPr>
-              <a:t>0.00 P-Value</a:t>
-            </a:r>
-            <a:endParaRPr lang="en-US" sz="1600" dirty="0">
-              <a:latin typeface="Segoe UI" panose="020B0502040204020203" pitchFamily="34" charset="0"/>
-              <a:cs typeface="Segoe UI" panose="020B0502040204020203" pitchFamily="34" charset="0"/>
-            </a:endParaRPr>
-          </a:p>
-          <a:p>
-            <a:pPr algn="ctr"/>
-            <a:endParaRPr lang="en-US" sz="1600" dirty="0">
-              <a:latin typeface="Segoe UI" panose="020B0502040204020203" pitchFamily="34" charset="0"/>
-              <a:cs typeface="Segoe UI" panose="020B0502040204020203" pitchFamily="34" charset="0"/>
-            </a:endParaRPr>
-          </a:p>
-          <a:p>
-            <a:pPr lvl="1"/>
             <a:r>
               <a:rPr lang="en-US" b="1" dirty="0">
                 <a:latin typeface="Segoe UI" panose="020B0502040204020203" pitchFamily="34" charset="0"/>
                 <a:cs typeface="Segoe UI" panose="020B0502040204020203" pitchFamily="34" charset="0"/>
               </a:rPr>
-              <a:t>Variables in Model 8</a:t>
-            </a:r>
-          </a:p>
-          <a:p>
-            <a:pPr marL="742950" lvl="1" indent="-285750">
-              <a:buFont typeface="Arial" panose="020B0604020202020204" pitchFamily="34" charset="0"/>
-              <a:buChar char="•"/>
-            </a:pPr>
-            <a:r>
-              <a:rPr lang="en-US" sz="1400" dirty="0">
-                <a:latin typeface="Segoe UI" panose="020B0502040204020203" pitchFamily="34" charset="0"/>
-                <a:cs typeface="Segoe UI" panose="020B0502040204020203" pitchFamily="34" charset="0"/>
-              </a:rPr>
-              <a:t>Target: Price</a:t>
-            </a:r>
-          </a:p>
-          <a:p>
-            <a:pPr marL="742950" lvl="1" indent="-285750">
-              <a:buFont typeface="Arial" panose="020B0604020202020204" pitchFamily="34" charset="0"/>
-              <a:buChar char="•"/>
-            </a:pPr>
-            <a:r>
-              <a:rPr lang="en-US" sz="1400" dirty="0">
-                <a:latin typeface="Segoe UI" panose="020B0502040204020203" pitchFamily="34" charset="0"/>
-                <a:cs typeface="Segoe UI" panose="020B0502040204020203" pitchFamily="34" charset="0"/>
-              </a:rPr>
-              <a:t>Predictors:</a:t>
-            </a:r>
-          </a:p>
-          <a:p>
-            <a:pPr marL="1085850" lvl="2" indent="-171450">
+              <a:t>Plot shows predictions against test data</a:t>
+            </a:r>
+          </a:p>
+          <a:p>
+            <a:pPr marL="628650" lvl="1" indent="-171450">
               <a:buFont typeface="Courier New" panose="02070309020205020404" pitchFamily="49" charset="0"/>
               <a:buChar char="o"/>
             </a:pPr>
@@ -9931,11 +9850,174 @@
                 <a:latin typeface="Segoe UI" panose="020B0502040204020203" pitchFamily="34" charset="0"/>
                 <a:cs typeface="Segoe UI" panose="020B0502040204020203" pitchFamily="34" charset="0"/>
               </a:rPr>
-              <a:t>Sq. Ft. Living Space</a:t>
-            </a:r>
-          </a:p>
-          <a:p>
-            <a:pPr marL="1085850" lvl="2" indent="-171450">
+              <a:t>X = Sq. Ft. Living Space</a:t>
+            </a:r>
+          </a:p>
+          <a:p>
+            <a:pPr marL="628650" lvl="1" indent="-171450">
+              <a:buFont typeface="Courier New" panose="02070309020205020404" pitchFamily="49" charset="0"/>
+              <a:buChar char="o"/>
+            </a:pPr>
+            <a:r>
+              <a:rPr lang="en-US" sz="1200" dirty="0">
+                <a:latin typeface="Segoe UI" panose="020B0502040204020203" pitchFamily="34" charset="0"/>
+                <a:cs typeface="Segoe UI" panose="020B0502040204020203" pitchFamily="34" charset="0"/>
+              </a:rPr>
+              <a:t>Y = Home Price</a:t>
+            </a:r>
+          </a:p>
+          <a:p>
+            <a:pPr marL="285750" indent="-285750">
+              <a:buFont typeface="Arial" panose="020B0604020202020204" pitchFamily="34" charset="0"/>
+              <a:buChar char="•"/>
+            </a:pPr>
+            <a:endParaRPr lang="en-US" b="1" dirty="0">
+              <a:latin typeface="Segoe UI" panose="020B0502040204020203" pitchFamily="34" charset="0"/>
+              <a:cs typeface="Segoe UI" panose="020B0502040204020203" pitchFamily="34" charset="0"/>
+            </a:endParaRPr>
+          </a:p>
+          <a:p>
+            <a:pPr marL="285750" indent="-285750">
+              <a:buFont typeface="Arial" panose="020B0604020202020204" pitchFamily="34" charset="0"/>
+              <a:buChar char="•"/>
+            </a:pPr>
+            <a:r>
+              <a:rPr lang="en-US" b="1" dirty="0">
+                <a:latin typeface="Segoe UI" panose="020B0502040204020203" pitchFamily="34" charset="0"/>
+                <a:cs typeface="Segoe UI" panose="020B0502040204020203" pitchFamily="34" charset="0"/>
+              </a:rPr>
+              <a:t>…filtered by these 7 predictors (244 sales)</a:t>
+            </a:r>
+          </a:p>
+          <a:p>
+            <a:pPr marL="628650" lvl="1" indent="-171450">
+              <a:buFont typeface="Courier New" panose="02070309020205020404" pitchFamily="49" charset="0"/>
+              <a:buChar char="o"/>
+            </a:pPr>
+            <a:r>
+              <a:rPr lang="en-US" sz="1200" dirty="0">
+                <a:latin typeface="Segoe UI" panose="020B0502040204020203" pitchFamily="34" charset="0"/>
+                <a:cs typeface="Segoe UI" panose="020B0502040204020203" pitchFamily="34" charset="0"/>
+              </a:rPr>
+              <a:t>View = 0 (none)</a:t>
+            </a:r>
+          </a:p>
+          <a:p>
+            <a:pPr marL="628650" lvl="1" indent="-171450">
+              <a:buFont typeface="Courier New" panose="02070309020205020404" pitchFamily="49" charset="0"/>
+              <a:buChar char="o"/>
+            </a:pPr>
+            <a:r>
+              <a:rPr lang="en-US" sz="1200" dirty="0">
+                <a:latin typeface="Segoe UI" panose="020B0502040204020203" pitchFamily="34" charset="0"/>
+                <a:cs typeface="Segoe UI" panose="020B0502040204020203" pitchFamily="34" charset="0"/>
+              </a:rPr>
+              <a:t>Grade = 7 (average)</a:t>
+            </a:r>
+          </a:p>
+          <a:p>
+            <a:pPr marL="628650" lvl="1" indent="-171450">
+              <a:buFont typeface="Courier New" panose="02070309020205020404" pitchFamily="49" charset="0"/>
+              <a:buChar char="o"/>
+            </a:pPr>
+            <a:r>
+              <a:rPr lang="en-US" sz="1200" dirty="0">
+                <a:latin typeface="Segoe UI" panose="020B0502040204020203" pitchFamily="34" charset="0"/>
+                <a:cs typeface="Segoe UI" panose="020B0502040204020203" pitchFamily="34" charset="0"/>
+              </a:rPr>
+              <a:t>Condition = 3 (average)</a:t>
+            </a:r>
+          </a:p>
+          <a:p>
+            <a:pPr marL="628650" lvl="1" indent="-171450">
+              <a:buFont typeface="Courier New" panose="02070309020205020404" pitchFamily="49" charset="0"/>
+              <a:buChar char="o"/>
+            </a:pPr>
+            <a:r>
+              <a:rPr lang="en-US" sz="1200" dirty="0">
+                <a:latin typeface="Segoe UI" panose="020B0502040204020203" pitchFamily="34" charset="0"/>
+                <a:cs typeface="Segoe UI" panose="020B0502040204020203" pitchFamily="34" charset="0"/>
+              </a:rPr>
+              <a:t>Waterfront = 0 (none)</a:t>
+            </a:r>
+          </a:p>
+          <a:p>
+            <a:pPr marL="628650" lvl="1" indent="-171450">
+              <a:buFont typeface="Courier New" panose="02070309020205020404" pitchFamily="49" charset="0"/>
+              <a:buChar char="o"/>
+            </a:pPr>
+            <a:r>
+              <a:rPr lang="en-US" sz="1200" dirty="0">
+                <a:latin typeface="Segoe UI" panose="020B0502040204020203" pitchFamily="34" charset="0"/>
+                <a:cs typeface="Segoe UI" panose="020B0502040204020203" pitchFamily="34" charset="0"/>
+              </a:rPr>
+              <a:t>Basement Indicator = 0 (none)</a:t>
+            </a:r>
+          </a:p>
+          <a:p>
+            <a:pPr marL="628650" lvl="1" indent="-171450">
+              <a:buFont typeface="Courier New" panose="02070309020205020404" pitchFamily="49" charset="0"/>
+              <a:buChar char="o"/>
+            </a:pPr>
+            <a:r>
+              <a:rPr lang="en-US" sz="1200" dirty="0">
+                <a:latin typeface="Segoe UI" panose="020B0502040204020203" pitchFamily="34" charset="0"/>
+                <a:cs typeface="Segoe UI" panose="020B0502040204020203" pitchFamily="34" charset="0"/>
+              </a:rPr>
+              <a:t>Renovation Indicator = 0 (none)</a:t>
+            </a:r>
+          </a:p>
+          <a:p>
+            <a:pPr marL="628650" lvl="1" indent="-171450">
+              <a:buFont typeface="Courier New" panose="02070309020205020404" pitchFamily="49" charset="0"/>
+              <a:buChar char="o"/>
+            </a:pPr>
+            <a:r>
+              <a:rPr lang="en-US" sz="1200" dirty="0">
+                <a:latin typeface="Segoe UI" panose="020B0502040204020203" pitchFamily="34" charset="0"/>
+                <a:cs typeface="Segoe UI" panose="020B0502040204020203" pitchFamily="34" charset="0"/>
+              </a:rPr>
+              <a:t>Zip code Median Price-Per-Sq. Ft. between $200-$300 </a:t>
+            </a:r>
+          </a:p>
+          <a:p>
+            <a:pPr marL="628650" lvl="1" indent="-171450">
+              <a:buFont typeface="Courier New" panose="02070309020205020404" pitchFamily="49" charset="0"/>
+              <a:buChar char="o"/>
+            </a:pPr>
+            <a:endParaRPr lang="en-US" sz="1200" dirty="0">
+              <a:latin typeface="Segoe UI" panose="020B0502040204020203" pitchFamily="34" charset="0"/>
+              <a:cs typeface="Segoe UI" panose="020B0502040204020203" pitchFamily="34" charset="0"/>
+            </a:endParaRPr>
+          </a:p>
+          <a:p>
+            <a:pPr marL="285750" indent="-285750">
+              <a:buFont typeface="Arial" panose="020B0604020202020204" pitchFamily="34" charset="0"/>
+              <a:buChar char="•"/>
+            </a:pPr>
+            <a:r>
+              <a:rPr lang="en-US" b="1" dirty="0">
+                <a:latin typeface="Segoe UI" panose="020B0502040204020203" pitchFamily="34" charset="0"/>
+                <a:cs typeface="Segoe UI" panose="020B0502040204020203" pitchFamily="34" charset="0"/>
+              </a:rPr>
+              <a:t>…and allowing any value on these final two variables</a:t>
+            </a:r>
+          </a:p>
+          <a:p>
+            <a:pPr marL="628650" lvl="1" indent="-171450">
+              <a:buFont typeface="Courier New" panose="02070309020205020404" pitchFamily="49" charset="0"/>
+              <a:buChar char="o"/>
+            </a:pPr>
+            <a:r>
+              <a:rPr lang="en-US" sz="1200" dirty="0">
+                <a:latin typeface="Segoe UI" panose="020B0502040204020203" pitchFamily="34" charset="0"/>
+                <a:cs typeface="Segoe UI" panose="020B0502040204020203" pitchFamily="34" charset="0"/>
+              </a:rPr>
+              <a:t>Miles From Seattle</a:t>
+            </a:r>
+          </a:p>
+          <a:p>
+            <a:pPr marL="628650" lvl="1" indent="-171450">
               <a:buFont typeface="Courier New" panose="02070309020205020404" pitchFamily="49" charset="0"/>
               <a:buChar char="o"/>
             </a:pPr>
@@ -9945,110 +10027,6 @@
                 <a:cs typeface="Segoe UI" panose="020B0502040204020203" pitchFamily="34" charset="0"/>
               </a:rPr>
               <a:t>Sq. Ft. Per Bedroom</a:t>
-            </a:r>
-          </a:p>
-          <a:p>
-            <a:pPr marL="1085850" lvl="2" indent="-171450">
-              <a:buFont typeface="Courier New" panose="02070309020205020404" pitchFamily="49" charset="0"/>
-              <a:buChar char="o"/>
-            </a:pPr>
-            <a:r>
-              <a:rPr lang="en-US" sz="1200" dirty="0">
-                <a:latin typeface="Segoe UI" panose="020B0502040204020203" pitchFamily="34" charset="0"/>
-                <a:cs typeface="Segoe UI" panose="020B0502040204020203" pitchFamily="34" charset="0"/>
-              </a:rPr>
-              <a:t>View</a:t>
-            </a:r>
-          </a:p>
-          <a:p>
-            <a:pPr marL="1085850" lvl="2" indent="-171450">
-              <a:buFont typeface="Courier New" panose="02070309020205020404" pitchFamily="49" charset="0"/>
-              <a:buChar char="o"/>
-            </a:pPr>
-            <a:r>
-              <a:rPr lang="en-US" sz="1200" dirty="0">
-                <a:latin typeface="Segoe UI" panose="020B0502040204020203" pitchFamily="34" charset="0"/>
-                <a:cs typeface="Segoe UI" panose="020B0502040204020203" pitchFamily="34" charset="0"/>
-              </a:rPr>
-              <a:t>Grade</a:t>
-            </a:r>
-          </a:p>
-          <a:p>
-            <a:pPr marL="1085850" lvl="2" indent="-171450">
-              <a:buFont typeface="Courier New" panose="02070309020205020404" pitchFamily="49" charset="0"/>
-              <a:buChar char="o"/>
-            </a:pPr>
-            <a:r>
-              <a:rPr lang="en-US" sz="1200" dirty="0">
-                <a:latin typeface="Segoe UI" panose="020B0502040204020203" pitchFamily="34" charset="0"/>
-                <a:cs typeface="Segoe UI" panose="020B0502040204020203" pitchFamily="34" charset="0"/>
-              </a:rPr>
-              <a:t>Condition</a:t>
-            </a:r>
-          </a:p>
-          <a:p>
-            <a:pPr marL="1085850" lvl="2" indent="-171450">
-              <a:buFont typeface="Courier New" panose="02070309020205020404" pitchFamily="49" charset="0"/>
-              <a:buChar char="o"/>
-            </a:pPr>
-            <a:r>
-              <a:rPr lang="en-US" sz="1200" dirty="0">
-                <a:latin typeface="Segoe UI" panose="020B0502040204020203" pitchFamily="34" charset="0"/>
-                <a:cs typeface="Segoe UI" panose="020B0502040204020203" pitchFamily="34" charset="0"/>
-              </a:rPr>
-              <a:t>Waterfront</a:t>
-            </a:r>
-          </a:p>
-          <a:p>
-            <a:pPr marL="1085850" lvl="2" indent="-171450">
-              <a:buFont typeface="Courier New" panose="02070309020205020404" pitchFamily="49" charset="0"/>
-              <a:buChar char="o"/>
-            </a:pPr>
-            <a:r>
-              <a:rPr lang="en-US" sz="1200" dirty="0">
-                <a:latin typeface="Segoe UI" panose="020B0502040204020203" pitchFamily="34" charset="0"/>
-                <a:cs typeface="Segoe UI" panose="020B0502040204020203" pitchFamily="34" charset="0"/>
-              </a:rPr>
-              <a:t>Basement Indicator</a:t>
-            </a:r>
-          </a:p>
-          <a:p>
-            <a:pPr marL="1085850" lvl="2" indent="-171450">
-              <a:buFont typeface="Courier New" panose="02070309020205020404" pitchFamily="49" charset="0"/>
-              <a:buChar char="o"/>
-            </a:pPr>
-            <a:r>
-              <a:rPr lang="en-US" sz="1200" dirty="0">
-                <a:latin typeface="Segoe UI" panose="020B0502040204020203" pitchFamily="34" charset="0"/>
-                <a:cs typeface="Segoe UI" panose="020B0502040204020203" pitchFamily="34" charset="0"/>
-              </a:rPr>
-              <a:t>Renovation Indicator</a:t>
-            </a:r>
-          </a:p>
-          <a:p>
-            <a:pPr marL="1085850" lvl="2" indent="-171450">
-              <a:buFont typeface="Courier New" panose="02070309020205020404" pitchFamily="49" charset="0"/>
-              <a:buChar char="o"/>
-            </a:pPr>
-            <a:r>
-              <a:rPr lang="en-US" sz="1200" dirty="0">
-                <a:latin typeface="Segoe UI" panose="020B0502040204020203" pitchFamily="34" charset="0"/>
-                <a:cs typeface="Segoe UI" panose="020B0502040204020203" pitchFamily="34" charset="0"/>
-              </a:rPr>
-              <a:t>Miles From Seattle</a:t>
-            </a:r>
-          </a:p>
-          <a:p>
-            <a:pPr marL="1085850" lvl="2" indent="-171450">
-              <a:buFont typeface="Courier New" panose="02070309020205020404" pitchFamily="49" charset="0"/>
-              <a:buChar char="o"/>
-            </a:pPr>
-            <a:r>
-              <a:rPr lang="en-US" sz="1200" dirty="0">
-                <a:latin typeface="Segoe UI" panose="020B0502040204020203" pitchFamily="34" charset="0"/>
-                <a:cs typeface="Segoe UI" panose="020B0502040204020203" pitchFamily="34" charset="0"/>
-              </a:rPr>
-              <a:t>Zip code Median Price-Per-Sq. Ft. </a:t>
             </a:r>
           </a:p>
         </p:txBody>
@@ -10178,7 +10156,7 @@
                 <a:latin typeface="Segoe UI" panose="020B0502040204020203" pitchFamily="34" charset="0"/>
                 <a:cs typeface="Segoe UI" panose="020B0502040204020203" pitchFamily="34" charset="0"/>
               </a:rPr>
-              <a:t>Linear Model</a:t>
+              <a:t>Example Fit</a:t>
             </a:r>
           </a:p>
         </p:txBody>
@@ -10222,10 +10200,10 @@
       </p:sp>
       <p:pic>
         <p:nvPicPr>
-          <p:cNvPr id="7" name="Picture 6" descr="Chart, scatter chart&#10;&#10;Description automatically generated">
+          <p:cNvPr id="13" name="Picture 12" descr="Chart, scatter chart&#10;&#10;Description automatically generated">
             <a:extLst>
               <a:ext uri="{FF2B5EF4-FFF2-40B4-BE49-F238E27FC236}">
-                <a16:creationId xmlns:a16="http://schemas.microsoft.com/office/drawing/2014/main" id="{019A4AC9-0345-FE4A-821E-C7F25E287756}"/>
+                <a16:creationId xmlns:a16="http://schemas.microsoft.com/office/drawing/2014/main" id="{8935D3A5-83E0-5146-B2B1-F35913406774}"/>
               </a:ext>
             </a:extLst>
           </p:cNvPr>
@@ -10248,14 +10226,204 @@
         </p:blipFill>
         <p:spPr>
           <a:xfrm>
-            <a:off x="1341925" y="908696"/>
-            <a:ext cx="6614548" cy="5279502"/>
+            <a:off x="1283986" y="1055668"/>
+            <a:ext cx="6771818" cy="5132530"/>
           </a:xfrm>
           <a:prstGeom prst="rect">
             <a:avLst/>
           </a:prstGeom>
         </p:spPr>
       </p:pic>
+      <p:sp>
+        <p:nvSpPr>
+          <p:cNvPr id="15" name="TextBox 14">
+            <a:extLst>
+              <a:ext uri="{FF2B5EF4-FFF2-40B4-BE49-F238E27FC236}">
+                <a16:creationId xmlns:a16="http://schemas.microsoft.com/office/drawing/2014/main" id="{F0A7875D-B442-8F44-90DC-2A442E8C0090}"/>
+              </a:ext>
+            </a:extLst>
+          </p:cNvPr>
+          <p:cNvSpPr txBox="1"/>
+          <p:nvPr/>
+        </p:nvSpPr>
+        <p:spPr>
+          <a:xfrm>
+            <a:off x="1260836" y="5976702"/>
+            <a:ext cx="2630848" cy="230832"/>
+          </a:xfrm>
+          <a:prstGeom prst="rect">
+            <a:avLst/>
+          </a:prstGeom>
+          <a:noFill/>
+        </p:spPr>
+        <p:txBody>
+          <a:bodyPr wrap="none" rtlCol="0">
+            <a:spAutoFit/>
+          </a:bodyPr>
+          <a:lstStyle/>
+          <a:p>
+            <a:r>
+              <a:rPr lang="en-US" sz="900" i="1" dirty="0">
+                <a:solidFill>
+                  <a:schemeClr val="bg1">
+                    <a:lumMod val="75000"/>
+                  </a:schemeClr>
+                </a:solidFill>
+                <a:latin typeface="Segoe UI" panose="020B0502040204020203" pitchFamily="34" charset="0"/>
+                <a:cs typeface="Segoe UI" panose="020B0502040204020203" pitchFamily="34" charset="0"/>
+              </a:rPr>
+              <a:t>Plot filtered to show 244 of 4,320 test data points</a:t>
+            </a:r>
+          </a:p>
+        </p:txBody>
+      </p:sp>
+      <p:sp>
+        <p:nvSpPr>
+          <p:cNvPr id="17" name="Oval 16">
+            <a:extLst>
+              <a:ext uri="{FF2B5EF4-FFF2-40B4-BE49-F238E27FC236}">
+                <a16:creationId xmlns:a16="http://schemas.microsoft.com/office/drawing/2014/main" id="{BC2719DB-79CE-F241-966B-6931C3DF6544}"/>
+              </a:ext>
+            </a:extLst>
+          </p:cNvPr>
+          <p:cNvSpPr/>
+          <p:nvPr/>
+        </p:nvSpPr>
+        <p:spPr>
+          <a:xfrm>
+            <a:off x="5208608" y="4085863"/>
+            <a:ext cx="231493" cy="231494"/>
+          </a:xfrm>
+          <a:prstGeom prst="ellipse">
+            <a:avLst/>
+          </a:prstGeom>
+          <a:noFill/>
+          <a:ln>
+            <a:solidFill>
+              <a:srgbClr val="FF0000"/>
+            </a:solidFill>
+          </a:ln>
+        </p:spPr>
+        <p:style>
+          <a:lnRef idx="2">
+            <a:schemeClr val="accent1">
+              <a:shade val="50000"/>
+            </a:schemeClr>
+          </a:lnRef>
+          <a:fillRef idx="1">
+            <a:schemeClr val="accent1"/>
+          </a:fillRef>
+          <a:effectRef idx="0">
+            <a:schemeClr val="accent1"/>
+          </a:effectRef>
+          <a:fontRef idx="minor">
+            <a:schemeClr val="lt1"/>
+          </a:fontRef>
+        </p:style>
+        <p:txBody>
+          <a:bodyPr rtlCol="0" anchor="ctr"/>
+          <a:lstStyle/>
+          <a:p>
+            <a:pPr algn="ctr"/>
+            <a:endParaRPr lang="en-US" dirty="0"/>
+          </a:p>
+        </p:txBody>
+      </p:sp>
+      <p:cxnSp>
+        <p:nvCxnSpPr>
+          <p:cNvPr id="19" name="Straight Arrow Connector 18">
+            <a:extLst>
+              <a:ext uri="{FF2B5EF4-FFF2-40B4-BE49-F238E27FC236}">
+                <a16:creationId xmlns:a16="http://schemas.microsoft.com/office/drawing/2014/main" id="{57363DAF-F9A9-C648-A3F9-039595B1F258}"/>
+              </a:ext>
+            </a:extLst>
+          </p:cNvPr>
+          <p:cNvCxnSpPr/>
+          <p:nvPr/>
+        </p:nvCxnSpPr>
+        <p:spPr>
+          <a:xfrm>
+            <a:off x="5440101" y="4178461"/>
+            <a:ext cx="474562" cy="0"/>
+          </a:xfrm>
+          <a:prstGeom prst="straightConnector1">
+            <a:avLst/>
+          </a:prstGeom>
+          <a:ln>
+            <a:solidFill>
+              <a:srgbClr val="FF0000"/>
+            </a:solidFill>
+            <a:tailEnd type="triangle"/>
+          </a:ln>
+        </p:spPr>
+        <p:style>
+          <a:lnRef idx="1">
+            <a:schemeClr val="accent1"/>
+          </a:lnRef>
+          <a:fillRef idx="0">
+            <a:schemeClr val="accent1"/>
+          </a:fillRef>
+          <a:effectRef idx="0">
+            <a:schemeClr val="accent1"/>
+          </a:effectRef>
+          <a:fontRef idx="minor">
+            <a:schemeClr val="tx1"/>
+          </a:fontRef>
+        </p:style>
+      </p:cxnSp>
+      <p:sp>
+        <p:nvSpPr>
+          <p:cNvPr id="22" name="TextBox 21">
+            <a:extLst>
+              <a:ext uri="{FF2B5EF4-FFF2-40B4-BE49-F238E27FC236}">
+                <a16:creationId xmlns:a16="http://schemas.microsoft.com/office/drawing/2014/main" id="{590A5057-C716-E24F-8C9A-077DD1CAF459}"/>
+              </a:ext>
+            </a:extLst>
+          </p:cNvPr>
+          <p:cNvSpPr txBox="1"/>
+          <p:nvPr/>
+        </p:nvSpPr>
+        <p:spPr>
+          <a:xfrm>
+            <a:off x="5906949" y="3993861"/>
+            <a:ext cx="1056700" cy="415498"/>
+          </a:xfrm>
+          <a:prstGeom prst="rect">
+            <a:avLst/>
+          </a:prstGeom>
+          <a:noFill/>
+        </p:spPr>
+        <p:txBody>
+          <a:bodyPr wrap="none" rtlCol="0">
+            <a:spAutoFit/>
+          </a:bodyPr>
+          <a:lstStyle/>
+          <a:p>
+            <a:r>
+              <a:rPr lang="en-US" sz="1050" dirty="0">
+                <a:solidFill>
+                  <a:srgbClr val="FF0000"/>
+                </a:solidFill>
+                <a:latin typeface="Segoe UI" panose="020B0502040204020203" pitchFamily="34" charset="0"/>
+                <a:cs typeface="Segoe UI" panose="020B0502040204020203" pitchFamily="34" charset="0"/>
+              </a:rPr>
+              <a:t>Sample Home </a:t>
+            </a:r>
+          </a:p>
+          <a:p>
+            <a:r>
+              <a:rPr lang="en-US" sz="1050" dirty="0">
+                <a:solidFill>
+                  <a:srgbClr val="FF0000"/>
+                </a:solidFill>
+                <a:latin typeface="Segoe UI" panose="020B0502040204020203" pitchFamily="34" charset="0"/>
+                <a:cs typeface="Segoe UI" panose="020B0502040204020203" pitchFamily="34" charset="0"/>
+              </a:rPr>
+              <a:t>Next Slide</a:t>
+            </a:r>
+          </a:p>
+        </p:txBody>
+      </p:sp>
     </p:spTree>
     <p:extLst>
       <p:ext uri="{BB962C8B-B14F-4D97-AF65-F5344CB8AC3E}">
@@ -10266,6 +10434,9 @@
   <p:clrMapOvr>
     <a:masterClrMapping/>
   </p:clrMapOvr>
+  <p:transition spd="slow">
+    <p:randomBar dir="vert"/>
+  </p:transition>
 </p:sld>
 </file>
 
@@ -10288,182 +10459,7 @@
       </p:grpSpPr>
       <p:sp>
         <p:nvSpPr>
-          <p:cNvPr id="104" name="TextBox 103"/>
-          <p:cNvSpPr txBox="1"/>
-          <p:nvPr/>
-        </p:nvSpPr>
-        <p:spPr>
-          <a:xfrm>
-            <a:off x="1196262" y="1087024"/>
-            <a:ext cx="9550046" cy="5139869"/>
-          </a:xfrm>
-          <a:prstGeom prst="rect">
-            <a:avLst/>
-          </a:prstGeom>
-          <a:noFill/>
-        </p:spPr>
-        <p:txBody>
-          <a:bodyPr wrap="square" rtlCol="0">
-            <a:spAutoFit/>
-          </a:bodyPr>
-          <a:lstStyle/>
-          <a:p>
-            <a:pPr marL="457200" indent="-457200">
-              <a:buFont typeface="Arial" panose="020B0604020202020204" pitchFamily="34" charset="0"/>
-              <a:buChar char="•"/>
-            </a:pPr>
-            <a:r>
-              <a:rPr lang="en-US" sz="2800" b="1" dirty="0">
-                <a:latin typeface="Segoe UI" panose="020B0502040204020203" pitchFamily="34" charset="0"/>
-                <a:cs typeface="Segoe UI" panose="020B0502040204020203" pitchFamily="34" charset="0"/>
-              </a:rPr>
-              <a:t>Recommendations</a:t>
-            </a:r>
-          </a:p>
-          <a:p>
-            <a:pPr marL="800100" lvl="1" indent="-342900">
-              <a:buFont typeface="Courier New" panose="02070309020205020404" pitchFamily="49" charset="0"/>
-              <a:buChar char="o"/>
-            </a:pPr>
-            <a:r>
-              <a:rPr lang="en-US" sz="2400" dirty="0">
-                <a:latin typeface="Segoe UI" panose="020B0502040204020203" pitchFamily="34" charset="0"/>
-                <a:cs typeface="Segoe UI" panose="020B0502040204020203" pitchFamily="34" charset="0"/>
-              </a:rPr>
-              <a:t>Proposal #1: Go After Animation Genre First</a:t>
-            </a:r>
-          </a:p>
-          <a:p>
-            <a:pPr marL="800100" lvl="1" indent="-342900">
-              <a:buFont typeface="Courier New" panose="02070309020205020404" pitchFamily="49" charset="0"/>
-              <a:buChar char="o"/>
-            </a:pPr>
-            <a:r>
-              <a:rPr lang="en-US" sz="2400" dirty="0">
-                <a:latin typeface="Segoe UI" panose="020B0502040204020203" pitchFamily="34" charset="0"/>
-                <a:cs typeface="Segoe UI" panose="020B0502040204020203" pitchFamily="34" charset="0"/>
-              </a:rPr>
-              <a:t>Proposal #2: Authorize Budget of $131M or $93M</a:t>
-            </a:r>
-          </a:p>
-          <a:p>
-            <a:pPr marL="800100" lvl="1" indent="-342900">
-              <a:buFont typeface="Courier New" panose="02070309020205020404" pitchFamily="49" charset="0"/>
-              <a:buChar char="o"/>
-            </a:pPr>
-            <a:r>
-              <a:rPr lang="en-US" sz="2400" dirty="0">
-                <a:latin typeface="Segoe UI" panose="020B0502040204020203" pitchFamily="34" charset="0"/>
-                <a:cs typeface="Segoe UI" panose="020B0502040204020203" pitchFamily="34" charset="0"/>
-              </a:rPr>
-              <a:t>Proposal #3: Strike Deal With Top 20 Actor</a:t>
-            </a:r>
-          </a:p>
-          <a:p>
-            <a:endParaRPr lang="en-US" sz="2400" dirty="0">
-              <a:latin typeface="Segoe UI" panose="020B0502040204020203" pitchFamily="34" charset="0"/>
-              <a:cs typeface="Segoe UI" panose="020B0502040204020203" pitchFamily="34" charset="0"/>
-            </a:endParaRPr>
-          </a:p>
-          <a:p>
-            <a:pPr marL="342900" indent="-342900">
-              <a:buFont typeface="Arial" panose="020B0604020202020204" pitchFamily="34" charset="0"/>
-              <a:buChar char="•"/>
-            </a:pPr>
-            <a:r>
-              <a:rPr lang="en-US" sz="2800" b="1" dirty="0">
-                <a:latin typeface="Segoe UI" panose="020B0502040204020203" pitchFamily="34" charset="0"/>
-                <a:cs typeface="Segoe UI" panose="020B0502040204020203" pitchFamily="34" charset="0"/>
-              </a:rPr>
-              <a:t>Next Steps</a:t>
-            </a:r>
-          </a:p>
-          <a:p>
-            <a:pPr marL="800100" lvl="1" indent="-342900">
-              <a:buFont typeface="Arial" panose="020B0604020202020204" pitchFamily="34" charset="0"/>
-              <a:buChar char="•"/>
-            </a:pPr>
-            <a:r>
-              <a:rPr lang="en-US" sz="2400" dirty="0">
-                <a:latin typeface="Segoe UI" panose="020B0502040204020203" pitchFamily="34" charset="0"/>
-                <a:cs typeface="Segoe UI" panose="020B0502040204020203" pitchFamily="34" charset="0"/>
-              </a:rPr>
-              <a:t>Suggest full-day workshop deep-dive</a:t>
-            </a:r>
-          </a:p>
-          <a:p>
-            <a:pPr marL="800100" lvl="1" indent="-342900">
-              <a:buFont typeface="Arial" panose="020B0604020202020204" pitchFamily="34" charset="0"/>
-              <a:buChar char="•"/>
-            </a:pPr>
-            <a:r>
-              <a:rPr lang="en-US" sz="2400" dirty="0">
-                <a:latin typeface="Segoe UI" panose="020B0502040204020203" pitchFamily="34" charset="0"/>
-                <a:cs typeface="Segoe UI" panose="020B0502040204020203" pitchFamily="34" charset="0"/>
-              </a:rPr>
-              <a:t>Engage broader team</a:t>
-            </a:r>
-          </a:p>
-          <a:p>
-            <a:pPr marL="800100" lvl="1" indent="-342900">
-              <a:buFont typeface="Arial" panose="020B0604020202020204" pitchFamily="34" charset="0"/>
-              <a:buChar char="•"/>
-            </a:pPr>
-            <a:r>
-              <a:rPr lang="en-US" sz="2400" dirty="0">
-                <a:latin typeface="Segoe UI" panose="020B0502040204020203" pitchFamily="34" charset="0"/>
-                <a:cs typeface="Segoe UI" panose="020B0502040204020203" pitchFamily="34" charset="0"/>
-              </a:rPr>
-              <a:t>Formulate business plan</a:t>
-            </a:r>
-          </a:p>
-          <a:p>
-            <a:pPr marL="800100" lvl="1" indent="-342900">
-              <a:buFont typeface="Arial" panose="020B0604020202020204" pitchFamily="34" charset="0"/>
-              <a:buChar char="•"/>
-            </a:pPr>
-            <a:r>
-              <a:rPr lang="en-US" sz="2400" dirty="0">
-                <a:latin typeface="Segoe UI" panose="020B0502040204020203" pitchFamily="34" charset="0"/>
-                <a:cs typeface="Segoe UI" panose="020B0502040204020203" pitchFamily="34" charset="0"/>
-              </a:rPr>
-              <a:t>Executive awareness of investment size</a:t>
-            </a:r>
-          </a:p>
-          <a:p>
-            <a:pPr marL="800100" lvl="1" indent="-342900">
-              <a:buFont typeface="Arial" panose="020B0604020202020204" pitchFamily="34" charset="0"/>
-              <a:buChar char="•"/>
-            </a:pPr>
-            <a:endParaRPr lang="en-US" sz="2400" dirty="0">
-              <a:latin typeface="Segoe UI" panose="020B0502040204020203" pitchFamily="34" charset="0"/>
-              <a:cs typeface="Segoe UI" panose="020B0502040204020203" pitchFamily="34" charset="0"/>
-            </a:endParaRPr>
-          </a:p>
-          <a:p>
-            <a:pPr marL="342900" indent="-342900">
-              <a:buFont typeface="Arial" panose="020B0604020202020204" pitchFamily="34" charset="0"/>
-              <a:buChar char="•"/>
-            </a:pPr>
-            <a:r>
-              <a:rPr lang="en-US" sz="2800" b="1" dirty="0">
-                <a:latin typeface="Segoe UI" panose="020B0502040204020203" pitchFamily="34" charset="0"/>
-                <a:cs typeface="Segoe UI" panose="020B0502040204020203" pitchFamily="34" charset="0"/>
-              </a:rPr>
-              <a:t>Questions?</a:t>
-            </a:r>
-          </a:p>
-          <a:p>
-            <a:endParaRPr lang="en-US" sz="2800" dirty="0">
-              <a:latin typeface="Segoe UI" panose="020B0502040204020203" pitchFamily="34" charset="0"/>
-              <a:cs typeface="Segoe UI" panose="020B0502040204020203" pitchFamily="34" charset="0"/>
-            </a:endParaRPr>
-          </a:p>
-        </p:txBody>
-      </p:sp>
-      <p:sp>
-        <p:nvSpPr>
-          <p:cNvPr id="180" name="Date Placeholder 1"/>
+          <p:cNvPr id="11" name="Date Placeholder 1"/>
           <p:cNvSpPr>
             <a:spLocks noGrp="1"/>
           </p:cNvSpPr>
@@ -10483,7 +10479,7 @@
           <a:p>
             <a:fld id="{176B1F7D-A64B-4A90-8D4F-4ED41DDBE69A}" type="datetime1">
               <a:rPr lang="en-US" smtClean="0"/>
-              <a:t>3/15/21</a:t>
+              <a:t>3/16/21</a:t>
             </a:fld>
             <a:endParaRPr lang="en-US" dirty="0"/>
           </a:p>
@@ -10491,7 +10487,7 @@
       </p:sp>
       <p:sp>
         <p:nvSpPr>
-          <p:cNvPr id="182" name="Slide Number Placeholder 3"/>
+          <p:cNvPr id="14" name="Slide Number Placeholder 3"/>
           <p:cNvSpPr>
             <a:spLocks noGrp="1"/>
           </p:cNvSpPr>
@@ -10519,7 +10515,7 @@
       </p:sp>
       <p:sp>
         <p:nvSpPr>
-          <p:cNvPr id="13" name="Title 12"/>
+          <p:cNvPr id="5" name="Title 4"/>
           <p:cNvSpPr>
             <a:spLocks noGrp="1"/>
           </p:cNvSpPr>
@@ -10534,14 +10530,14 @@
           <a:p>
             <a:r>
               <a:rPr lang="en-US" dirty="0"/>
-              <a:t>Conclusions</a:t>
+              <a:t>Let’s Review a Real Test Case</a:t>
             </a:r>
           </a:p>
         </p:txBody>
       </p:sp>
       <p:sp>
         <p:nvSpPr>
-          <p:cNvPr id="185" name="Rounded Rectangle 184"/>
+          <p:cNvPr id="16" name="Rounded Rectangle 15"/>
           <p:cNvSpPr/>
           <p:nvPr/>
         </p:nvSpPr>
@@ -10586,17 +10582,17 @@
                 <a:latin typeface="Segoe UI" panose="020B0502040204020203" pitchFamily="34" charset="0"/>
                 <a:cs typeface="Segoe UI" panose="020B0502040204020203" pitchFamily="34" charset="0"/>
               </a:rPr>
-              <a:t>Next Steps</a:t>
+              <a:t>Prediction Example</a:t>
             </a:r>
           </a:p>
         </p:txBody>
       </p:sp>
       <p:sp>
         <p:nvSpPr>
-          <p:cNvPr id="8" name="Footer Placeholder 2">
+          <p:cNvPr id="21" name="Footer Placeholder 2">
             <a:extLst>
               <a:ext uri="{FF2B5EF4-FFF2-40B4-BE49-F238E27FC236}">
-                <a16:creationId xmlns:a16="http://schemas.microsoft.com/office/drawing/2014/main" id="{EA0370E8-7653-1845-96EE-5DEF034C0E51}"/>
+                <a16:creationId xmlns:a16="http://schemas.microsoft.com/office/drawing/2014/main" id="{59AD246D-245A-C94F-A5DE-9FDD7873A7FB}"/>
               </a:ext>
             </a:extLst>
           </p:cNvPr>
@@ -10628,16 +10624,1481 @@
           </a:p>
         </p:txBody>
       </p:sp>
+      <p:sp>
+        <p:nvSpPr>
+          <p:cNvPr id="2" name="TextBox 1">
+            <a:extLst>
+              <a:ext uri="{FF2B5EF4-FFF2-40B4-BE49-F238E27FC236}">
+                <a16:creationId xmlns:a16="http://schemas.microsoft.com/office/drawing/2014/main" id="{EB5DFDF2-AF9E-CD4A-A244-E3862EF2A21E}"/>
+              </a:ext>
+            </a:extLst>
+          </p:cNvPr>
+          <p:cNvSpPr txBox="1"/>
+          <p:nvPr/>
+        </p:nvSpPr>
+        <p:spPr>
+          <a:xfrm>
+            <a:off x="7898799" y="1169788"/>
+            <a:ext cx="3619363" cy="1569660"/>
+          </a:xfrm>
+          <a:prstGeom prst="rect">
+            <a:avLst/>
+          </a:prstGeom>
+          <a:solidFill>
+            <a:schemeClr val="accent1">
+              <a:lumMod val="40000"/>
+              <a:lumOff val="60000"/>
+            </a:schemeClr>
+          </a:solidFill>
+        </p:spPr>
+        <p:txBody>
+          <a:bodyPr wrap="square" rtlCol="0">
+            <a:spAutoFit/>
+          </a:bodyPr>
+          <a:lstStyle/>
+          <a:p>
+            <a:pPr marL="285750" indent="-285750">
+              <a:buFont typeface="Arial" panose="020B0604020202020204" pitchFamily="34" charset="0"/>
+              <a:buChar char="•"/>
+            </a:pPr>
+            <a:r>
+              <a:rPr lang="en-US" sz="1600" dirty="0">
+                <a:latin typeface="Segoe UI" panose="020B0502040204020203" pitchFamily="34" charset="0"/>
+                <a:cs typeface="Segoe UI" panose="020B0502040204020203" pitchFamily="34" charset="0"/>
+              </a:rPr>
+              <a:t>Home Name: “Rainy Paradise”</a:t>
+            </a:r>
+          </a:p>
+          <a:p>
+            <a:pPr marL="285750" indent="-285750">
+              <a:buFont typeface="Arial" panose="020B0604020202020204" pitchFamily="34" charset="0"/>
+              <a:buChar char="•"/>
+            </a:pPr>
+            <a:r>
+              <a:rPr lang="en-US" sz="1600" dirty="0">
+                <a:latin typeface="Segoe UI" panose="020B0502040204020203" pitchFamily="34" charset="0"/>
+                <a:cs typeface="Segoe UI" panose="020B0502040204020203" pitchFamily="34" charset="0"/>
+              </a:rPr>
+              <a:t>Home ID: 2780910100</a:t>
+            </a:r>
+          </a:p>
+          <a:p>
+            <a:pPr marL="285750" indent="-285750">
+              <a:buFont typeface="Arial" panose="020B0604020202020204" pitchFamily="34" charset="0"/>
+              <a:buChar char="•"/>
+            </a:pPr>
+            <a:r>
+              <a:rPr lang="en-US" sz="1600" dirty="0">
+                <a:latin typeface="Segoe UI" panose="020B0502040204020203" pitchFamily="34" charset="0"/>
+                <a:cs typeface="Segoe UI" panose="020B0502040204020203" pitchFamily="34" charset="0"/>
+              </a:rPr>
+              <a:t>Zip Code: 98038</a:t>
+            </a:r>
+          </a:p>
+          <a:p>
+            <a:pPr marL="285750" indent="-285750">
+              <a:buFont typeface="Arial" panose="020B0604020202020204" pitchFamily="34" charset="0"/>
+              <a:buChar char="•"/>
+            </a:pPr>
+            <a:r>
+              <a:rPr lang="en-US" sz="1600" dirty="0">
+                <a:latin typeface="Segoe UI" panose="020B0502040204020203" pitchFamily="34" charset="0"/>
+                <a:cs typeface="Segoe UI" panose="020B0502040204020203" pitchFamily="34" charset="0"/>
+              </a:rPr>
+              <a:t>Year Built: 2004</a:t>
+            </a:r>
+            <a:br>
+              <a:rPr lang="en-US" sz="1600" dirty="0">
+                <a:latin typeface="Segoe UI" panose="020B0502040204020203" pitchFamily="34" charset="0"/>
+                <a:cs typeface="Segoe UI" panose="020B0502040204020203" pitchFamily="34" charset="0"/>
+              </a:rPr>
+            </a:br>
+            <a:r>
+              <a:rPr lang="en-US" sz="1600" dirty="0">
+                <a:latin typeface="Segoe UI" panose="020B0502040204020203" pitchFamily="34" charset="0"/>
+                <a:cs typeface="Segoe UI" panose="020B0502040204020203" pitchFamily="34" charset="0"/>
+              </a:rPr>
+              <a:t>Date Sold: 12/18/2014</a:t>
+            </a:r>
+          </a:p>
+          <a:p>
+            <a:pPr marL="285750" indent="-285750">
+              <a:buFont typeface="Arial" panose="020B0604020202020204" pitchFamily="34" charset="0"/>
+              <a:buChar char="•"/>
+            </a:pPr>
+            <a:r>
+              <a:rPr lang="en-US" sz="1600" dirty="0">
+                <a:latin typeface="Segoe UI" panose="020B0502040204020203" pitchFamily="34" charset="0"/>
+                <a:cs typeface="Segoe UI" panose="020B0502040204020203" pitchFamily="34" charset="0"/>
+              </a:rPr>
+              <a:t>Sales Price: $349,900</a:t>
+            </a:r>
+          </a:p>
+        </p:txBody>
+      </p:sp>
+      <p:graphicFrame>
+        <p:nvGraphicFramePr>
+          <p:cNvPr id="3" name="Table 3">
+            <a:extLst>
+              <a:ext uri="{FF2B5EF4-FFF2-40B4-BE49-F238E27FC236}">
+                <a16:creationId xmlns:a16="http://schemas.microsoft.com/office/drawing/2014/main" id="{6EA24F72-C694-3E4D-855F-6122D79D8F03}"/>
+              </a:ext>
+            </a:extLst>
+          </p:cNvPr>
+          <p:cNvGraphicFramePr>
+            <a:graphicFrameLocks noGrp="1"/>
+          </p:cNvGraphicFramePr>
+          <p:nvPr>
+            <p:extLst>
+              <p:ext uri="{D42A27DB-BD31-4B8C-83A1-F6EECF244321}">
+                <p14:modId xmlns:p14="http://schemas.microsoft.com/office/powerpoint/2010/main" val="4233988996"/>
+              </p:ext>
+            </p:extLst>
+          </p:nvPr>
+        </p:nvGraphicFramePr>
+        <p:xfrm>
+          <a:off x="1249261" y="1027417"/>
+          <a:ext cx="5917757" cy="4394989"/>
+        </p:xfrm>
+        <a:graphic>
+          <a:graphicData uri="http://schemas.openxmlformats.org/drawingml/2006/table">
+            <a:tbl>
+              <a:tblPr firstRow="1" bandRow="1">
+                <a:tableStyleId>{5C22544A-7EE6-4342-B048-85BDC9FD1C3A}</a:tableStyleId>
+              </a:tblPr>
+              <a:tblGrid>
+                <a:gridCol w="2624991">
+                  <a:extLst>
+                    <a:ext uri="{9D8B030D-6E8A-4147-A177-3AD203B41FA5}">
+                      <a16:colId xmlns:a16="http://schemas.microsoft.com/office/drawing/2014/main" val="3658492227"/>
+                    </a:ext>
+                  </a:extLst>
+                </a:gridCol>
+                <a:gridCol w="1730104">
+                  <a:extLst>
+                    <a:ext uri="{9D8B030D-6E8A-4147-A177-3AD203B41FA5}">
+                      <a16:colId xmlns:a16="http://schemas.microsoft.com/office/drawing/2014/main" val="3003983270"/>
+                    </a:ext>
+                  </a:extLst>
+                </a:gridCol>
+                <a:gridCol w="1562662">
+                  <a:extLst>
+                    <a:ext uri="{9D8B030D-6E8A-4147-A177-3AD203B41FA5}">
+                      <a16:colId xmlns:a16="http://schemas.microsoft.com/office/drawing/2014/main" val="1376277345"/>
+                    </a:ext>
+                  </a:extLst>
+                </a:gridCol>
+              </a:tblGrid>
+              <a:tr h="603234">
+                <a:tc>
+                  <a:txBody>
+                    <a:bodyPr/>
+                    <a:lstStyle/>
+                    <a:p>
+                      <a:r>
+                        <a:rPr lang="en-US" sz="1600" dirty="0">
+                          <a:latin typeface="Segoe UI" panose="020B0502040204020203" pitchFamily="34" charset="0"/>
+                          <a:cs typeface="Segoe UI" panose="020B0502040204020203" pitchFamily="34" charset="0"/>
+                        </a:rPr>
+                        <a:t>Model Feature</a:t>
+                      </a:r>
+                    </a:p>
+                  </a:txBody>
+                  <a:tcPr anchor="ctr"/>
+                </a:tc>
+                <a:tc>
+                  <a:txBody>
+                    <a:bodyPr/>
+                    <a:lstStyle/>
+                    <a:p>
+                      <a:pPr algn="ctr"/>
+                      <a:r>
+                        <a:rPr lang="en-US" sz="1600" dirty="0">
+                          <a:latin typeface="Segoe UI" panose="020B0502040204020203" pitchFamily="34" charset="0"/>
+                          <a:cs typeface="Segoe UI" panose="020B0502040204020203" pitchFamily="34" charset="0"/>
+                        </a:rPr>
+                        <a:t>Rainy Paradise</a:t>
+                      </a:r>
+                    </a:p>
+                  </a:txBody>
+                  <a:tcPr anchor="ctr"/>
+                </a:tc>
+                <a:tc>
+                  <a:txBody>
+                    <a:bodyPr/>
+                    <a:lstStyle/>
+                    <a:p>
+                      <a:pPr algn="ctr"/>
+                      <a:r>
+                        <a:rPr lang="en-US" sz="1600" dirty="0">
+                          <a:latin typeface="Segoe UI" panose="020B0502040204020203" pitchFamily="34" charset="0"/>
+                          <a:cs typeface="Segoe UI" panose="020B0502040204020203" pitchFamily="34" charset="0"/>
+                        </a:rPr>
+                        <a:t>Feature Contribution</a:t>
+                      </a:r>
+                    </a:p>
+                  </a:txBody>
+                  <a:tcPr anchor="ctr"/>
+                </a:tc>
+                <a:extLst>
+                  <a:ext uri="{0D108BD9-81ED-4DB2-BD59-A6C34878D82A}">
+                    <a16:rowId xmlns:a16="http://schemas.microsoft.com/office/drawing/2014/main" val="3729680856"/>
+                  </a:ext>
+                </a:extLst>
+              </a:tr>
+              <a:tr h="344705">
+                <a:tc>
+                  <a:txBody>
+                    <a:bodyPr/>
+                    <a:lstStyle/>
+                    <a:p>
+                      <a:r>
+                        <a:rPr lang="en-US" sz="1600" dirty="0">
+                          <a:latin typeface="Segoe UI" panose="020B0502040204020203" pitchFamily="34" charset="0"/>
+                          <a:cs typeface="Segoe UI" panose="020B0502040204020203" pitchFamily="34" charset="0"/>
+                        </a:rPr>
+                        <a:t>Model Constant</a:t>
+                      </a:r>
+                    </a:p>
+                  </a:txBody>
+                  <a:tcPr/>
+                </a:tc>
+                <a:tc>
+                  <a:txBody>
+                    <a:bodyPr/>
+                    <a:lstStyle/>
+                    <a:p>
+                      <a:pPr algn="ctr"/>
+                      <a:r>
+                        <a:rPr lang="en-US" sz="1600" dirty="0">
+                          <a:latin typeface="Segoe UI" panose="020B0502040204020203" pitchFamily="34" charset="0"/>
+                          <a:cs typeface="Segoe UI" panose="020B0502040204020203" pitchFamily="34" charset="0"/>
+                        </a:rPr>
+                        <a:t>N/A</a:t>
+                      </a:r>
+                    </a:p>
+                  </a:txBody>
+                  <a:tcPr/>
+                </a:tc>
+                <a:tc>
+                  <a:txBody>
+                    <a:bodyPr/>
+                    <a:lstStyle/>
+                    <a:p>
+                      <a:pPr algn="ctr"/>
+                      <a:r>
+                        <a:rPr lang="en-US" sz="1600" dirty="0">
+                          <a:latin typeface="Segoe UI" panose="020B0502040204020203" pitchFamily="34" charset="0"/>
+                          <a:cs typeface="Segoe UI" panose="020B0502040204020203" pitchFamily="34" charset="0"/>
+                        </a:rPr>
+                        <a:t>23%</a:t>
+                      </a:r>
+                    </a:p>
+                  </a:txBody>
+                  <a:tcPr/>
+                </a:tc>
+                <a:extLst>
+                  <a:ext uri="{0D108BD9-81ED-4DB2-BD59-A6C34878D82A}">
+                    <a16:rowId xmlns:a16="http://schemas.microsoft.com/office/drawing/2014/main" val="908507534"/>
+                  </a:ext>
+                </a:extLst>
+              </a:tr>
+              <a:tr h="344705">
+                <a:tc>
+                  <a:txBody>
+                    <a:bodyPr/>
+                    <a:lstStyle/>
+                    <a:p>
+                      <a:r>
+                        <a:rPr lang="en-US" sz="1600" dirty="0">
+                          <a:latin typeface="Segoe UI" panose="020B0502040204020203" pitchFamily="34" charset="0"/>
+                          <a:cs typeface="Segoe UI" panose="020B0502040204020203" pitchFamily="34" charset="0"/>
+                        </a:rPr>
+                        <a:t>Living Sq. Ft. </a:t>
+                      </a:r>
+                    </a:p>
+                  </a:txBody>
+                  <a:tcPr/>
+                </a:tc>
+                <a:tc>
+                  <a:txBody>
+                    <a:bodyPr/>
+                    <a:lstStyle/>
+                    <a:p>
+                      <a:pPr algn="ctr"/>
+                      <a:r>
+                        <a:rPr lang="en-US" sz="1600" dirty="0">
+                          <a:latin typeface="Segoe UI" panose="020B0502040204020203" pitchFamily="34" charset="0"/>
+                          <a:cs typeface="Segoe UI" panose="020B0502040204020203" pitchFamily="34" charset="0"/>
+                        </a:rPr>
+                        <a:t>2,530</a:t>
+                      </a:r>
+                    </a:p>
+                  </a:txBody>
+                  <a:tcPr/>
+                </a:tc>
+                <a:tc>
+                  <a:txBody>
+                    <a:bodyPr/>
+                    <a:lstStyle/>
+                    <a:p>
+                      <a:pPr algn="ctr"/>
+                      <a:r>
+                        <a:rPr lang="en-US" sz="1600" dirty="0">
+                          <a:latin typeface="Segoe UI" panose="020B0502040204020203" pitchFamily="34" charset="0"/>
+                          <a:cs typeface="Segoe UI" panose="020B0502040204020203" pitchFamily="34" charset="0"/>
+                        </a:rPr>
+                        <a:t>26%</a:t>
+                      </a:r>
+                    </a:p>
+                  </a:txBody>
+                  <a:tcPr/>
+                </a:tc>
+                <a:extLst>
+                  <a:ext uri="{0D108BD9-81ED-4DB2-BD59-A6C34878D82A}">
+                    <a16:rowId xmlns:a16="http://schemas.microsoft.com/office/drawing/2014/main" val="3237244668"/>
+                  </a:ext>
+                </a:extLst>
+              </a:tr>
+              <a:tr h="344705">
+                <a:tc>
+                  <a:txBody>
+                    <a:bodyPr/>
+                    <a:lstStyle/>
+                    <a:p>
+                      <a:r>
+                        <a:rPr lang="en-US" sz="1600" dirty="0">
+                          <a:latin typeface="Segoe UI" panose="020B0502040204020203" pitchFamily="34" charset="0"/>
+                          <a:cs typeface="Segoe UI" panose="020B0502040204020203" pitchFamily="34" charset="0"/>
+                        </a:rPr>
+                        <a:t>Sq. Ft. Per Bedroom</a:t>
+                      </a:r>
+                    </a:p>
+                  </a:txBody>
+                  <a:tcPr/>
+                </a:tc>
+                <a:tc>
+                  <a:txBody>
+                    <a:bodyPr/>
+                    <a:lstStyle/>
+                    <a:p>
+                      <a:pPr algn="ctr"/>
+                      <a:r>
+                        <a:rPr lang="en-US" sz="1600" dirty="0">
+                          <a:latin typeface="Segoe UI" panose="020B0502040204020203" pitchFamily="34" charset="0"/>
+                          <a:cs typeface="Segoe UI" panose="020B0502040204020203" pitchFamily="34" charset="0"/>
+                        </a:rPr>
+                        <a:t>506</a:t>
+                      </a:r>
+                    </a:p>
+                  </a:txBody>
+                  <a:tcPr/>
+                </a:tc>
+                <a:tc>
+                  <a:txBody>
+                    <a:bodyPr/>
+                    <a:lstStyle/>
+                    <a:p>
+                      <a:pPr algn="ctr"/>
+                      <a:r>
+                        <a:rPr lang="en-US" sz="1600" dirty="0">
+                          <a:latin typeface="Segoe UI" panose="020B0502040204020203" pitchFamily="34" charset="0"/>
+                          <a:cs typeface="Segoe UI" panose="020B0502040204020203" pitchFamily="34" charset="0"/>
+                        </a:rPr>
+                        <a:t>5%</a:t>
+                      </a:r>
+                    </a:p>
+                  </a:txBody>
+                  <a:tcPr/>
+                </a:tc>
+                <a:extLst>
+                  <a:ext uri="{0D108BD9-81ED-4DB2-BD59-A6C34878D82A}">
+                    <a16:rowId xmlns:a16="http://schemas.microsoft.com/office/drawing/2014/main" val="3458064410"/>
+                  </a:ext>
+                </a:extLst>
+              </a:tr>
+              <a:tr h="344705">
+                <a:tc>
+                  <a:txBody>
+                    <a:bodyPr/>
+                    <a:lstStyle/>
+                    <a:p>
+                      <a:r>
+                        <a:rPr lang="en-US" sz="1600" dirty="0">
+                          <a:latin typeface="Segoe UI" panose="020B0502040204020203" pitchFamily="34" charset="0"/>
+                          <a:cs typeface="Segoe UI" panose="020B0502040204020203" pitchFamily="34" charset="0"/>
+                        </a:rPr>
+                        <a:t>View</a:t>
+                      </a:r>
+                    </a:p>
+                  </a:txBody>
+                  <a:tcPr/>
+                </a:tc>
+                <a:tc>
+                  <a:txBody>
+                    <a:bodyPr/>
+                    <a:lstStyle/>
+                    <a:p>
+                      <a:pPr algn="ctr"/>
+                      <a:r>
+                        <a:rPr lang="en-US" sz="1600" dirty="0">
+                          <a:latin typeface="Segoe UI" panose="020B0502040204020203" pitchFamily="34" charset="0"/>
+                          <a:cs typeface="Segoe UI" panose="020B0502040204020203" pitchFamily="34" charset="0"/>
+                        </a:rPr>
+                        <a:t>0 (None)</a:t>
+                      </a:r>
+                    </a:p>
+                  </a:txBody>
+                  <a:tcPr/>
+                </a:tc>
+                <a:tc>
+                  <a:txBody>
+                    <a:bodyPr/>
+                    <a:lstStyle/>
+                    <a:p>
+                      <a:pPr algn="ctr"/>
+                      <a:r>
+                        <a:rPr lang="en-US" sz="1600" dirty="0">
+                          <a:latin typeface="Segoe UI" panose="020B0502040204020203" pitchFamily="34" charset="0"/>
+                          <a:cs typeface="Segoe UI" panose="020B0502040204020203" pitchFamily="34" charset="0"/>
+                        </a:rPr>
+                        <a:t>0%</a:t>
+                      </a:r>
+                    </a:p>
+                  </a:txBody>
+                  <a:tcPr/>
+                </a:tc>
+                <a:extLst>
+                  <a:ext uri="{0D108BD9-81ED-4DB2-BD59-A6C34878D82A}">
+                    <a16:rowId xmlns:a16="http://schemas.microsoft.com/office/drawing/2014/main" val="2581006958"/>
+                  </a:ext>
+                </a:extLst>
+              </a:tr>
+              <a:tr h="344705">
+                <a:tc>
+                  <a:txBody>
+                    <a:bodyPr/>
+                    <a:lstStyle/>
+                    <a:p>
+                      <a:r>
+                        <a:rPr lang="en-US" sz="1600" dirty="0">
+                          <a:latin typeface="Segoe UI" panose="020B0502040204020203" pitchFamily="34" charset="0"/>
+                          <a:cs typeface="Segoe UI" panose="020B0502040204020203" pitchFamily="34" charset="0"/>
+                        </a:rPr>
+                        <a:t>Grade</a:t>
+                      </a:r>
+                    </a:p>
+                  </a:txBody>
+                  <a:tcPr/>
+                </a:tc>
+                <a:tc>
+                  <a:txBody>
+                    <a:bodyPr/>
+                    <a:lstStyle/>
+                    <a:p>
+                      <a:pPr algn="ctr"/>
+                      <a:r>
+                        <a:rPr lang="en-US" sz="1600" dirty="0">
+                          <a:latin typeface="Segoe UI" panose="020B0502040204020203" pitchFamily="34" charset="0"/>
+                          <a:cs typeface="Segoe UI" panose="020B0502040204020203" pitchFamily="34" charset="0"/>
+                        </a:rPr>
+                        <a:t>7 (Average)</a:t>
+                      </a:r>
+                    </a:p>
+                  </a:txBody>
+                  <a:tcPr/>
+                </a:tc>
+                <a:tc>
+                  <a:txBody>
+                    <a:bodyPr/>
+                    <a:lstStyle/>
+                    <a:p>
+                      <a:pPr algn="ctr"/>
+                      <a:r>
+                        <a:rPr lang="en-US" sz="1600" dirty="0">
+                          <a:latin typeface="Segoe UI" panose="020B0502040204020203" pitchFamily="34" charset="0"/>
+                          <a:cs typeface="Segoe UI" panose="020B0502040204020203" pitchFamily="34" charset="0"/>
+                        </a:rPr>
+                        <a:t>9%</a:t>
+                      </a:r>
+                    </a:p>
+                  </a:txBody>
+                  <a:tcPr/>
+                </a:tc>
+                <a:extLst>
+                  <a:ext uri="{0D108BD9-81ED-4DB2-BD59-A6C34878D82A}">
+                    <a16:rowId xmlns:a16="http://schemas.microsoft.com/office/drawing/2014/main" val="1182408917"/>
+                  </a:ext>
+                </a:extLst>
+              </a:tr>
+              <a:tr h="344705">
+                <a:tc>
+                  <a:txBody>
+                    <a:bodyPr/>
+                    <a:lstStyle/>
+                    <a:p>
+                      <a:r>
+                        <a:rPr lang="en-US" sz="1600" dirty="0">
+                          <a:latin typeface="Segoe UI" panose="020B0502040204020203" pitchFamily="34" charset="0"/>
+                          <a:cs typeface="Segoe UI" panose="020B0502040204020203" pitchFamily="34" charset="0"/>
+                        </a:rPr>
+                        <a:t>Renovation</a:t>
+                      </a:r>
+                    </a:p>
+                  </a:txBody>
+                  <a:tcPr/>
+                </a:tc>
+                <a:tc>
+                  <a:txBody>
+                    <a:bodyPr/>
+                    <a:lstStyle/>
+                    <a:p>
+                      <a:pPr algn="ctr"/>
+                      <a:r>
+                        <a:rPr lang="en-US" sz="1600" dirty="0">
+                          <a:latin typeface="Segoe UI" panose="020B0502040204020203" pitchFamily="34" charset="0"/>
+                          <a:cs typeface="Segoe UI" panose="020B0502040204020203" pitchFamily="34" charset="0"/>
+                        </a:rPr>
+                        <a:t>0 (No)</a:t>
+                      </a:r>
+                    </a:p>
+                  </a:txBody>
+                  <a:tcPr/>
+                </a:tc>
+                <a:tc>
+                  <a:txBody>
+                    <a:bodyPr/>
+                    <a:lstStyle/>
+                    <a:p>
+                      <a:pPr marL="0" marR="0" lvl="0" indent="0" algn="ctr" defTabSz="914332" rtl="0" eaLnBrk="1" fontAlgn="auto" latinLnBrk="0" hangingPunct="1">
+                        <a:lnSpc>
+                          <a:spcPct val="100000"/>
+                        </a:lnSpc>
+                        <a:spcBef>
+                          <a:spcPts val="0"/>
+                        </a:spcBef>
+                        <a:spcAft>
+                          <a:spcPts val="0"/>
+                        </a:spcAft>
+                        <a:buClrTx/>
+                        <a:buSzTx/>
+                        <a:buFontTx/>
+                        <a:buNone/>
+                        <a:tabLst/>
+                        <a:defRPr/>
+                      </a:pPr>
+                      <a:r>
+                        <a:rPr lang="en-US" sz="1600" dirty="0">
+                          <a:latin typeface="Segoe UI" panose="020B0502040204020203" pitchFamily="34" charset="0"/>
+                          <a:cs typeface="Segoe UI" panose="020B0502040204020203" pitchFamily="34" charset="0"/>
+                        </a:rPr>
+                        <a:t>0%</a:t>
+                      </a:r>
+                    </a:p>
+                  </a:txBody>
+                  <a:tcPr/>
+                </a:tc>
+                <a:extLst>
+                  <a:ext uri="{0D108BD9-81ED-4DB2-BD59-A6C34878D82A}">
+                    <a16:rowId xmlns:a16="http://schemas.microsoft.com/office/drawing/2014/main" val="3615020335"/>
+                  </a:ext>
+                </a:extLst>
+              </a:tr>
+              <a:tr h="344705">
+                <a:tc>
+                  <a:txBody>
+                    <a:bodyPr/>
+                    <a:lstStyle/>
+                    <a:p>
+                      <a:r>
+                        <a:rPr lang="en-US" sz="1600" dirty="0">
+                          <a:latin typeface="Segoe UI" panose="020B0502040204020203" pitchFamily="34" charset="0"/>
+                          <a:cs typeface="Segoe UI" panose="020B0502040204020203" pitchFamily="34" charset="0"/>
+                        </a:rPr>
+                        <a:t>Waterfront</a:t>
+                      </a:r>
+                    </a:p>
+                  </a:txBody>
+                  <a:tcPr/>
+                </a:tc>
+                <a:tc>
+                  <a:txBody>
+                    <a:bodyPr/>
+                    <a:lstStyle/>
+                    <a:p>
+                      <a:pPr algn="ctr"/>
+                      <a:r>
+                        <a:rPr lang="en-US" sz="1600" dirty="0">
+                          <a:latin typeface="Segoe UI" panose="020B0502040204020203" pitchFamily="34" charset="0"/>
+                          <a:cs typeface="Segoe UI" panose="020B0502040204020203" pitchFamily="34" charset="0"/>
+                        </a:rPr>
+                        <a:t>0 (No)</a:t>
+                      </a:r>
+                    </a:p>
+                  </a:txBody>
+                  <a:tcPr/>
+                </a:tc>
+                <a:tc>
+                  <a:txBody>
+                    <a:bodyPr/>
+                    <a:lstStyle/>
+                    <a:p>
+                      <a:pPr algn="ctr"/>
+                      <a:r>
+                        <a:rPr lang="en-US" sz="1600" dirty="0">
+                          <a:latin typeface="Segoe UI" panose="020B0502040204020203" pitchFamily="34" charset="0"/>
+                          <a:cs typeface="Segoe UI" panose="020B0502040204020203" pitchFamily="34" charset="0"/>
+                        </a:rPr>
+                        <a:t>0%</a:t>
+                      </a:r>
+                    </a:p>
+                  </a:txBody>
+                  <a:tcPr/>
+                </a:tc>
+                <a:extLst>
+                  <a:ext uri="{0D108BD9-81ED-4DB2-BD59-A6C34878D82A}">
+                    <a16:rowId xmlns:a16="http://schemas.microsoft.com/office/drawing/2014/main" val="3177232873"/>
+                  </a:ext>
+                </a:extLst>
+              </a:tr>
+              <a:tr h="344705">
+                <a:tc>
+                  <a:txBody>
+                    <a:bodyPr/>
+                    <a:lstStyle/>
+                    <a:p>
+                      <a:r>
+                        <a:rPr lang="en-US" sz="1600" dirty="0">
+                          <a:latin typeface="Segoe UI" panose="020B0502040204020203" pitchFamily="34" charset="0"/>
+                          <a:cs typeface="Segoe UI" panose="020B0502040204020203" pitchFamily="34" charset="0"/>
+                        </a:rPr>
+                        <a:t>Basement</a:t>
+                      </a:r>
+                    </a:p>
+                  </a:txBody>
+                  <a:tcPr/>
+                </a:tc>
+                <a:tc>
+                  <a:txBody>
+                    <a:bodyPr/>
+                    <a:lstStyle/>
+                    <a:p>
+                      <a:pPr algn="ctr"/>
+                      <a:r>
+                        <a:rPr lang="en-US" sz="1600" dirty="0">
+                          <a:latin typeface="Segoe UI" panose="020B0502040204020203" pitchFamily="34" charset="0"/>
+                          <a:cs typeface="Segoe UI" panose="020B0502040204020203" pitchFamily="34" charset="0"/>
+                        </a:rPr>
+                        <a:t>0 (No)</a:t>
+                      </a:r>
+                    </a:p>
+                  </a:txBody>
+                  <a:tcPr/>
+                </a:tc>
+                <a:tc>
+                  <a:txBody>
+                    <a:bodyPr/>
+                    <a:lstStyle/>
+                    <a:p>
+                      <a:pPr algn="ctr"/>
+                      <a:r>
+                        <a:rPr lang="en-US" sz="1600" dirty="0">
+                          <a:latin typeface="Segoe UI" panose="020B0502040204020203" pitchFamily="34" charset="0"/>
+                          <a:cs typeface="Segoe UI" panose="020B0502040204020203" pitchFamily="34" charset="0"/>
+                        </a:rPr>
+                        <a:t>0%</a:t>
+                      </a:r>
+                    </a:p>
+                  </a:txBody>
+                  <a:tcPr/>
+                </a:tc>
+                <a:extLst>
+                  <a:ext uri="{0D108BD9-81ED-4DB2-BD59-A6C34878D82A}">
+                    <a16:rowId xmlns:a16="http://schemas.microsoft.com/office/drawing/2014/main" val="2071199360"/>
+                  </a:ext>
+                </a:extLst>
+              </a:tr>
+              <a:tr h="344705">
+                <a:tc>
+                  <a:txBody>
+                    <a:bodyPr/>
+                    <a:lstStyle/>
+                    <a:p>
+                      <a:r>
+                        <a:rPr lang="en-US" sz="1600" dirty="0">
+                          <a:latin typeface="Segoe UI" panose="020B0502040204020203" pitchFamily="34" charset="0"/>
+                          <a:cs typeface="Segoe UI" panose="020B0502040204020203" pitchFamily="34" charset="0"/>
+                        </a:rPr>
+                        <a:t>Condition</a:t>
+                      </a:r>
+                    </a:p>
+                  </a:txBody>
+                  <a:tcPr/>
+                </a:tc>
+                <a:tc>
+                  <a:txBody>
+                    <a:bodyPr/>
+                    <a:lstStyle/>
+                    <a:p>
+                      <a:pPr algn="ctr"/>
+                      <a:r>
+                        <a:rPr lang="en-US" sz="1600" dirty="0">
+                          <a:latin typeface="Segoe UI" panose="020B0502040204020203" pitchFamily="34" charset="0"/>
+                          <a:cs typeface="Segoe UI" panose="020B0502040204020203" pitchFamily="34" charset="0"/>
+                        </a:rPr>
+                        <a:t>3 (Average)</a:t>
+                      </a:r>
+                    </a:p>
+                  </a:txBody>
+                  <a:tcPr/>
+                </a:tc>
+                <a:tc>
+                  <a:txBody>
+                    <a:bodyPr/>
+                    <a:lstStyle/>
+                    <a:p>
+                      <a:pPr algn="ctr"/>
+                      <a:r>
+                        <a:rPr lang="en-US" sz="1600" dirty="0">
+                          <a:latin typeface="Segoe UI" panose="020B0502040204020203" pitchFamily="34" charset="0"/>
+                          <a:cs typeface="Segoe UI" panose="020B0502040204020203" pitchFamily="34" charset="0"/>
+                        </a:rPr>
+                        <a:t>2%</a:t>
+                      </a:r>
+                    </a:p>
+                  </a:txBody>
+                  <a:tcPr/>
+                </a:tc>
+                <a:extLst>
+                  <a:ext uri="{0D108BD9-81ED-4DB2-BD59-A6C34878D82A}">
+                    <a16:rowId xmlns:a16="http://schemas.microsoft.com/office/drawing/2014/main" val="1470037732"/>
+                  </a:ext>
+                </a:extLst>
+              </a:tr>
+              <a:tr h="344705">
+                <a:tc>
+                  <a:txBody>
+                    <a:bodyPr/>
+                    <a:lstStyle/>
+                    <a:p>
+                      <a:r>
+                        <a:rPr lang="en-US" sz="1600" dirty="0">
+                          <a:latin typeface="Segoe UI" panose="020B0502040204020203" pitchFamily="34" charset="0"/>
+                          <a:cs typeface="Segoe UI" panose="020B0502040204020203" pitchFamily="34" charset="0"/>
+                        </a:rPr>
+                        <a:t>Miles From Seattle</a:t>
+                      </a:r>
+                    </a:p>
+                  </a:txBody>
+                  <a:tcPr/>
+                </a:tc>
+                <a:tc>
+                  <a:txBody>
+                    <a:bodyPr/>
+                    <a:lstStyle/>
+                    <a:p>
+                      <a:pPr algn="ctr"/>
+                      <a:r>
+                        <a:rPr lang="en-US" sz="1600" dirty="0">
+                          <a:latin typeface="Segoe UI" panose="020B0502040204020203" pitchFamily="34" charset="0"/>
+                          <a:cs typeface="Segoe UI" panose="020B0502040204020203" pitchFamily="34" charset="0"/>
+                        </a:rPr>
+                        <a:t>6.95</a:t>
+                      </a:r>
+                    </a:p>
+                  </a:txBody>
+                  <a:tcPr/>
+                </a:tc>
+                <a:tc>
+                  <a:txBody>
+                    <a:bodyPr/>
+                    <a:lstStyle/>
+                    <a:p>
+                      <a:pPr algn="ctr"/>
+                      <a:r>
+                        <a:rPr lang="en-US" sz="1600" dirty="0">
+                          <a:latin typeface="Segoe UI" panose="020B0502040204020203" pitchFamily="34" charset="0"/>
+                          <a:cs typeface="Segoe UI" panose="020B0502040204020203" pitchFamily="34" charset="0"/>
+                        </a:rPr>
+                        <a:t>0.2%</a:t>
+                      </a:r>
+                    </a:p>
+                  </a:txBody>
+                  <a:tcPr/>
+                </a:tc>
+                <a:extLst>
+                  <a:ext uri="{0D108BD9-81ED-4DB2-BD59-A6C34878D82A}">
+                    <a16:rowId xmlns:a16="http://schemas.microsoft.com/office/drawing/2014/main" val="3552354508"/>
+                  </a:ext>
+                </a:extLst>
+              </a:tr>
+              <a:tr h="344705">
+                <a:tc>
+                  <a:txBody>
+                    <a:bodyPr/>
+                    <a:lstStyle/>
+                    <a:p>
+                      <a:r>
+                        <a:rPr lang="en-US" sz="1600" dirty="0">
+                          <a:latin typeface="Segoe UI" panose="020B0502040204020203" pitchFamily="34" charset="0"/>
+                          <a:cs typeface="Segoe UI" panose="020B0502040204020203" pitchFamily="34" charset="0"/>
+                        </a:rPr>
+                        <a:t>Zip Code Price Per Sq. Ft.</a:t>
+                      </a:r>
+                    </a:p>
+                  </a:txBody>
+                  <a:tcPr/>
+                </a:tc>
+                <a:tc>
+                  <a:txBody>
+                    <a:bodyPr/>
+                    <a:lstStyle/>
+                    <a:p>
+                      <a:pPr algn="ctr"/>
+                      <a:r>
+                        <a:rPr lang="en-US" sz="1600" dirty="0">
+                          <a:latin typeface="Segoe UI" panose="020B0502040204020203" pitchFamily="34" charset="0"/>
+                          <a:cs typeface="Segoe UI" panose="020B0502040204020203" pitchFamily="34" charset="0"/>
+                        </a:rPr>
+                        <a:t>$</a:t>
+                      </a:r>
+                      <a:r>
+                        <a:rPr lang="en-US" sz="1600" b="0" i="0" kern="1200" dirty="0">
+                          <a:solidFill>
+                            <a:schemeClr val="dk1"/>
+                          </a:solidFill>
+                          <a:effectLst/>
+                          <a:latin typeface="Segoe UI" panose="020B0502040204020203" pitchFamily="34" charset="0"/>
+                          <a:ea typeface="+mn-ea"/>
+                          <a:cs typeface="Segoe UI" panose="020B0502040204020203" pitchFamily="34" charset="0"/>
+                        </a:rPr>
+                        <a:t>201.82</a:t>
+                      </a:r>
+                      <a:endParaRPr lang="en-US" sz="1600" dirty="0">
+                        <a:latin typeface="Segoe UI" panose="020B0502040204020203" pitchFamily="34" charset="0"/>
+                        <a:cs typeface="Segoe UI" panose="020B0502040204020203" pitchFamily="34" charset="0"/>
+                      </a:endParaRPr>
+                    </a:p>
+                  </a:txBody>
+                  <a:tcPr/>
+                </a:tc>
+                <a:tc>
+                  <a:txBody>
+                    <a:bodyPr/>
+                    <a:lstStyle/>
+                    <a:p>
+                      <a:pPr algn="ctr"/>
+                      <a:r>
+                        <a:rPr lang="en-US" sz="1600" dirty="0">
+                          <a:latin typeface="Segoe UI" panose="020B0502040204020203" pitchFamily="34" charset="0"/>
+                          <a:cs typeface="Segoe UI" panose="020B0502040204020203" pitchFamily="34" charset="0"/>
+                        </a:rPr>
+                        <a:t>36%</a:t>
+                      </a:r>
+                    </a:p>
+                  </a:txBody>
+                  <a:tcPr/>
+                </a:tc>
+                <a:extLst>
+                  <a:ext uri="{0D108BD9-81ED-4DB2-BD59-A6C34878D82A}">
+                    <a16:rowId xmlns:a16="http://schemas.microsoft.com/office/drawing/2014/main" val="1248744339"/>
+                  </a:ext>
+                </a:extLst>
+              </a:tr>
+            </a:tbl>
+          </a:graphicData>
+        </a:graphic>
+      </p:graphicFrame>
+      <p:sp>
+        <p:nvSpPr>
+          <p:cNvPr id="4" name="TextBox 3">
+            <a:extLst>
+              <a:ext uri="{FF2B5EF4-FFF2-40B4-BE49-F238E27FC236}">
+                <a16:creationId xmlns:a16="http://schemas.microsoft.com/office/drawing/2014/main" id="{A5DA24E2-0CDE-4946-ABF6-C5372C05E80F}"/>
+              </a:ext>
+            </a:extLst>
+          </p:cNvPr>
+          <p:cNvSpPr txBox="1"/>
+          <p:nvPr/>
+        </p:nvSpPr>
+        <p:spPr>
+          <a:xfrm>
+            <a:off x="3021044" y="5427912"/>
+            <a:ext cx="2533771" cy="369332"/>
+          </a:xfrm>
+          <a:prstGeom prst="rect">
+            <a:avLst/>
+          </a:prstGeom>
+          <a:noFill/>
+        </p:spPr>
+        <p:txBody>
+          <a:bodyPr wrap="none" rtlCol="0">
+            <a:spAutoFit/>
+          </a:bodyPr>
+          <a:lstStyle/>
+          <a:p>
+            <a:r>
+              <a:rPr lang="en-US" b="1" dirty="0">
+                <a:latin typeface="Segoe UI" panose="020B0502040204020203" pitchFamily="34" charset="0"/>
+                <a:cs typeface="Segoe UI" panose="020B0502040204020203" pitchFamily="34" charset="0"/>
+              </a:rPr>
+              <a:t>Predicted Home Price</a:t>
+            </a:r>
+          </a:p>
+        </p:txBody>
+      </p:sp>
+      <p:sp>
+        <p:nvSpPr>
+          <p:cNvPr id="17" name="TextBox 16">
+            <a:extLst>
+              <a:ext uri="{FF2B5EF4-FFF2-40B4-BE49-F238E27FC236}">
+                <a16:creationId xmlns:a16="http://schemas.microsoft.com/office/drawing/2014/main" id="{AB77895D-AE93-9447-AD4F-5E10AB074DDE}"/>
+              </a:ext>
+            </a:extLst>
+          </p:cNvPr>
+          <p:cNvSpPr txBox="1"/>
+          <p:nvPr/>
+        </p:nvSpPr>
+        <p:spPr>
+          <a:xfrm>
+            <a:off x="5800901" y="5427912"/>
+            <a:ext cx="1178528" cy="369332"/>
+          </a:xfrm>
+          <a:prstGeom prst="rect">
+            <a:avLst/>
+          </a:prstGeom>
+          <a:noFill/>
+        </p:spPr>
+        <p:txBody>
+          <a:bodyPr wrap="none" rtlCol="0">
+            <a:spAutoFit/>
+          </a:bodyPr>
+          <a:lstStyle/>
+          <a:p>
+            <a:r>
+              <a:rPr lang="en-US" b="1" dirty="0">
+                <a:latin typeface="Segoe UI" panose="020B0502040204020203" pitchFamily="34" charset="0"/>
+                <a:cs typeface="Segoe UI" panose="020B0502040204020203" pitchFamily="34" charset="0"/>
+              </a:rPr>
+              <a:t>$375,586</a:t>
+            </a:r>
+          </a:p>
+        </p:txBody>
+      </p:sp>
+      <p:sp>
+        <p:nvSpPr>
+          <p:cNvPr id="18" name="TextBox 17">
+            <a:extLst>
+              <a:ext uri="{FF2B5EF4-FFF2-40B4-BE49-F238E27FC236}">
+                <a16:creationId xmlns:a16="http://schemas.microsoft.com/office/drawing/2014/main" id="{67517C8F-55DF-8C41-B066-B7454ECC8ECE}"/>
+              </a:ext>
+            </a:extLst>
+          </p:cNvPr>
+          <p:cNvSpPr txBox="1"/>
+          <p:nvPr/>
+        </p:nvSpPr>
+        <p:spPr>
+          <a:xfrm>
+            <a:off x="3598830" y="5728435"/>
+            <a:ext cx="1955985" cy="369332"/>
+          </a:xfrm>
+          <a:prstGeom prst="rect">
+            <a:avLst/>
+          </a:prstGeom>
+          <a:noFill/>
+        </p:spPr>
+        <p:txBody>
+          <a:bodyPr wrap="none" rtlCol="0">
+            <a:spAutoFit/>
+          </a:bodyPr>
+          <a:lstStyle/>
+          <a:p>
+            <a:r>
+              <a:rPr lang="en-US" dirty="0">
+                <a:latin typeface="Segoe UI" panose="020B0502040204020203" pitchFamily="34" charset="0"/>
+                <a:cs typeface="Segoe UI" panose="020B0502040204020203" pitchFamily="34" charset="0"/>
+              </a:rPr>
+              <a:t>Actual Sales Price</a:t>
+            </a:r>
+          </a:p>
+        </p:txBody>
+      </p:sp>
+      <p:sp>
+        <p:nvSpPr>
+          <p:cNvPr id="19" name="TextBox 18">
+            <a:extLst>
+              <a:ext uri="{FF2B5EF4-FFF2-40B4-BE49-F238E27FC236}">
+                <a16:creationId xmlns:a16="http://schemas.microsoft.com/office/drawing/2014/main" id="{7BDA9867-C37C-9F41-B536-36B500A92E81}"/>
+              </a:ext>
+            </a:extLst>
+          </p:cNvPr>
+          <p:cNvSpPr txBox="1"/>
+          <p:nvPr/>
+        </p:nvSpPr>
+        <p:spPr>
+          <a:xfrm>
+            <a:off x="5869830" y="5728435"/>
+            <a:ext cx="1109599" cy="369332"/>
+          </a:xfrm>
+          <a:prstGeom prst="rect">
+            <a:avLst/>
+          </a:prstGeom>
+          <a:noFill/>
+        </p:spPr>
+        <p:txBody>
+          <a:bodyPr wrap="none" rtlCol="0">
+            <a:spAutoFit/>
+          </a:bodyPr>
+          <a:lstStyle/>
+          <a:p>
+            <a:r>
+              <a:rPr lang="en-US" dirty="0">
+                <a:latin typeface="Segoe UI" panose="020B0502040204020203" pitchFamily="34" charset="0"/>
+                <a:cs typeface="Segoe UI" panose="020B0502040204020203" pitchFamily="34" charset="0"/>
+              </a:rPr>
+              <a:t>$349,900</a:t>
+            </a:r>
+          </a:p>
+        </p:txBody>
+      </p:sp>
+      <p:sp>
+        <p:nvSpPr>
+          <p:cNvPr id="20" name="TextBox 19">
+            <a:extLst>
+              <a:ext uri="{FF2B5EF4-FFF2-40B4-BE49-F238E27FC236}">
+                <a16:creationId xmlns:a16="http://schemas.microsoft.com/office/drawing/2014/main" id="{081C1CAD-0BB3-DB47-A44F-FFF86773B2C9}"/>
+              </a:ext>
+            </a:extLst>
+          </p:cNvPr>
+          <p:cNvSpPr txBox="1"/>
+          <p:nvPr/>
+        </p:nvSpPr>
+        <p:spPr>
+          <a:xfrm>
+            <a:off x="3799719" y="6016353"/>
+            <a:ext cx="1755096" cy="369332"/>
+          </a:xfrm>
+          <a:prstGeom prst="rect">
+            <a:avLst/>
+          </a:prstGeom>
+          <a:noFill/>
+        </p:spPr>
+        <p:txBody>
+          <a:bodyPr wrap="none" rtlCol="0">
+            <a:spAutoFit/>
+          </a:bodyPr>
+          <a:lstStyle/>
+          <a:p>
+            <a:r>
+              <a:rPr lang="en-US" dirty="0">
+                <a:latin typeface="Segoe UI" panose="020B0502040204020203" pitchFamily="34" charset="0"/>
+                <a:cs typeface="Segoe UI" panose="020B0502040204020203" pitchFamily="34" charset="0"/>
+              </a:rPr>
+              <a:t>Model Variance</a:t>
+            </a:r>
+          </a:p>
+        </p:txBody>
+      </p:sp>
+      <p:sp>
+        <p:nvSpPr>
+          <p:cNvPr id="22" name="TextBox 21">
+            <a:extLst>
+              <a:ext uri="{FF2B5EF4-FFF2-40B4-BE49-F238E27FC236}">
+                <a16:creationId xmlns:a16="http://schemas.microsoft.com/office/drawing/2014/main" id="{33391CD1-F9FF-A14C-B88E-42F1B3F916A6}"/>
+              </a:ext>
+            </a:extLst>
+          </p:cNvPr>
+          <p:cNvSpPr txBox="1"/>
+          <p:nvPr/>
+        </p:nvSpPr>
+        <p:spPr>
+          <a:xfrm>
+            <a:off x="5994864" y="6016353"/>
+            <a:ext cx="984565" cy="369332"/>
+          </a:xfrm>
+          <a:prstGeom prst="rect">
+            <a:avLst/>
+          </a:prstGeom>
+          <a:noFill/>
+        </p:spPr>
+        <p:txBody>
+          <a:bodyPr wrap="none" rtlCol="0">
+            <a:spAutoFit/>
+          </a:bodyPr>
+          <a:lstStyle/>
+          <a:p>
+            <a:r>
+              <a:rPr lang="en-US" dirty="0">
+                <a:latin typeface="Segoe UI" panose="020B0502040204020203" pitchFamily="34" charset="0"/>
+                <a:cs typeface="Segoe UI" panose="020B0502040204020203" pitchFamily="34" charset="0"/>
+              </a:rPr>
+              <a:t>$25,686</a:t>
+            </a:r>
+          </a:p>
+        </p:txBody>
+      </p:sp>
+      <p:sp>
+        <p:nvSpPr>
+          <p:cNvPr id="23" name="TextBox 22">
+            <a:extLst>
+              <a:ext uri="{FF2B5EF4-FFF2-40B4-BE49-F238E27FC236}">
+                <a16:creationId xmlns:a16="http://schemas.microsoft.com/office/drawing/2014/main" id="{79ECEFBD-638C-6448-A889-42A907737F02}"/>
+              </a:ext>
+            </a:extLst>
+          </p:cNvPr>
+          <p:cNvSpPr txBox="1"/>
+          <p:nvPr/>
+        </p:nvSpPr>
+        <p:spPr>
+          <a:xfrm>
+            <a:off x="8405016" y="809395"/>
+            <a:ext cx="2194960" cy="369332"/>
+          </a:xfrm>
+          <a:prstGeom prst="rect">
+            <a:avLst/>
+          </a:prstGeom>
+          <a:noFill/>
+        </p:spPr>
+        <p:txBody>
+          <a:bodyPr wrap="none" rtlCol="0">
+            <a:spAutoFit/>
+          </a:bodyPr>
+          <a:lstStyle/>
+          <a:p>
+            <a:r>
+              <a:rPr lang="en-US" b="1" dirty="0">
+                <a:latin typeface="Segoe UI" panose="020B0502040204020203" pitchFamily="34" charset="0"/>
+                <a:cs typeface="Segoe UI" panose="020B0502040204020203" pitchFamily="34" charset="0"/>
+              </a:rPr>
+              <a:t>Sample Test Home</a:t>
+            </a:r>
+          </a:p>
+        </p:txBody>
+      </p:sp>
+      <p:sp>
+        <p:nvSpPr>
+          <p:cNvPr id="24" name="TextBox 23">
+            <a:extLst>
+              <a:ext uri="{FF2B5EF4-FFF2-40B4-BE49-F238E27FC236}">
+                <a16:creationId xmlns:a16="http://schemas.microsoft.com/office/drawing/2014/main" id="{74144655-8DDD-984D-8CDC-EE4359EDA143}"/>
+              </a:ext>
+            </a:extLst>
+          </p:cNvPr>
+          <p:cNvSpPr txBox="1"/>
+          <p:nvPr/>
+        </p:nvSpPr>
+        <p:spPr>
+          <a:xfrm>
+            <a:off x="7898799" y="3668080"/>
+            <a:ext cx="3619362" cy="1077218"/>
+          </a:xfrm>
+          <a:prstGeom prst="rect">
+            <a:avLst/>
+          </a:prstGeom>
+          <a:solidFill>
+            <a:schemeClr val="accent1">
+              <a:lumMod val="40000"/>
+              <a:lumOff val="60000"/>
+            </a:schemeClr>
+          </a:solidFill>
+        </p:spPr>
+        <p:txBody>
+          <a:bodyPr wrap="square" rtlCol="0">
+            <a:spAutoFit/>
+          </a:bodyPr>
+          <a:lstStyle/>
+          <a:p>
+            <a:pPr marL="285750" indent="-285750">
+              <a:buFont typeface="Arial" panose="020B0604020202020204" pitchFamily="34" charset="0"/>
+              <a:buChar char="•"/>
+            </a:pPr>
+            <a:r>
+              <a:rPr lang="en-US" sz="1600" dirty="0">
+                <a:latin typeface="Segoe UI" panose="020B0502040204020203" pitchFamily="34" charset="0"/>
+                <a:cs typeface="Segoe UI" panose="020B0502040204020203" pitchFamily="34" charset="0"/>
+              </a:rPr>
+              <a:t>If Waterfront 	+$189K</a:t>
+            </a:r>
+          </a:p>
+          <a:p>
+            <a:pPr marL="285750" indent="-285750">
+              <a:buFont typeface="Arial" panose="020B0604020202020204" pitchFamily="34" charset="0"/>
+              <a:buChar char="•"/>
+            </a:pPr>
+            <a:r>
+              <a:rPr lang="en-US" sz="1600" dirty="0">
+                <a:latin typeface="Segoe UI" panose="020B0502040204020203" pitchFamily="34" charset="0"/>
+                <a:cs typeface="Segoe UI" panose="020B0502040204020203" pitchFamily="34" charset="0"/>
+              </a:rPr>
+              <a:t>If Renovation 	+$54K</a:t>
+            </a:r>
+          </a:p>
+          <a:p>
+            <a:pPr marL="285750" indent="-285750">
+              <a:buFont typeface="Arial" panose="020B0604020202020204" pitchFamily="34" charset="0"/>
+              <a:buChar char="•"/>
+            </a:pPr>
+            <a:r>
+              <a:rPr lang="en-US" sz="1600" dirty="0">
+                <a:latin typeface="Segoe UI" panose="020B0502040204020203" pitchFamily="34" charset="0"/>
+                <a:cs typeface="Segoe UI" panose="020B0502040204020203" pitchFamily="34" charset="0"/>
+              </a:rPr>
+              <a:t>If Basement 	+$9K</a:t>
+            </a:r>
+          </a:p>
+          <a:p>
+            <a:pPr marL="285750" indent="-285750">
+              <a:buFont typeface="Arial" panose="020B0604020202020204" pitchFamily="34" charset="0"/>
+              <a:buChar char="•"/>
+            </a:pPr>
+            <a:r>
+              <a:rPr lang="en-US" sz="1600" dirty="0">
+                <a:latin typeface="Segoe UI" panose="020B0502040204020203" pitchFamily="34" charset="0"/>
+                <a:cs typeface="Segoe UI" panose="020B0502040204020203" pitchFamily="34" charset="0"/>
+              </a:rPr>
+              <a:t>If Grade 10 	+$240K </a:t>
+            </a:r>
+          </a:p>
+        </p:txBody>
+      </p:sp>
+      <p:sp>
+        <p:nvSpPr>
+          <p:cNvPr id="25" name="TextBox 24">
+            <a:extLst>
+              <a:ext uri="{FF2B5EF4-FFF2-40B4-BE49-F238E27FC236}">
+                <a16:creationId xmlns:a16="http://schemas.microsoft.com/office/drawing/2014/main" id="{E7680363-CC7D-F844-98FA-0E4B8A9D45BE}"/>
+              </a:ext>
+            </a:extLst>
+          </p:cNvPr>
+          <p:cNvSpPr txBox="1"/>
+          <p:nvPr/>
+        </p:nvSpPr>
+        <p:spPr>
+          <a:xfrm>
+            <a:off x="8545841" y="3307687"/>
+            <a:ext cx="2064989" cy="369332"/>
+          </a:xfrm>
+          <a:prstGeom prst="rect">
+            <a:avLst/>
+          </a:prstGeom>
+          <a:noFill/>
+        </p:spPr>
+        <p:txBody>
+          <a:bodyPr wrap="none" rtlCol="0">
+            <a:spAutoFit/>
+          </a:bodyPr>
+          <a:lstStyle/>
+          <a:p>
+            <a:r>
+              <a:rPr lang="en-US" b="1" dirty="0">
+                <a:latin typeface="Segoe UI" panose="020B0502040204020203" pitchFamily="34" charset="0"/>
+                <a:cs typeface="Segoe UI" panose="020B0502040204020203" pitchFamily="34" charset="0"/>
+              </a:rPr>
+              <a:t>Model Sensitivity</a:t>
+            </a:r>
+          </a:p>
+        </p:txBody>
+      </p:sp>
+      <p:sp>
+        <p:nvSpPr>
+          <p:cNvPr id="6" name="TextBox 5">
+            <a:extLst>
+              <a:ext uri="{FF2B5EF4-FFF2-40B4-BE49-F238E27FC236}">
+                <a16:creationId xmlns:a16="http://schemas.microsoft.com/office/drawing/2014/main" id="{9D7EBA19-790F-154D-AA50-C0187BE87602}"/>
+              </a:ext>
+            </a:extLst>
+          </p:cNvPr>
+          <p:cNvSpPr txBox="1"/>
+          <p:nvPr/>
+        </p:nvSpPr>
+        <p:spPr>
+          <a:xfrm>
+            <a:off x="7785747" y="4885489"/>
+            <a:ext cx="3734447" cy="738664"/>
+          </a:xfrm>
+          <a:prstGeom prst="rect">
+            <a:avLst/>
+          </a:prstGeom>
+          <a:noFill/>
+        </p:spPr>
+        <p:txBody>
+          <a:bodyPr wrap="square" rtlCol="0">
+            <a:spAutoFit/>
+          </a:bodyPr>
+          <a:lstStyle/>
+          <a:p>
+            <a:pPr algn="ctr"/>
+            <a:r>
+              <a:rPr lang="en-US" sz="1400" i="1" dirty="0">
+                <a:latin typeface="Segoe UI" panose="020B0502040204020203" pitchFamily="34" charset="0"/>
+                <a:cs typeface="Segoe UI" panose="020B0502040204020203" pitchFamily="34" charset="0"/>
+              </a:rPr>
+              <a:t>Due to nature of model, </a:t>
+            </a:r>
+          </a:p>
+          <a:p>
+            <a:pPr algn="ctr"/>
+            <a:r>
+              <a:rPr lang="en-US" sz="1400" i="1" dirty="0">
+                <a:latin typeface="Segoe UI" panose="020B0502040204020203" pitchFamily="34" charset="0"/>
+                <a:cs typeface="Segoe UI" panose="020B0502040204020203" pitchFamily="34" charset="0"/>
+              </a:rPr>
+              <a:t>multiple features changes would not be directly additive</a:t>
+            </a:r>
+          </a:p>
+        </p:txBody>
+      </p:sp>
+      <p:sp>
+        <p:nvSpPr>
+          <p:cNvPr id="7" name="Left Arrow 6">
+            <a:extLst>
+              <a:ext uri="{FF2B5EF4-FFF2-40B4-BE49-F238E27FC236}">
+                <a16:creationId xmlns:a16="http://schemas.microsoft.com/office/drawing/2014/main" id="{CD8B2B57-4EF7-0B4C-A034-761F04EC9280}"/>
+              </a:ext>
+            </a:extLst>
+          </p:cNvPr>
+          <p:cNvSpPr/>
+          <p:nvPr/>
+        </p:nvSpPr>
+        <p:spPr>
+          <a:xfrm>
+            <a:off x="7190843" y="1746688"/>
+            <a:ext cx="595174" cy="636607"/>
+          </a:xfrm>
+          <a:prstGeom prst="leftArrow">
+            <a:avLst/>
+          </a:prstGeom>
+        </p:spPr>
+        <p:style>
+          <a:lnRef idx="2">
+            <a:schemeClr val="accent1">
+              <a:shade val="50000"/>
+            </a:schemeClr>
+          </a:lnRef>
+          <a:fillRef idx="1">
+            <a:schemeClr val="accent1"/>
+          </a:fillRef>
+          <a:effectRef idx="0">
+            <a:schemeClr val="accent1"/>
+          </a:effectRef>
+          <a:fontRef idx="minor">
+            <a:schemeClr val="lt1"/>
+          </a:fontRef>
+        </p:style>
+        <p:txBody>
+          <a:bodyPr rtlCol="0" anchor="ctr"/>
+          <a:lstStyle/>
+          <a:p>
+            <a:pPr algn="ctr"/>
+            <a:endParaRPr lang="en-US" dirty="0"/>
+          </a:p>
+        </p:txBody>
+      </p:sp>
+      <p:sp>
+        <p:nvSpPr>
+          <p:cNvPr id="26" name="Left Arrow 25">
+            <a:extLst>
+              <a:ext uri="{FF2B5EF4-FFF2-40B4-BE49-F238E27FC236}">
+                <a16:creationId xmlns:a16="http://schemas.microsoft.com/office/drawing/2014/main" id="{AFE4668A-2CAB-424A-8193-DF76EC874A42}"/>
+              </a:ext>
+            </a:extLst>
+          </p:cNvPr>
+          <p:cNvSpPr/>
+          <p:nvPr/>
+        </p:nvSpPr>
+        <p:spPr>
+          <a:xfrm rot="16200000">
+            <a:off x="5362690" y="4961638"/>
+            <a:ext cx="595174" cy="636607"/>
+          </a:xfrm>
+          <a:prstGeom prst="leftArrow">
+            <a:avLst/>
+          </a:prstGeom>
+        </p:spPr>
+        <p:style>
+          <a:lnRef idx="2">
+            <a:schemeClr val="accent1">
+              <a:shade val="50000"/>
+            </a:schemeClr>
+          </a:lnRef>
+          <a:fillRef idx="1">
+            <a:schemeClr val="accent1"/>
+          </a:fillRef>
+          <a:effectRef idx="0">
+            <a:schemeClr val="accent1"/>
+          </a:effectRef>
+          <a:fontRef idx="minor">
+            <a:schemeClr val="lt1"/>
+          </a:fontRef>
+        </p:style>
+        <p:txBody>
+          <a:bodyPr rtlCol="0" anchor="ctr"/>
+          <a:lstStyle/>
+          <a:p>
+            <a:pPr algn="ctr"/>
+            <a:endParaRPr lang="en-US" dirty="0"/>
+          </a:p>
+        </p:txBody>
+      </p:sp>
+      <p:sp>
+        <p:nvSpPr>
+          <p:cNvPr id="27" name="Left Arrow 26">
+            <a:extLst>
+              <a:ext uri="{FF2B5EF4-FFF2-40B4-BE49-F238E27FC236}">
+                <a16:creationId xmlns:a16="http://schemas.microsoft.com/office/drawing/2014/main" id="{5C21A00C-EC3E-0D4E-8787-56A82E9DE050}"/>
+              </a:ext>
+            </a:extLst>
+          </p:cNvPr>
+          <p:cNvSpPr/>
+          <p:nvPr/>
+        </p:nvSpPr>
+        <p:spPr>
+          <a:xfrm rot="10800000">
+            <a:off x="7243167" y="3988369"/>
+            <a:ext cx="595174" cy="636607"/>
+          </a:xfrm>
+          <a:prstGeom prst="leftArrow">
+            <a:avLst/>
+          </a:prstGeom>
+        </p:spPr>
+        <p:style>
+          <a:lnRef idx="2">
+            <a:schemeClr val="accent1">
+              <a:shade val="50000"/>
+            </a:schemeClr>
+          </a:lnRef>
+          <a:fillRef idx="1">
+            <a:schemeClr val="accent1"/>
+          </a:fillRef>
+          <a:effectRef idx="0">
+            <a:schemeClr val="accent1"/>
+          </a:effectRef>
+          <a:fontRef idx="minor">
+            <a:schemeClr val="lt1"/>
+          </a:fontRef>
+        </p:style>
+        <p:txBody>
+          <a:bodyPr rtlCol="0" anchor="ctr"/>
+          <a:lstStyle/>
+          <a:p>
+            <a:pPr algn="ctr"/>
+            <a:endParaRPr lang="en-US" dirty="0"/>
+          </a:p>
+        </p:txBody>
+      </p:sp>
     </p:spTree>
     <p:extLst>
       <p:ext uri="{BB962C8B-B14F-4D97-AF65-F5344CB8AC3E}">
-        <p14:creationId xmlns:p14="http://schemas.microsoft.com/office/powerpoint/2010/main" val="3348268622"/>
+        <p14:creationId xmlns:p14="http://schemas.microsoft.com/office/powerpoint/2010/main" val="3964540080"/>
       </p:ext>
     </p:extLst>
   </p:cSld>
   <p:clrMapOvr>
     <a:masterClrMapping/>
   </p:clrMapOvr>
+  <p:transition spd="slow">
+    <p:randomBar dir="vert"/>
+  </p:transition>
 </p:sld>
 </file>
 
@@ -10660,6 +12121,320 @@
       </p:grpSpPr>
       <p:sp>
         <p:nvSpPr>
+          <p:cNvPr id="104" name="TextBox 103"/>
+          <p:cNvSpPr txBox="1"/>
+          <p:nvPr/>
+        </p:nvSpPr>
+        <p:spPr>
+          <a:xfrm>
+            <a:off x="1196262" y="1433946"/>
+            <a:ext cx="9550046" cy="3662541"/>
+          </a:xfrm>
+          <a:prstGeom prst="rect">
+            <a:avLst/>
+          </a:prstGeom>
+          <a:noFill/>
+        </p:spPr>
+        <p:txBody>
+          <a:bodyPr wrap="square" rtlCol="0">
+            <a:spAutoFit/>
+          </a:bodyPr>
+          <a:lstStyle/>
+          <a:p>
+            <a:pPr marL="342900" indent="-342900">
+              <a:buFont typeface="Arial" panose="020B0604020202020204" pitchFamily="34" charset="0"/>
+              <a:buChar char="•"/>
+            </a:pPr>
+            <a:r>
+              <a:rPr lang="en-US" sz="2800" dirty="0">
+                <a:latin typeface="Segoe UI" panose="020B0502040204020203" pitchFamily="34" charset="0"/>
+                <a:cs typeface="Segoe UI" panose="020B0502040204020203" pitchFamily="34" charset="0"/>
+              </a:rPr>
+              <a:t>Suggest half-day technical workshop deep-dive</a:t>
+            </a:r>
+          </a:p>
+          <a:p>
+            <a:pPr marL="342900" indent="-342900">
+              <a:buFont typeface="Arial" panose="020B0604020202020204" pitchFamily="34" charset="0"/>
+              <a:buChar char="•"/>
+            </a:pPr>
+            <a:r>
+              <a:rPr lang="en-US" sz="2800" dirty="0">
+                <a:latin typeface="Segoe UI" panose="020B0502040204020203" pitchFamily="34" charset="0"/>
+                <a:cs typeface="Segoe UI" panose="020B0502040204020203" pitchFamily="34" charset="0"/>
+              </a:rPr>
+              <a:t>Begin socializing to broader team</a:t>
+            </a:r>
+          </a:p>
+          <a:p>
+            <a:pPr marL="342900" indent="-342900">
+              <a:buFont typeface="Arial" panose="020B0604020202020204" pitchFamily="34" charset="0"/>
+              <a:buChar char="•"/>
+            </a:pPr>
+            <a:r>
+              <a:rPr lang="en-US" sz="2800" dirty="0">
+                <a:latin typeface="Segoe UI" panose="020B0502040204020203" pitchFamily="34" charset="0"/>
+                <a:cs typeface="Segoe UI" panose="020B0502040204020203" pitchFamily="34" charset="0"/>
+              </a:rPr>
+              <a:t>Capture requirements for sales tool integration</a:t>
+            </a:r>
+          </a:p>
+          <a:p>
+            <a:pPr marL="342900" indent="-342900">
+              <a:buFont typeface="Arial" panose="020B0604020202020204" pitchFamily="34" charset="0"/>
+              <a:buChar char="•"/>
+            </a:pPr>
+            <a:r>
+              <a:rPr lang="en-US" sz="2800" dirty="0">
+                <a:latin typeface="Segoe UI" panose="020B0502040204020203" pitchFamily="34" charset="0"/>
+                <a:cs typeface="Segoe UI" panose="020B0502040204020203" pitchFamily="34" charset="0"/>
+              </a:rPr>
+              <a:t>Continue iterating model for improvements</a:t>
+            </a:r>
+          </a:p>
+          <a:p>
+            <a:pPr marL="800100" lvl="1" indent="-342900">
+              <a:buFont typeface="Arial" panose="020B0604020202020204" pitchFamily="34" charset="0"/>
+              <a:buChar char="•"/>
+            </a:pPr>
+            <a:endParaRPr lang="en-US" sz="2800" dirty="0">
+              <a:latin typeface="Segoe UI" panose="020B0502040204020203" pitchFamily="34" charset="0"/>
+              <a:cs typeface="Segoe UI" panose="020B0502040204020203" pitchFamily="34" charset="0"/>
+            </a:endParaRPr>
+          </a:p>
+          <a:p>
+            <a:pPr marL="800100" lvl="1" indent="-342900">
+              <a:buFont typeface="Arial" panose="020B0604020202020204" pitchFamily="34" charset="0"/>
+              <a:buChar char="•"/>
+            </a:pPr>
+            <a:endParaRPr lang="en-US" sz="2800" dirty="0">
+              <a:latin typeface="Segoe UI" panose="020B0502040204020203" pitchFamily="34" charset="0"/>
+              <a:cs typeface="Segoe UI" panose="020B0502040204020203" pitchFamily="34" charset="0"/>
+            </a:endParaRPr>
+          </a:p>
+          <a:p>
+            <a:pPr marL="342900" indent="-342900">
+              <a:buFont typeface="Arial" panose="020B0604020202020204" pitchFamily="34" charset="0"/>
+              <a:buChar char="•"/>
+            </a:pPr>
+            <a:r>
+              <a:rPr lang="en-US" sz="3200" dirty="0">
+                <a:latin typeface="Segoe UI" panose="020B0502040204020203" pitchFamily="34" charset="0"/>
+                <a:cs typeface="Segoe UI" panose="020B0502040204020203" pitchFamily="34" charset="0"/>
+              </a:rPr>
+              <a:t>Questions?</a:t>
+            </a:r>
+          </a:p>
+          <a:p>
+            <a:endParaRPr lang="en-US" sz="3200" dirty="0">
+              <a:latin typeface="Segoe UI" panose="020B0502040204020203" pitchFamily="34" charset="0"/>
+              <a:cs typeface="Segoe UI" panose="020B0502040204020203" pitchFamily="34" charset="0"/>
+            </a:endParaRPr>
+          </a:p>
+        </p:txBody>
+      </p:sp>
+      <p:sp>
+        <p:nvSpPr>
+          <p:cNvPr id="180" name="Date Placeholder 1"/>
+          <p:cNvSpPr>
+            <a:spLocks noGrp="1"/>
+          </p:cNvSpPr>
+          <p:nvPr>
+            <p:ph type="dt" sz="half" idx="10"/>
+          </p:nvPr>
+        </p:nvSpPr>
+        <p:spPr>
+          <a:xfrm>
+            <a:off x="735856" y="6510505"/>
+            <a:ext cx="846754" cy="348463"/>
+          </a:xfrm>
+        </p:spPr>
+        <p:txBody>
+          <a:bodyPr/>
+          <a:lstStyle/>
+          <a:p>
+            <a:fld id="{176B1F7D-A64B-4A90-8D4F-4ED41DDBE69A}" type="datetime1">
+              <a:rPr lang="en-US" smtClean="0"/>
+              <a:t>3/16/21</a:t>
+            </a:fld>
+            <a:endParaRPr lang="en-US" dirty="0"/>
+          </a:p>
+        </p:txBody>
+      </p:sp>
+      <p:sp>
+        <p:nvSpPr>
+          <p:cNvPr id="182" name="Slide Number Placeholder 3"/>
+          <p:cNvSpPr>
+            <a:spLocks noGrp="1"/>
+          </p:cNvSpPr>
+          <p:nvPr>
+            <p:ph type="sldNum" sz="quarter" idx="12"/>
+          </p:nvPr>
+        </p:nvSpPr>
+        <p:spPr>
+          <a:xfrm>
+            <a:off x="11518163" y="6511838"/>
+            <a:ext cx="351464" cy="345796"/>
+          </a:xfrm>
+        </p:spPr>
+        <p:txBody>
+          <a:bodyPr/>
+          <a:lstStyle/>
+          <a:p>
+            <a:fld id="{2677B570-5BCE-435F-8FE4-883586746873}" type="slidenum">
+              <a:rPr lang="en-US" smtClean="0"/>
+              <a:t>8</a:t>
+            </a:fld>
+            <a:endParaRPr lang="en-US" dirty="0"/>
+          </a:p>
+        </p:txBody>
+      </p:sp>
+      <p:sp>
+        <p:nvSpPr>
+          <p:cNvPr id="13" name="Title 12"/>
+          <p:cNvSpPr>
+            <a:spLocks noGrp="1"/>
+          </p:cNvSpPr>
+          <p:nvPr>
+            <p:ph type="title"/>
+          </p:nvPr>
+        </p:nvSpPr>
+        <p:spPr/>
+        <p:txBody>
+          <a:bodyPr/>
+          <a:lstStyle/>
+          <a:p>
+            <a:r>
+              <a:rPr lang="en-US" dirty="0"/>
+              <a:t>Next Steps</a:t>
+            </a:r>
+          </a:p>
+        </p:txBody>
+      </p:sp>
+      <p:sp>
+        <p:nvSpPr>
+          <p:cNvPr id="185" name="Rounded Rectangle 184"/>
+          <p:cNvSpPr/>
+          <p:nvPr/>
+        </p:nvSpPr>
+        <p:spPr>
+          <a:xfrm>
+            <a:off x="10841181" y="315192"/>
+            <a:ext cx="990600" cy="471053"/>
+          </a:xfrm>
+          <a:prstGeom prst="roundRect">
+            <a:avLst/>
+          </a:prstGeom>
+          <a:solidFill>
+            <a:schemeClr val="tx1"/>
+          </a:solidFill>
+          <a:ln>
+            <a:noFill/>
+          </a:ln>
+        </p:spPr>
+        <p:style>
+          <a:lnRef idx="2">
+            <a:schemeClr val="accent1">
+              <a:shade val="50000"/>
+            </a:schemeClr>
+          </a:lnRef>
+          <a:fillRef idx="1">
+            <a:schemeClr val="accent1"/>
+          </a:fillRef>
+          <a:effectRef idx="0">
+            <a:schemeClr val="accent1"/>
+          </a:effectRef>
+          <a:fontRef idx="minor">
+            <a:schemeClr val="lt1"/>
+          </a:fontRef>
+        </p:style>
+        <p:txBody>
+          <a:bodyPr rtlCol="0" anchor="ctr"/>
+          <a:lstStyle/>
+          <a:p>
+            <a:pPr algn="ctr"/>
+            <a:r>
+              <a:rPr lang="en-US" sz="1000" b="1" dirty="0">
+                <a:latin typeface="Segoe UI" panose="020B0502040204020203" pitchFamily="34" charset="0"/>
+                <a:cs typeface="Segoe UI" panose="020B0502040204020203" pitchFamily="34" charset="0"/>
+              </a:rPr>
+              <a:t>Next Steps</a:t>
+            </a:r>
+          </a:p>
+        </p:txBody>
+      </p:sp>
+      <p:sp>
+        <p:nvSpPr>
+          <p:cNvPr id="8" name="Footer Placeholder 2">
+            <a:extLst>
+              <a:ext uri="{FF2B5EF4-FFF2-40B4-BE49-F238E27FC236}">
+                <a16:creationId xmlns:a16="http://schemas.microsoft.com/office/drawing/2014/main" id="{EA0370E8-7653-1845-96EE-5DEF034C0E51}"/>
+              </a:ext>
+            </a:extLst>
+          </p:cNvPr>
+          <p:cNvSpPr>
+            <a:spLocks noGrp="1"/>
+          </p:cNvSpPr>
+          <p:nvPr>
+            <p:ph type="ftr" sz="quarter" idx="11"/>
+          </p:nvPr>
+        </p:nvSpPr>
+        <p:spPr>
+          <a:xfrm>
+            <a:off x="4140862" y="6510505"/>
+            <a:ext cx="4114800" cy="345796"/>
+          </a:xfrm>
+        </p:spPr>
+        <p:txBody>
+          <a:bodyPr/>
+          <a:lstStyle/>
+          <a:p>
+            <a:pPr algn="ctr"/>
+            <a:r>
+              <a:rPr lang="en-US" dirty="0">
+                <a:latin typeface="Segoe UI" panose="020B0502040204020203" pitchFamily="34" charset="0"/>
+                <a:cs typeface="Segoe UI" panose="020B0502040204020203" pitchFamily="34" charset="0"/>
+              </a:rPr>
+              <a:t>Flatiron Data Science Bootcamp Project </a:t>
+            </a:r>
+          </a:p>
+        </p:txBody>
+      </p:sp>
+    </p:spTree>
+    <p:extLst>
+      <p:ext uri="{BB962C8B-B14F-4D97-AF65-F5344CB8AC3E}">
+        <p14:creationId xmlns:p14="http://schemas.microsoft.com/office/powerpoint/2010/main" val="3348268622"/>
+      </p:ext>
+    </p:extLst>
+  </p:cSld>
+  <p:clrMapOvr>
+    <a:masterClrMapping/>
+  </p:clrMapOvr>
+  <p:transition spd="slow">
+    <p:randomBar dir="vert"/>
+  </p:transition>
+</p:sld>
+</file>
+
+<file path=ppt/slides/slide9.xml><?xml version="1.0" encoding="utf-8"?>
+<p:sld xmlns:a="http://schemas.openxmlformats.org/drawingml/2006/main" xmlns:r="http://schemas.openxmlformats.org/officeDocument/2006/relationships" xmlns:p="http://schemas.openxmlformats.org/presentationml/2006/main">
+  <p:cSld>
+    <p:spTree>
+      <p:nvGrpSpPr>
+        <p:cNvPr id="1" name=""/>
+        <p:cNvGrpSpPr/>
+        <p:nvPr/>
+      </p:nvGrpSpPr>
+      <p:grpSpPr>
+        <a:xfrm>
+          <a:off x="0" y="0"/>
+          <a:ext cx="0" cy="0"/>
+          <a:chOff x="0" y="0"/>
+          <a:chExt cx="0" cy="0"/>
+        </a:xfrm>
+      </p:grpSpPr>
+      <p:sp>
+        <p:nvSpPr>
           <p:cNvPr id="2" name="Title 1"/>
           <p:cNvSpPr>
             <a:spLocks noGrp="1"/>
@@ -10973,7 +12748,7 @@
           <a:p>
             <a:fld id="{2677B570-5BCE-435F-8FE4-883586746873}" type="slidenum">
               <a:rPr lang="en-US" smtClean="0"/>
-              <a:t>8</a:t>
+              <a:t>9</a:t>
             </a:fld>
             <a:endParaRPr lang="en-US" dirty="0"/>
           </a:p>
@@ -12627,6 +14402,9 @@
   <p:clrMapOvr>
     <a:masterClrMapping/>
   </p:clrMapOvr>
+  <p:transition spd="slow">
+    <p:randomBar dir="vert"/>
+  </p:transition>
 </p:sld>
 </file>
 

</xml_diff>